<commit_message>
Color and spacing adjustments, components
</commit_message>
<xml_diff>
--- a/Open Repositories 2017/Charon Poster/OR2017_Charon_Poster_Working.pptx
+++ b/Open Repositories 2017/Charon Poster/OR2017_Charon_Poster_Working.pptx
@@ -4993,11 +4993,6 @@
               </a:rPr>
               <a:t>                   : 18 absolute min – 40 absolute max</a:t>
             </a:r>
-            <a:endParaRPr lang="en-US" sz="1800" dirty="0">
-              <a:solidFill>
-                <a:schemeClr val="bg1"/>
-              </a:solidFill>
-            </a:endParaRPr>
           </a:p>
         </p:txBody>
       </p:sp>
@@ -5253,14 +5248,6 @@
               </a:rPr>
               <a:t>absolute min – 40 absolute max</a:t>
             </a:r>
-            <a:endParaRPr lang="en-US" sz="1600" dirty="0">
-              <a:solidFill>
-                <a:schemeClr val="bg1"/>
-              </a:solidFill>
-              <a:latin typeface="Tahoma" charset="0"/>
-              <a:ea typeface="Tahoma" charset="0"/>
-              <a:cs typeface="Tahoma" charset="0"/>
-            </a:endParaRPr>
           </a:p>
         </p:txBody>
       </p:sp>
@@ -6978,7 +6965,7 @@
     <p:bg>
       <p:bgPr>
         <a:solidFill>
-          <a:schemeClr val="tx1"/>
+          <a:srgbClr val="413E4A"/>
         </a:solidFill>
         <a:effectLst/>
       </p:bgPr>
@@ -6999,66 +6986,20 @@
       </p:grpSpPr>
       <p:sp>
         <p:nvSpPr>
-          <p:cNvPr id="7" name="TextBox 6"/>
-          <p:cNvSpPr txBox="1"/>
+          <p:cNvPr id="4" name="Rectangle 3"/>
+          <p:cNvSpPr/>
           <p:nvPr/>
         </p:nvSpPr>
         <p:spPr>
           <a:xfrm>
-            <a:off x="8625343" y="0"/>
-            <a:ext cx="1688704" cy="1446550"/>
+            <a:off x="10883988" y="-572"/>
+            <a:ext cx="274320" cy="18288000"/>
           </a:xfrm>
           <a:prstGeom prst="rect">
             <a:avLst/>
           </a:prstGeom>
           <a:solidFill>
-            <a:schemeClr val="bg1">
-              <a:lumMod val="85000"/>
-            </a:schemeClr>
-          </a:solidFill>
-        </p:spPr>
-        <p:txBody>
-          <a:bodyPr wrap="square" rtlCol="0">
-            <a:spAutoFit/>
-          </a:bodyPr>
-          <a:lstStyle/>
-          <a:p>
-            <a:pPr algn="ctr"/>
-            <a:endParaRPr lang="en-AU" sz="2800" dirty="0" smtClean="0"/>
-          </a:p>
-          <a:p>
-            <a:pPr algn="ctr"/>
-            <a:r>
-              <a:rPr lang="en-AU" sz="3200" b="1" dirty="0" smtClean="0"/>
-              <a:t>115</a:t>
-            </a:r>
-          </a:p>
-          <a:p>
-            <a:pPr algn="ctr"/>
-            <a:endParaRPr lang="en-AU" sz="2800" dirty="0" smtClean="0">
-              <a:solidFill>
-                <a:schemeClr val="bg1"/>
-              </a:solidFill>
-            </a:endParaRPr>
-          </a:p>
-        </p:txBody>
-      </p:sp>
-      <p:sp>
-        <p:nvSpPr>
-          <p:cNvPr id="4" name="Rectangle 3"/>
-          <p:cNvSpPr/>
-          <p:nvPr/>
-        </p:nvSpPr>
-        <p:spPr>
-          <a:xfrm>
-            <a:off x="0" y="0"/>
-            <a:ext cx="274320" cy="18288000"/>
-          </a:xfrm>
-          <a:prstGeom prst="rect">
-            <a:avLst/>
-          </a:prstGeom>
-          <a:solidFill>
-            <a:schemeClr val="bg1"/>
+            <a:schemeClr val="tx1"/>
           </a:solidFill>
           <a:ln>
             <a:solidFill>
@@ -7099,14 +7040,14 @@
         </p:nvSpPr>
         <p:spPr>
           <a:xfrm>
-            <a:off x="10015855" y="-17794"/>
+            <a:off x="20899843" y="-18366"/>
             <a:ext cx="274320" cy="18288000"/>
           </a:xfrm>
           <a:prstGeom prst="rect">
             <a:avLst/>
           </a:prstGeom>
           <a:solidFill>
-            <a:schemeClr val="bg1"/>
+            <a:schemeClr val="tx1"/>
           </a:solidFill>
           <a:ln>
             <a:solidFill>
@@ -7147,14 +7088,14 @@
         </p:nvSpPr>
         <p:spPr>
           <a:xfrm rot="5400000">
-            <a:off x="5017717" y="-5006340"/>
+            <a:off x="15901705" y="-5006912"/>
             <a:ext cx="274320" cy="10287000"/>
           </a:xfrm>
           <a:prstGeom prst="rect">
             <a:avLst/>
           </a:prstGeom>
           <a:solidFill>
-            <a:schemeClr val="bg1"/>
+            <a:schemeClr val="tx1"/>
           </a:solidFill>
           <a:ln>
             <a:solidFill>
@@ -7195,14 +7136,14 @@
         </p:nvSpPr>
         <p:spPr>
           <a:xfrm rot="5400000">
-            <a:off x="5006340" y="13010515"/>
+            <a:off x="15890328" y="13009943"/>
             <a:ext cx="274320" cy="10287000"/>
           </a:xfrm>
           <a:prstGeom prst="rect">
             <a:avLst/>
           </a:prstGeom>
           <a:solidFill>
-            <a:schemeClr val="bg1"/>
+            <a:schemeClr val="tx1"/>
           </a:solidFill>
           <a:ln>
             <a:solidFill>
@@ -7243,14 +7184,14 @@
         </p:nvSpPr>
         <p:spPr>
           <a:xfrm>
-            <a:off x="31883" y="3240931"/>
+            <a:off x="10915871" y="3240359"/>
             <a:ext cx="10287000" cy="228600"/>
           </a:xfrm>
           <a:prstGeom prst="rect">
             <a:avLst/>
           </a:prstGeom>
           <a:solidFill>
-            <a:schemeClr val="bg1"/>
+            <a:schemeClr val="tx1"/>
           </a:solidFill>
           <a:ln>
             <a:solidFill>
@@ -7285,153 +7226,20 @@
       </p:sp>
       <p:sp>
         <p:nvSpPr>
-          <p:cNvPr id="3" name="TextBox 2"/>
-          <p:cNvSpPr txBox="1"/>
-          <p:nvPr/>
-        </p:nvSpPr>
-        <p:spPr>
-          <a:xfrm>
-            <a:off x="320552" y="1080691"/>
-            <a:ext cx="9649072" cy="2154436"/>
-          </a:xfrm>
-          <a:prstGeom prst="rect">
-            <a:avLst/>
-          </a:prstGeom>
-          <a:noFill/>
-          <a:ln>
-            <a:solidFill>
-              <a:srgbClr val="00B050"/>
-            </a:solidFill>
-          </a:ln>
-        </p:spPr>
-        <p:txBody>
-          <a:bodyPr wrap="square" lIns="0" tIns="0" rIns="0" bIns="0" rtlCol="0">
-            <a:spAutoFit/>
-          </a:bodyPr>
-          <a:lstStyle/>
-          <a:p>
-            <a:r>
-              <a:rPr lang="en-US" sz="8000" dirty="0" smtClean="0">
-                <a:solidFill>
-                  <a:srgbClr val="F2F0DF"/>
-                </a:solidFill>
-                <a:latin typeface="Corbel" charset="0"/>
-                <a:ea typeface="Corbel" charset="0"/>
-                <a:cs typeface="Corbel" charset="0"/>
-              </a:rPr>
-              <a:t>Charon</a:t>
-            </a:r>
-            <a:r>
-              <a:rPr lang="en-US" sz="6000" dirty="0" smtClean="0">
-                <a:solidFill>
-                  <a:srgbClr val="F2F0DF"/>
-                </a:solidFill>
-                <a:latin typeface="Corbel" charset="0"/>
-                <a:ea typeface="Corbel" charset="0"/>
-                <a:cs typeface="Corbel" charset="0"/>
-              </a:rPr>
-              <a:t>: Workflow Support for Digital Humanities Projects</a:t>
-            </a:r>
-            <a:endParaRPr lang="en-US" sz="6000" dirty="0">
-              <a:solidFill>
-                <a:srgbClr val="F2F0DF"/>
-              </a:solidFill>
-              <a:latin typeface="Corbel" charset="0"/>
-              <a:ea typeface="Corbel" charset="0"/>
-              <a:cs typeface="Corbel" charset="0"/>
-            </a:endParaRPr>
-          </a:p>
-        </p:txBody>
-      </p:sp>
-      <p:sp>
-        <p:nvSpPr>
-          <p:cNvPr id="19" name="TextBox 18"/>
-          <p:cNvSpPr txBox="1"/>
-          <p:nvPr/>
-        </p:nvSpPr>
-        <p:spPr>
-          <a:xfrm>
-            <a:off x="320552" y="288603"/>
-            <a:ext cx="9649072" cy="800219"/>
-          </a:xfrm>
-          <a:prstGeom prst="rect">
-            <a:avLst/>
-          </a:prstGeom>
-          <a:noFill/>
-          <a:ln>
-            <a:solidFill>
-              <a:srgbClr val="00B050"/>
-            </a:solidFill>
-          </a:ln>
-        </p:spPr>
-        <p:txBody>
-          <a:bodyPr wrap="square" lIns="0" tIns="0" rIns="0" bIns="0" rtlCol="0">
-            <a:spAutoFit/>
-          </a:bodyPr>
-          <a:lstStyle/>
-          <a:p>
-            <a:r>
-              <a:rPr lang="en-US" sz="2600" dirty="0">
-                <a:solidFill>
-                  <a:schemeClr val="bg1"/>
-                </a:solidFill>
-                <a:latin typeface="Corbel" charset="0"/>
-                <a:ea typeface="Corbel" charset="0"/>
-                <a:cs typeface="Corbel" charset="0"/>
-              </a:rPr>
-              <a:t>Sarah Sweeney, </a:t>
-            </a:r>
-            <a:r>
-              <a:rPr lang="en-US" sz="2600" dirty="0" err="1">
-                <a:solidFill>
-                  <a:schemeClr val="bg1"/>
-                </a:solidFill>
-                <a:latin typeface="Corbel" charset="0"/>
-                <a:ea typeface="Corbel" charset="0"/>
-                <a:cs typeface="Corbel" charset="0"/>
-              </a:rPr>
-              <a:t>sj.sweeney@northeastern.edu</a:t>
-            </a:r>
-            <a:endParaRPr lang="en-US" sz="2600" dirty="0">
-              <a:solidFill>
-                <a:schemeClr val="bg1"/>
-              </a:solidFill>
-              <a:latin typeface="Corbel" charset="0"/>
-              <a:ea typeface="Corbel" charset="0"/>
-              <a:cs typeface="Corbel" charset="0"/>
-            </a:endParaRPr>
-          </a:p>
-          <a:p>
-            <a:r>
-              <a:rPr lang="en-US" sz="2600" dirty="0" smtClean="0">
-                <a:solidFill>
-                  <a:schemeClr val="bg1"/>
-                </a:solidFill>
-                <a:latin typeface="Corbel" charset="0"/>
-                <a:ea typeface="Corbel" charset="0"/>
-                <a:cs typeface="Corbel" charset="0"/>
-              </a:rPr>
-              <a:t>Northeastern University Libraries, Digital Scholarship Group</a:t>
-            </a:r>
-          </a:p>
-        </p:txBody>
-      </p:sp>
-      <p:sp>
-        <p:nvSpPr>
           <p:cNvPr id="22" name="Rectangle 21"/>
           <p:cNvSpPr/>
           <p:nvPr/>
         </p:nvSpPr>
         <p:spPr>
           <a:xfrm>
-            <a:off x="3175" y="6337275"/>
+            <a:off x="10887163" y="6336703"/>
             <a:ext cx="10287000" cy="228600"/>
           </a:xfrm>
           <a:prstGeom prst="rect">
             <a:avLst/>
           </a:prstGeom>
           <a:solidFill>
-            <a:schemeClr val="bg1"/>
+            <a:schemeClr val="tx1"/>
           </a:solidFill>
           <a:ln>
             <a:solidFill>
@@ -7472,14 +7280,14 @@
         </p:nvSpPr>
         <p:spPr>
           <a:xfrm>
-            <a:off x="3175" y="15986347"/>
+            <a:off x="10887163" y="15985775"/>
             <a:ext cx="10287000" cy="228600"/>
           </a:xfrm>
           <a:prstGeom prst="rect">
             <a:avLst/>
           </a:prstGeom>
           <a:solidFill>
-            <a:schemeClr val="bg1"/>
+            <a:schemeClr val="tx1"/>
           </a:solidFill>
           <a:ln>
             <a:solidFill>
@@ -7514,916 +7322,20 @@
       </p:sp>
       <p:sp>
         <p:nvSpPr>
-          <p:cNvPr id="24" name="TextBox 23"/>
-          <p:cNvSpPr txBox="1"/>
-          <p:nvPr/>
-        </p:nvSpPr>
-        <p:spPr>
-          <a:xfrm>
-            <a:off x="320550" y="3456955"/>
-            <a:ext cx="4824538" cy="2769989"/>
-          </a:xfrm>
-          <a:prstGeom prst="rect">
-            <a:avLst/>
-          </a:prstGeom>
-          <a:noFill/>
-          <a:ln>
-            <a:solidFill>
-              <a:srgbClr val="00B050"/>
-            </a:solidFill>
-          </a:ln>
-        </p:spPr>
-        <p:txBody>
-          <a:bodyPr wrap="square" lIns="0" tIns="0" rIns="0" bIns="0" rtlCol="0">
-            <a:spAutoFit/>
-          </a:bodyPr>
-          <a:lstStyle/>
-          <a:p>
-            <a:r>
-              <a:rPr lang="en-US" sz="2000" dirty="0" smtClean="0">
-                <a:solidFill>
-                  <a:schemeClr val="bg1"/>
-                </a:solidFill>
-                <a:latin typeface="Tahoma" charset="0"/>
-                <a:ea typeface="Tahoma" charset="0"/>
-                <a:cs typeface="Tahoma" charset="0"/>
-              </a:rPr>
-              <a:t>Lorem ipsum dolor sit </a:t>
-            </a:r>
-            <a:r>
-              <a:rPr lang="en-US" sz="2000" dirty="0" err="1" smtClean="0">
-                <a:solidFill>
-                  <a:schemeClr val="bg1"/>
-                </a:solidFill>
-                <a:latin typeface="Tahoma" charset="0"/>
-                <a:ea typeface="Tahoma" charset="0"/>
-                <a:cs typeface="Tahoma" charset="0"/>
-              </a:rPr>
-              <a:t>amet</a:t>
-            </a:r>
-            <a:r>
-              <a:rPr lang="en-US" sz="2000" dirty="0" smtClean="0">
-                <a:solidFill>
-                  <a:schemeClr val="bg1"/>
-                </a:solidFill>
-                <a:latin typeface="Tahoma" charset="0"/>
-                <a:ea typeface="Tahoma" charset="0"/>
-                <a:cs typeface="Tahoma" charset="0"/>
-              </a:rPr>
-              <a:t>, </a:t>
-            </a:r>
-            <a:r>
-              <a:rPr lang="en-US" sz="2000" dirty="0" err="1" smtClean="0">
-                <a:solidFill>
-                  <a:schemeClr val="bg1"/>
-                </a:solidFill>
-                <a:latin typeface="Tahoma" charset="0"/>
-                <a:ea typeface="Tahoma" charset="0"/>
-                <a:cs typeface="Tahoma" charset="0"/>
-              </a:rPr>
-              <a:t>consectetur</a:t>
-            </a:r>
-            <a:r>
-              <a:rPr lang="en-US" sz="2000" dirty="0" smtClean="0">
-                <a:solidFill>
-                  <a:schemeClr val="bg1"/>
-                </a:solidFill>
-                <a:latin typeface="Tahoma" charset="0"/>
-                <a:ea typeface="Tahoma" charset="0"/>
-                <a:cs typeface="Tahoma" charset="0"/>
-              </a:rPr>
-              <a:t> </a:t>
-            </a:r>
-            <a:r>
-              <a:rPr lang="en-US" sz="2000" dirty="0" err="1" smtClean="0">
-                <a:solidFill>
-                  <a:schemeClr val="bg1"/>
-                </a:solidFill>
-                <a:latin typeface="Tahoma" charset="0"/>
-                <a:ea typeface="Tahoma" charset="0"/>
-                <a:cs typeface="Tahoma" charset="0"/>
-              </a:rPr>
-              <a:t>adipiscing</a:t>
-            </a:r>
-            <a:r>
-              <a:rPr lang="en-US" sz="2000" dirty="0" smtClean="0">
-                <a:solidFill>
-                  <a:schemeClr val="bg1"/>
-                </a:solidFill>
-                <a:latin typeface="Tahoma" charset="0"/>
-                <a:ea typeface="Tahoma" charset="0"/>
-                <a:cs typeface="Tahoma" charset="0"/>
-              </a:rPr>
-              <a:t> </a:t>
-            </a:r>
-            <a:r>
-              <a:rPr lang="en-US" sz="2000" dirty="0" err="1" smtClean="0">
-                <a:solidFill>
-                  <a:schemeClr val="bg1"/>
-                </a:solidFill>
-                <a:latin typeface="Tahoma" charset="0"/>
-                <a:ea typeface="Tahoma" charset="0"/>
-                <a:cs typeface="Tahoma" charset="0"/>
-              </a:rPr>
-              <a:t>elit</a:t>
-            </a:r>
-            <a:r>
-              <a:rPr lang="en-US" sz="2000" dirty="0" smtClean="0">
-                <a:solidFill>
-                  <a:schemeClr val="bg1"/>
-                </a:solidFill>
-                <a:latin typeface="Tahoma" charset="0"/>
-                <a:ea typeface="Tahoma" charset="0"/>
-                <a:cs typeface="Tahoma" charset="0"/>
-              </a:rPr>
-              <a:t>, </a:t>
-            </a:r>
-            <a:r>
-              <a:rPr lang="en-US" sz="2000" dirty="0" err="1" smtClean="0">
-                <a:solidFill>
-                  <a:schemeClr val="bg1"/>
-                </a:solidFill>
-                <a:latin typeface="Tahoma" charset="0"/>
-                <a:ea typeface="Tahoma" charset="0"/>
-                <a:cs typeface="Tahoma" charset="0"/>
-              </a:rPr>
-              <a:t>sed</a:t>
-            </a:r>
-            <a:r>
-              <a:rPr lang="en-US" sz="2000" dirty="0" smtClean="0">
-                <a:solidFill>
-                  <a:schemeClr val="bg1"/>
-                </a:solidFill>
-                <a:latin typeface="Tahoma" charset="0"/>
-                <a:ea typeface="Tahoma" charset="0"/>
-                <a:cs typeface="Tahoma" charset="0"/>
-              </a:rPr>
-              <a:t> do </a:t>
-            </a:r>
-            <a:r>
-              <a:rPr lang="en-US" sz="2000" dirty="0" err="1" smtClean="0">
-                <a:solidFill>
-                  <a:schemeClr val="bg1"/>
-                </a:solidFill>
-                <a:latin typeface="Tahoma" charset="0"/>
-                <a:ea typeface="Tahoma" charset="0"/>
-                <a:cs typeface="Tahoma" charset="0"/>
-              </a:rPr>
-              <a:t>eiusmod</a:t>
-            </a:r>
-            <a:r>
-              <a:rPr lang="en-US" sz="2000" dirty="0" smtClean="0">
-                <a:solidFill>
-                  <a:schemeClr val="bg1"/>
-                </a:solidFill>
-                <a:latin typeface="Tahoma" charset="0"/>
-                <a:ea typeface="Tahoma" charset="0"/>
-                <a:cs typeface="Tahoma" charset="0"/>
-              </a:rPr>
-              <a:t> </a:t>
-            </a:r>
-            <a:r>
-              <a:rPr lang="en-US" sz="2000" dirty="0" err="1" smtClean="0">
-                <a:solidFill>
-                  <a:schemeClr val="bg1"/>
-                </a:solidFill>
-                <a:latin typeface="Tahoma" charset="0"/>
-                <a:ea typeface="Tahoma" charset="0"/>
-                <a:cs typeface="Tahoma" charset="0"/>
-              </a:rPr>
-              <a:t>tempor</a:t>
-            </a:r>
-            <a:r>
-              <a:rPr lang="en-US" sz="2000" dirty="0" smtClean="0">
-                <a:solidFill>
-                  <a:schemeClr val="bg1"/>
-                </a:solidFill>
-                <a:latin typeface="Tahoma" charset="0"/>
-                <a:ea typeface="Tahoma" charset="0"/>
-                <a:cs typeface="Tahoma" charset="0"/>
-              </a:rPr>
-              <a:t> </a:t>
-            </a:r>
-            <a:r>
-              <a:rPr lang="en-US" sz="2000" dirty="0" err="1" smtClean="0">
-                <a:solidFill>
-                  <a:schemeClr val="bg1"/>
-                </a:solidFill>
-                <a:latin typeface="Tahoma" charset="0"/>
-                <a:ea typeface="Tahoma" charset="0"/>
-                <a:cs typeface="Tahoma" charset="0"/>
-              </a:rPr>
-              <a:t>incididunt</a:t>
-            </a:r>
-            <a:r>
-              <a:rPr lang="en-US" sz="2000" dirty="0" smtClean="0">
-                <a:solidFill>
-                  <a:schemeClr val="bg1"/>
-                </a:solidFill>
-                <a:latin typeface="Tahoma" charset="0"/>
-                <a:ea typeface="Tahoma" charset="0"/>
-                <a:cs typeface="Tahoma" charset="0"/>
-              </a:rPr>
-              <a:t> </a:t>
-            </a:r>
-            <a:r>
-              <a:rPr lang="en-US" sz="2000" dirty="0" err="1" smtClean="0">
-                <a:solidFill>
-                  <a:schemeClr val="bg1"/>
-                </a:solidFill>
-                <a:latin typeface="Tahoma" charset="0"/>
-                <a:ea typeface="Tahoma" charset="0"/>
-                <a:cs typeface="Tahoma" charset="0"/>
-              </a:rPr>
-              <a:t>ut</a:t>
-            </a:r>
-            <a:r>
-              <a:rPr lang="en-US" sz="2000" dirty="0" smtClean="0">
-                <a:solidFill>
-                  <a:schemeClr val="bg1"/>
-                </a:solidFill>
-                <a:latin typeface="Tahoma" charset="0"/>
-                <a:ea typeface="Tahoma" charset="0"/>
-                <a:cs typeface="Tahoma" charset="0"/>
-              </a:rPr>
-              <a:t> </a:t>
-            </a:r>
-            <a:r>
-              <a:rPr lang="en-US" sz="2000" dirty="0" err="1" smtClean="0">
-                <a:solidFill>
-                  <a:schemeClr val="bg1"/>
-                </a:solidFill>
-                <a:latin typeface="Tahoma" charset="0"/>
-                <a:ea typeface="Tahoma" charset="0"/>
-                <a:cs typeface="Tahoma" charset="0"/>
-              </a:rPr>
-              <a:t>labore</a:t>
-            </a:r>
-            <a:r>
-              <a:rPr lang="en-US" sz="2000" dirty="0" smtClean="0">
-                <a:solidFill>
-                  <a:schemeClr val="bg1"/>
-                </a:solidFill>
-                <a:latin typeface="Tahoma" charset="0"/>
-                <a:ea typeface="Tahoma" charset="0"/>
-                <a:cs typeface="Tahoma" charset="0"/>
-              </a:rPr>
-              <a:t> et </a:t>
-            </a:r>
-            <a:r>
-              <a:rPr lang="en-US" sz="2000" dirty="0" err="1" smtClean="0">
-                <a:solidFill>
-                  <a:schemeClr val="bg1"/>
-                </a:solidFill>
-                <a:latin typeface="Tahoma" charset="0"/>
-                <a:ea typeface="Tahoma" charset="0"/>
-                <a:cs typeface="Tahoma" charset="0"/>
-              </a:rPr>
-              <a:t>dolore</a:t>
-            </a:r>
-            <a:r>
-              <a:rPr lang="en-US" sz="2000" dirty="0" smtClean="0">
-                <a:solidFill>
-                  <a:schemeClr val="bg1"/>
-                </a:solidFill>
-                <a:latin typeface="Tahoma" charset="0"/>
-                <a:ea typeface="Tahoma" charset="0"/>
-                <a:cs typeface="Tahoma" charset="0"/>
-              </a:rPr>
-              <a:t> magna </a:t>
-            </a:r>
-            <a:r>
-              <a:rPr lang="en-US" sz="2000" dirty="0" err="1" smtClean="0">
-                <a:solidFill>
-                  <a:schemeClr val="bg1"/>
-                </a:solidFill>
-                <a:latin typeface="Tahoma" charset="0"/>
-                <a:ea typeface="Tahoma" charset="0"/>
-                <a:cs typeface="Tahoma" charset="0"/>
-              </a:rPr>
-              <a:t>aliqua</a:t>
-            </a:r>
-            <a:r>
-              <a:rPr lang="en-US" sz="2000" dirty="0" smtClean="0">
-                <a:solidFill>
-                  <a:schemeClr val="bg1"/>
-                </a:solidFill>
-                <a:latin typeface="Tahoma" charset="0"/>
-                <a:ea typeface="Tahoma" charset="0"/>
-                <a:cs typeface="Tahoma" charset="0"/>
-              </a:rPr>
-              <a:t>. </a:t>
-            </a:r>
-            <a:r>
-              <a:rPr lang="en-US" sz="2000" dirty="0" err="1" smtClean="0">
-                <a:solidFill>
-                  <a:schemeClr val="bg1"/>
-                </a:solidFill>
-                <a:latin typeface="Tahoma" charset="0"/>
-                <a:ea typeface="Tahoma" charset="0"/>
-                <a:cs typeface="Tahoma" charset="0"/>
-              </a:rPr>
-              <a:t>Ut</a:t>
-            </a:r>
-            <a:r>
-              <a:rPr lang="en-US" sz="2000" dirty="0" smtClean="0">
-                <a:solidFill>
-                  <a:schemeClr val="bg1"/>
-                </a:solidFill>
-                <a:latin typeface="Tahoma" charset="0"/>
-                <a:ea typeface="Tahoma" charset="0"/>
-                <a:cs typeface="Tahoma" charset="0"/>
-              </a:rPr>
-              <a:t> </a:t>
-            </a:r>
-            <a:r>
-              <a:rPr lang="en-US" sz="2000" dirty="0" err="1" smtClean="0">
-                <a:solidFill>
-                  <a:schemeClr val="bg1"/>
-                </a:solidFill>
-                <a:latin typeface="Tahoma" charset="0"/>
-                <a:ea typeface="Tahoma" charset="0"/>
-                <a:cs typeface="Tahoma" charset="0"/>
-              </a:rPr>
-              <a:t>enim</a:t>
-            </a:r>
-            <a:r>
-              <a:rPr lang="en-US" sz="2000" dirty="0" smtClean="0">
-                <a:solidFill>
-                  <a:schemeClr val="bg1"/>
-                </a:solidFill>
-                <a:latin typeface="Tahoma" charset="0"/>
-                <a:ea typeface="Tahoma" charset="0"/>
-                <a:cs typeface="Tahoma" charset="0"/>
-              </a:rPr>
-              <a:t> ad minim </a:t>
-            </a:r>
-            <a:r>
-              <a:rPr lang="en-US" sz="2000" dirty="0" err="1" smtClean="0">
-                <a:solidFill>
-                  <a:schemeClr val="bg1"/>
-                </a:solidFill>
-                <a:latin typeface="Tahoma" charset="0"/>
-                <a:ea typeface="Tahoma" charset="0"/>
-                <a:cs typeface="Tahoma" charset="0"/>
-              </a:rPr>
-              <a:t>veniam</a:t>
-            </a:r>
-            <a:r>
-              <a:rPr lang="en-US" sz="2000" dirty="0" smtClean="0">
-                <a:solidFill>
-                  <a:schemeClr val="bg1"/>
-                </a:solidFill>
-                <a:latin typeface="Tahoma" charset="0"/>
-                <a:ea typeface="Tahoma" charset="0"/>
-                <a:cs typeface="Tahoma" charset="0"/>
-              </a:rPr>
-              <a:t>, </a:t>
-            </a:r>
-            <a:r>
-              <a:rPr lang="en-US" sz="2000" dirty="0" err="1" smtClean="0">
-                <a:solidFill>
-                  <a:schemeClr val="bg1"/>
-                </a:solidFill>
-                <a:latin typeface="Tahoma" charset="0"/>
-                <a:ea typeface="Tahoma" charset="0"/>
-                <a:cs typeface="Tahoma" charset="0"/>
-              </a:rPr>
-              <a:t>quis</a:t>
-            </a:r>
-            <a:r>
-              <a:rPr lang="en-US" sz="2000" dirty="0" smtClean="0">
-                <a:solidFill>
-                  <a:schemeClr val="bg1"/>
-                </a:solidFill>
-                <a:latin typeface="Tahoma" charset="0"/>
-                <a:ea typeface="Tahoma" charset="0"/>
-                <a:cs typeface="Tahoma" charset="0"/>
-              </a:rPr>
-              <a:t> </a:t>
-            </a:r>
-            <a:r>
-              <a:rPr lang="en-US" sz="2000" dirty="0" err="1" smtClean="0">
-                <a:solidFill>
-                  <a:schemeClr val="bg1"/>
-                </a:solidFill>
-                <a:latin typeface="Tahoma" charset="0"/>
-                <a:ea typeface="Tahoma" charset="0"/>
-                <a:cs typeface="Tahoma" charset="0"/>
-              </a:rPr>
-              <a:t>nostrud</a:t>
-            </a:r>
-            <a:r>
-              <a:rPr lang="en-US" sz="2000" dirty="0" smtClean="0">
-                <a:solidFill>
-                  <a:schemeClr val="bg1"/>
-                </a:solidFill>
-                <a:latin typeface="Tahoma" charset="0"/>
-                <a:ea typeface="Tahoma" charset="0"/>
-                <a:cs typeface="Tahoma" charset="0"/>
-              </a:rPr>
-              <a:t> exercitation </a:t>
-            </a:r>
-            <a:r>
-              <a:rPr lang="en-US" sz="2000" dirty="0" err="1" smtClean="0">
-                <a:solidFill>
-                  <a:schemeClr val="bg1"/>
-                </a:solidFill>
-                <a:latin typeface="Tahoma" charset="0"/>
-                <a:ea typeface="Tahoma" charset="0"/>
-                <a:cs typeface="Tahoma" charset="0"/>
-              </a:rPr>
-              <a:t>ullamco</a:t>
-            </a:r>
-            <a:r>
-              <a:rPr lang="en-US" sz="2000" dirty="0" smtClean="0">
-                <a:solidFill>
-                  <a:schemeClr val="bg1"/>
-                </a:solidFill>
-                <a:latin typeface="Tahoma" charset="0"/>
-                <a:ea typeface="Tahoma" charset="0"/>
-                <a:cs typeface="Tahoma" charset="0"/>
-              </a:rPr>
-              <a:t> </a:t>
-            </a:r>
-            <a:r>
-              <a:rPr lang="en-US" sz="2000" dirty="0" err="1" smtClean="0">
-                <a:solidFill>
-                  <a:schemeClr val="bg1"/>
-                </a:solidFill>
-                <a:latin typeface="Tahoma" charset="0"/>
-                <a:ea typeface="Tahoma" charset="0"/>
-                <a:cs typeface="Tahoma" charset="0"/>
-              </a:rPr>
-              <a:t>laboris</a:t>
-            </a:r>
-            <a:r>
-              <a:rPr lang="en-US" sz="2000" dirty="0" smtClean="0">
-                <a:solidFill>
-                  <a:schemeClr val="bg1"/>
-                </a:solidFill>
-                <a:latin typeface="Tahoma" charset="0"/>
-                <a:ea typeface="Tahoma" charset="0"/>
-                <a:cs typeface="Tahoma" charset="0"/>
-              </a:rPr>
-              <a:t> nisi </a:t>
-            </a:r>
-            <a:r>
-              <a:rPr lang="en-US" sz="2000" dirty="0" err="1" smtClean="0">
-                <a:solidFill>
-                  <a:schemeClr val="bg1"/>
-                </a:solidFill>
-                <a:latin typeface="Tahoma" charset="0"/>
-                <a:ea typeface="Tahoma" charset="0"/>
-                <a:cs typeface="Tahoma" charset="0"/>
-              </a:rPr>
-              <a:t>ut</a:t>
-            </a:r>
-            <a:r>
-              <a:rPr lang="en-US" sz="2000" dirty="0" smtClean="0">
-                <a:solidFill>
-                  <a:schemeClr val="bg1"/>
-                </a:solidFill>
-                <a:latin typeface="Tahoma" charset="0"/>
-                <a:ea typeface="Tahoma" charset="0"/>
-                <a:cs typeface="Tahoma" charset="0"/>
-              </a:rPr>
-              <a:t> </a:t>
-            </a:r>
-            <a:r>
-              <a:rPr lang="en-US" sz="2000" dirty="0" err="1" smtClean="0">
-                <a:solidFill>
-                  <a:schemeClr val="bg1"/>
-                </a:solidFill>
-                <a:latin typeface="Tahoma" charset="0"/>
-                <a:ea typeface="Tahoma" charset="0"/>
-                <a:cs typeface="Tahoma" charset="0"/>
-              </a:rPr>
-              <a:t>aliquip</a:t>
-            </a:r>
-            <a:r>
-              <a:rPr lang="en-US" sz="2000" dirty="0" smtClean="0">
-                <a:solidFill>
-                  <a:schemeClr val="bg1"/>
-                </a:solidFill>
-                <a:latin typeface="Tahoma" charset="0"/>
-                <a:ea typeface="Tahoma" charset="0"/>
-                <a:cs typeface="Tahoma" charset="0"/>
-              </a:rPr>
-              <a:t> ex </a:t>
-            </a:r>
-            <a:r>
-              <a:rPr lang="en-US" sz="2000" dirty="0" err="1" smtClean="0">
-                <a:solidFill>
-                  <a:schemeClr val="bg1"/>
-                </a:solidFill>
-                <a:latin typeface="Tahoma" charset="0"/>
-                <a:ea typeface="Tahoma" charset="0"/>
-                <a:cs typeface="Tahoma" charset="0"/>
-              </a:rPr>
-              <a:t>ea</a:t>
-            </a:r>
-            <a:r>
-              <a:rPr lang="en-US" sz="2000" dirty="0" smtClean="0">
-                <a:solidFill>
-                  <a:schemeClr val="bg1"/>
-                </a:solidFill>
-                <a:latin typeface="Tahoma" charset="0"/>
-                <a:ea typeface="Tahoma" charset="0"/>
-                <a:cs typeface="Tahoma" charset="0"/>
-              </a:rPr>
-              <a:t> </a:t>
-            </a:r>
-            <a:r>
-              <a:rPr lang="en-US" sz="2000" dirty="0" err="1" smtClean="0">
-                <a:solidFill>
-                  <a:schemeClr val="bg1"/>
-                </a:solidFill>
-                <a:latin typeface="Tahoma" charset="0"/>
-                <a:ea typeface="Tahoma" charset="0"/>
-                <a:cs typeface="Tahoma" charset="0"/>
-              </a:rPr>
-              <a:t>commodo</a:t>
-            </a:r>
-            <a:r>
-              <a:rPr lang="en-US" sz="2000" dirty="0" smtClean="0">
-                <a:solidFill>
-                  <a:schemeClr val="bg1"/>
-                </a:solidFill>
-                <a:latin typeface="Tahoma" charset="0"/>
-                <a:ea typeface="Tahoma" charset="0"/>
-                <a:cs typeface="Tahoma" charset="0"/>
-              </a:rPr>
-              <a:t> </a:t>
-            </a:r>
-            <a:r>
-              <a:rPr lang="en-US" sz="2000" dirty="0" err="1" smtClean="0">
-                <a:solidFill>
-                  <a:schemeClr val="bg1"/>
-                </a:solidFill>
-                <a:latin typeface="Tahoma" charset="0"/>
-                <a:ea typeface="Tahoma" charset="0"/>
-                <a:cs typeface="Tahoma" charset="0"/>
-              </a:rPr>
-              <a:t>consequat</a:t>
-            </a:r>
-            <a:r>
-              <a:rPr lang="en-US" sz="2000" dirty="0" smtClean="0">
-                <a:solidFill>
-                  <a:schemeClr val="bg1"/>
-                </a:solidFill>
-                <a:latin typeface="Tahoma" charset="0"/>
-                <a:ea typeface="Tahoma" charset="0"/>
-                <a:cs typeface="Tahoma" charset="0"/>
-              </a:rPr>
-              <a:t> </a:t>
-            </a:r>
-            <a:r>
-              <a:rPr lang="en-US" sz="2000" dirty="0" err="1">
-                <a:solidFill>
-                  <a:schemeClr val="bg1"/>
-                </a:solidFill>
-                <a:latin typeface="Tahoma" charset="0"/>
-                <a:ea typeface="Tahoma" charset="0"/>
-                <a:cs typeface="Tahoma" charset="0"/>
-              </a:rPr>
-              <a:t>eiusmod</a:t>
-            </a:r>
-            <a:r>
-              <a:rPr lang="en-US" sz="2000" dirty="0">
-                <a:solidFill>
-                  <a:schemeClr val="bg1"/>
-                </a:solidFill>
-                <a:latin typeface="Tahoma" charset="0"/>
-                <a:ea typeface="Tahoma" charset="0"/>
-                <a:cs typeface="Tahoma" charset="0"/>
-              </a:rPr>
-              <a:t> </a:t>
-            </a:r>
-            <a:r>
-              <a:rPr lang="en-US" sz="2000" dirty="0" err="1">
-                <a:solidFill>
-                  <a:schemeClr val="bg1"/>
-                </a:solidFill>
-                <a:latin typeface="Tahoma" charset="0"/>
-                <a:ea typeface="Tahoma" charset="0"/>
-                <a:cs typeface="Tahoma" charset="0"/>
-              </a:rPr>
-              <a:t>tempor</a:t>
-            </a:r>
-            <a:r>
-              <a:rPr lang="en-US" sz="2000" dirty="0">
-                <a:solidFill>
-                  <a:schemeClr val="bg1"/>
-                </a:solidFill>
-                <a:latin typeface="Tahoma" charset="0"/>
-                <a:ea typeface="Tahoma" charset="0"/>
-                <a:cs typeface="Tahoma" charset="0"/>
-              </a:rPr>
-              <a:t> </a:t>
-            </a:r>
-            <a:r>
-              <a:rPr lang="en-US" sz="2000" dirty="0" err="1">
-                <a:solidFill>
-                  <a:schemeClr val="bg1"/>
-                </a:solidFill>
-                <a:latin typeface="Tahoma" charset="0"/>
-                <a:ea typeface="Tahoma" charset="0"/>
-                <a:cs typeface="Tahoma" charset="0"/>
-              </a:rPr>
-              <a:t>incididunt</a:t>
-            </a:r>
-            <a:r>
-              <a:rPr lang="en-US" sz="2000" dirty="0">
-                <a:solidFill>
-                  <a:schemeClr val="bg1"/>
-                </a:solidFill>
-                <a:latin typeface="Tahoma" charset="0"/>
-                <a:ea typeface="Tahoma" charset="0"/>
-                <a:cs typeface="Tahoma" charset="0"/>
-              </a:rPr>
-              <a:t> </a:t>
-            </a:r>
-            <a:r>
-              <a:rPr lang="en-US" sz="2000" dirty="0" err="1">
-                <a:solidFill>
-                  <a:schemeClr val="bg1"/>
-                </a:solidFill>
-                <a:latin typeface="Tahoma" charset="0"/>
-                <a:ea typeface="Tahoma" charset="0"/>
-                <a:cs typeface="Tahoma" charset="0"/>
-              </a:rPr>
-              <a:t>ut</a:t>
-            </a:r>
-            <a:r>
-              <a:rPr lang="en-US" sz="2000" dirty="0">
-                <a:solidFill>
-                  <a:schemeClr val="bg1"/>
-                </a:solidFill>
-                <a:latin typeface="Tahoma" charset="0"/>
-                <a:ea typeface="Tahoma" charset="0"/>
-                <a:cs typeface="Tahoma" charset="0"/>
-              </a:rPr>
-              <a:t> </a:t>
-            </a:r>
-            <a:r>
-              <a:rPr lang="en-US" sz="2000" dirty="0" err="1">
-                <a:solidFill>
-                  <a:schemeClr val="bg1"/>
-                </a:solidFill>
-                <a:latin typeface="Tahoma" charset="0"/>
-                <a:ea typeface="Tahoma" charset="0"/>
-                <a:cs typeface="Tahoma" charset="0"/>
-              </a:rPr>
-              <a:t>labore</a:t>
-            </a:r>
-            <a:r>
-              <a:rPr lang="en-US" sz="2000" dirty="0">
-                <a:solidFill>
-                  <a:schemeClr val="bg1"/>
-                </a:solidFill>
-                <a:latin typeface="Tahoma" charset="0"/>
-                <a:ea typeface="Tahoma" charset="0"/>
-                <a:cs typeface="Tahoma" charset="0"/>
-              </a:rPr>
-              <a:t> </a:t>
-            </a:r>
-            <a:r>
-              <a:rPr lang="en-US" sz="2000" dirty="0" err="1">
-                <a:solidFill>
-                  <a:schemeClr val="bg1"/>
-                </a:solidFill>
-                <a:latin typeface="Tahoma" charset="0"/>
-                <a:ea typeface="Tahoma" charset="0"/>
-                <a:cs typeface="Tahoma" charset="0"/>
-              </a:rPr>
-              <a:t>adipiscing</a:t>
-            </a:r>
-            <a:r>
-              <a:rPr lang="en-US" sz="2000" dirty="0">
-                <a:solidFill>
-                  <a:schemeClr val="bg1"/>
-                </a:solidFill>
-                <a:latin typeface="Tahoma" charset="0"/>
-                <a:ea typeface="Tahoma" charset="0"/>
-                <a:cs typeface="Tahoma" charset="0"/>
-              </a:rPr>
-              <a:t> </a:t>
-            </a:r>
-            <a:r>
-              <a:rPr lang="en-US" sz="2000" dirty="0" err="1">
-                <a:solidFill>
-                  <a:schemeClr val="bg1"/>
-                </a:solidFill>
-                <a:latin typeface="Tahoma" charset="0"/>
-                <a:ea typeface="Tahoma" charset="0"/>
-                <a:cs typeface="Tahoma" charset="0"/>
-              </a:rPr>
-              <a:t>elit</a:t>
-            </a:r>
-            <a:r>
-              <a:rPr lang="en-US" sz="2000" dirty="0">
-                <a:solidFill>
-                  <a:schemeClr val="bg1"/>
-                </a:solidFill>
-                <a:latin typeface="Tahoma" charset="0"/>
-                <a:ea typeface="Tahoma" charset="0"/>
-                <a:cs typeface="Tahoma" charset="0"/>
-              </a:rPr>
-              <a:t>, </a:t>
-            </a:r>
-            <a:r>
-              <a:rPr lang="en-US" sz="2000" dirty="0" err="1">
-                <a:solidFill>
-                  <a:schemeClr val="bg1"/>
-                </a:solidFill>
-                <a:latin typeface="Tahoma" charset="0"/>
-                <a:ea typeface="Tahoma" charset="0"/>
-                <a:cs typeface="Tahoma" charset="0"/>
-              </a:rPr>
-              <a:t>sed</a:t>
-            </a:r>
-            <a:r>
-              <a:rPr lang="en-US" sz="2000" dirty="0">
-                <a:solidFill>
-                  <a:schemeClr val="bg1"/>
-                </a:solidFill>
-                <a:latin typeface="Tahoma" charset="0"/>
-                <a:ea typeface="Tahoma" charset="0"/>
-                <a:cs typeface="Tahoma" charset="0"/>
-              </a:rPr>
-              <a:t> do </a:t>
-            </a:r>
-            <a:r>
-              <a:rPr lang="en-US" sz="2000" dirty="0" err="1">
-                <a:solidFill>
-                  <a:schemeClr val="bg1"/>
-                </a:solidFill>
-                <a:latin typeface="Tahoma" charset="0"/>
-                <a:ea typeface="Tahoma" charset="0"/>
-                <a:cs typeface="Tahoma" charset="0"/>
-              </a:rPr>
-              <a:t>eiusmod</a:t>
-            </a:r>
-            <a:r>
-              <a:rPr lang="en-US" sz="2000" dirty="0">
-                <a:solidFill>
-                  <a:schemeClr val="bg1"/>
-                </a:solidFill>
-                <a:latin typeface="Tahoma" charset="0"/>
-                <a:ea typeface="Tahoma" charset="0"/>
-                <a:cs typeface="Tahoma" charset="0"/>
-              </a:rPr>
-              <a:t> </a:t>
-            </a:r>
-            <a:r>
-              <a:rPr lang="en-US" sz="2000" dirty="0" err="1">
-                <a:solidFill>
-                  <a:schemeClr val="bg1"/>
-                </a:solidFill>
-                <a:latin typeface="Tahoma" charset="0"/>
-                <a:ea typeface="Tahoma" charset="0"/>
-                <a:cs typeface="Tahoma" charset="0"/>
-              </a:rPr>
-              <a:t>tempor</a:t>
-            </a:r>
-            <a:r>
-              <a:rPr lang="en-US" sz="2000" dirty="0">
-                <a:solidFill>
-                  <a:schemeClr val="bg1"/>
-                </a:solidFill>
-                <a:latin typeface="Tahoma" charset="0"/>
-                <a:ea typeface="Tahoma" charset="0"/>
-                <a:cs typeface="Tahoma" charset="0"/>
-              </a:rPr>
-              <a:t> </a:t>
-            </a:r>
-            <a:r>
-              <a:rPr lang="en-US" sz="2000" dirty="0" err="1">
-                <a:solidFill>
-                  <a:schemeClr val="bg1"/>
-                </a:solidFill>
-                <a:latin typeface="Tahoma" charset="0"/>
-                <a:ea typeface="Tahoma" charset="0"/>
-                <a:cs typeface="Tahoma" charset="0"/>
-              </a:rPr>
-              <a:t>incididunt</a:t>
-            </a:r>
-            <a:r>
-              <a:rPr lang="en-US" sz="2000" dirty="0">
-                <a:solidFill>
-                  <a:schemeClr val="bg1"/>
-                </a:solidFill>
-                <a:latin typeface="Tahoma" charset="0"/>
-                <a:ea typeface="Tahoma" charset="0"/>
-                <a:cs typeface="Tahoma" charset="0"/>
-              </a:rPr>
-              <a:t> </a:t>
-            </a:r>
-            <a:r>
-              <a:rPr lang="en-US" sz="2000" dirty="0" err="1">
-                <a:solidFill>
-                  <a:schemeClr val="bg1"/>
-                </a:solidFill>
-                <a:latin typeface="Tahoma" charset="0"/>
-                <a:ea typeface="Tahoma" charset="0"/>
-                <a:cs typeface="Tahoma" charset="0"/>
-              </a:rPr>
-              <a:t>ut</a:t>
-            </a:r>
-            <a:r>
-              <a:rPr lang="en-US" sz="2000" dirty="0">
-                <a:solidFill>
-                  <a:schemeClr val="bg1"/>
-                </a:solidFill>
-                <a:latin typeface="Tahoma" charset="0"/>
-                <a:ea typeface="Tahoma" charset="0"/>
-                <a:cs typeface="Tahoma" charset="0"/>
-              </a:rPr>
-              <a:t> </a:t>
-            </a:r>
-            <a:r>
-              <a:rPr lang="en-US" sz="2000" dirty="0" err="1">
-                <a:solidFill>
-                  <a:schemeClr val="bg1"/>
-                </a:solidFill>
-                <a:latin typeface="Tahoma" charset="0"/>
-                <a:ea typeface="Tahoma" charset="0"/>
-                <a:cs typeface="Tahoma" charset="0"/>
-              </a:rPr>
-              <a:t>labore</a:t>
-            </a:r>
-            <a:r>
-              <a:rPr lang="en-US" sz="2000" dirty="0">
-                <a:solidFill>
-                  <a:schemeClr val="bg1"/>
-                </a:solidFill>
-                <a:latin typeface="Tahoma" charset="0"/>
-                <a:ea typeface="Tahoma" charset="0"/>
-                <a:cs typeface="Tahoma" charset="0"/>
-              </a:rPr>
-              <a:t> et </a:t>
-            </a:r>
-            <a:r>
-              <a:rPr lang="en-US" sz="2000" dirty="0" err="1">
-                <a:solidFill>
-                  <a:schemeClr val="bg1"/>
-                </a:solidFill>
-                <a:latin typeface="Tahoma" charset="0"/>
-                <a:ea typeface="Tahoma" charset="0"/>
-                <a:cs typeface="Tahoma" charset="0"/>
-              </a:rPr>
-              <a:t>dolore</a:t>
-            </a:r>
-            <a:r>
-              <a:rPr lang="en-US" sz="2000" dirty="0">
-                <a:solidFill>
-                  <a:schemeClr val="bg1"/>
-                </a:solidFill>
-                <a:latin typeface="Tahoma" charset="0"/>
-                <a:ea typeface="Tahoma" charset="0"/>
-                <a:cs typeface="Tahoma" charset="0"/>
-              </a:rPr>
-              <a:t> </a:t>
-            </a:r>
-            <a:r>
-              <a:rPr lang="en-US" sz="2000" dirty="0" smtClean="0">
-                <a:solidFill>
-                  <a:schemeClr val="bg1"/>
-                </a:solidFill>
-                <a:latin typeface="Tahoma" charset="0"/>
-                <a:ea typeface="Tahoma" charset="0"/>
-                <a:cs typeface="Tahoma" charset="0"/>
-              </a:rPr>
-              <a:t>magna.</a:t>
-            </a:r>
-            <a:endParaRPr lang="en-US" sz="2000" dirty="0">
-              <a:solidFill>
-                <a:schemeClr val="bg1"/>
-              </a:solidFill>
-              <a:latin typeface="Tahoma" charset="0"/>
-              <a:ea typeface="Tahoma" charset="0"/>
-              <a:cs typeface="Tahoma" charset="0"/>
-            </a:endParaRPr>
-          </a:p>
-        </p:txBody>
-      </p:sp>
-      <p:sp>
-        <p:nvSpPr>
           <p:cNvPr id="25" name="Rectangle 24"/>
           <p:cNvSpPr/>
           <p:nvPr/>
         </p:nvSpPr>
         <p:spPr>
           <a:xfrm>
-            <a:off x="5030788" y="3384947"/>
-            <a:ext cx="228600" cy="12801600"/>
+            <a:off x="15914776" y="3384375"/>
+            <a:ext cx="228600" cy="2971800"/>
           </a:xfrm>
           <a:prstGeom prst="rect">
             <a:avLst/>
           </a:prstGeom>
           <a:solidFill>
-            <a:schemeClr val="bg1"/>
+            <a:schemeClr val="tx1"/>
           </a:solidFill>
           <a:ln>
             <a:solidFill>
@@ -8458,66 +7370,24 @@
       </p:sp>
       <p:sp>
         <p:nvSpPr>
-          <p:cNvPr id="26" name="TextBox 25"/>
-          <p:cNvSpPr txBox="1"/>
+          <p:cNvPr id="43" name="Rectangle 42"/>
+          <p:cNvSpPr/>
           <p:nvPr/>
         </p:nvSpPr>
         <p:spPr>
           <a:xfrm>
-            <a:off x="5282596" y="3456955"/>
-            <a:ext cx="4687027" cy="553998"/>
+            <a:off x="18981403" y="16202371"/>
+            <a:ext cx="228600" cy="2057400"/>
           </a:xfrm>
           <a:prstGeom prst="rect">
             <a:avLst/>
           </a:prstGeom>
-          <a:noFill/>
-          <a:ln>
-            <a:solidFill>
-              <a:srgbClr val="00B050"/>
-            </a:solidFill>
-          </a:ln>
-        </p:spPr>
-        <p:txBody>
-          <a:bodyPr wrap="square" lIns="0" tIns="0" rIns="0" bIns="0" rtlCol="0">
-            <a:spAutoFit/>
-          </a:bodyPr>
-          <a:lstStyle/>
-          <a:p>
-            <a:pPr algn="ctr"/>
-            <a:r>
-              <a:rPr lang="en-US" dirty="0" smtClean="0">
-                <a:solidFill>
-                  <a:srgbClr val="607890"/>
-                </a:solidFill>
-                <a:latin typeface="Corbel" charset="0"/>
-                <a:ea typeface="Corbel" charset="0"/>
-                <a:cs typeface="Corbel" charset="0"/>
-              </a:rPr>
-              <a:t>Components</a:t>
-            </a:r>
-          </a:p>
-        </p:txBody>
-      </p:sp>
-      <p:sp>
-        <p:nvSpPr>
-          <p:cNvPr id="6" name="5-Point Star 5"/>
-          <p:cNvSpPr/>
-          <p:nvPr/>
-        </p:nvSpPr>
-        <p:spPr>
-          <a:xfrm>
-            <a:off x="5577135" y="4393059"/>
-            <a:ext cx="432048" cy="432048"/>
-          </a:xfrm>
-          <a:prstGeom prst="star5">
-            <a:avLst/>
-          </a:prstGeom>
           <a:solidFill>
-            <a:srgbClr val="8E9E82"/>
+            <a:schemeClr val="tx1"/>
           </a:solidFill>
           <a:ln>
             <a:solidFill>
-              <a:srgbClr val="8E9E82"/>
+              <a:schemeClr val="bg1"/>
             </a:solidFill>
           </a:ln>
         </p:spPr>
@@ -8548,24 +7418,24 @@
       </p:sp>
       <p:sp>
         <p:nvSpPr>
-          <p:cNvPr id="28" name="5-Point Star 27"/>
+          <p:cNvPr id="37" name="Rectangle 36"/>
           <p:cNvSpPr/>
           <p:nvPr/>
         </p:nvSpPr>
         <p:spPr>
           <a:xfrm>
-            <a:off x="5721151" y="4969123"/>
-            <a:ext cx="432048" cy="432048"/>
-          </a:xfrm>
-          <a:prstGeom prst="star5">
+            <a:off x="10883988" y="11377263"/>
+            <a:ext cx="10287000" cy="228600"/>
+          </a:xfrm>
+          <a:prstGeom prst="rect">
             <a:avLst/>
           </a:prstGeom>
           <a:solidFill>
-            <a:srgbClr val="8E9E82"/>
+            <a:schemeClr val="tx1"/>
           </a:solidFill>
           <a:ln>
             <a:solidFill>
-              <a:srgbClr val="8E9E82"/>
+              <a:schemeClr val="bg1"/>
             </a:solidFill>
           </a:ln>
         </p:spPr>
@@ -8596,25 +7466,26 @@
       </p:sp>
       <p:sp>
         <p:nvSpPr>
-          <p:cNvPr id="29" name="5-Point Star 28"/>
+          <p:cNvPr id="48" name="Rounded Rectangle 47"/>
           <p:cNvSpPr/>
           <p:nvPr/>
         </p:nvSpPr>
         <p:spPr>
           <a:xfrm>
-            <a:off x="6729263" y="4321051"/>
-            <a:ext cx="432048" cy="432048"/>
-          </a:xfrm>
-          <a:prstGeom prst="star5">
+            <a:off x="320551" y="16274379"/>
+            <a:ext cx="7776864" cy="1800200"/>
+          </a:xfrm>
+          <a:prstGeom prst="roundRect">
             <a:avLst/>
           </a:prstGeom>
           <a:solidFill>
-            <a:srgbClr val="8E9E82"/>
+            <a:srgbClr val="73626E"/>
           </a:solidFill>
-          <a:ln>
+          <a:ln cap="rnd">
             <a:solidFill>
-              <a:srgbClr val="8E9E82"/>
+              <a:srgbClr val="73626E"/>
             </a:solidFill>
+            <a:prstDash val="solid"/>
           </a:ln>
         </p:spPr>
         <p:style>
@@ -8644,25 +7515,26 @@
       </p:sp>
       <p:sp>
         <p:nvSpPr>
-          <p:cNvPr id="30" name="5-Point Star 29"/>
+          <p:cNvPr id="47" name="Rounded Rectangle 46"/>
           <p:cNvSpPr/>
           <p:nvPr/>
         </p:nvSpPr>
         <p:spPr>
           <a:xfrm>
-            <a:off x="8169423" y="4609083"/>
-            <a:ext cx="432048" cy="432048"/>
-          </a:xfrm>
-          <a:prstGeom prst="star5">
+            <a:off x="284548" y="11665867"/>
+            <a:ext cx="9757084" cy="4248472"/>
+          </a:xfrm>
+          <a:prstGeom prst="roundRect">
             <a:avLst/>
           </a:prstGeom>
           <a:solidFill>
-            <a:srgbClr val="8E9E82"/>
+            <a:srgbClr val="73626E"/>
           </a:solidFill>
-          <a:ln>
+          <a:ln cap="rnd">
             <a:solidFill>
-              <a:srgbClr val="8E9E82"/>
+              <a:srgbClr val="73626E"/>
             </a:solidFill>
+            <a:prstDash val="solid"/>
           </a:ln>
         </p:spPr>
         <p:style>
@@ -8692,25 +7564,26 @@
       </p:sp>
       <p:sp>
         <p:nvSpPr>
-          <p:cNvPr id="31" name="5-Point Star 30"/>
+          <p:cNvPr id="46" name="Rounded Rectangle 45"/>
           <p:cNvSpPr/>
           <p:nvPr/>
         </p:nvSpPr>
         <p:spPr>
           <a:xfrm>
-            <a:off x="7089303" y="5113139"/>
-            <a:ext cx="432048" cy="432048"/>
-          </a:xfrm>
-          <a:prstGeom prst="star5">
+            <a:off x="320551" y="6625307"/>
+            <a:ext cx="9649072" cy="4680520"/>
+          </a:xfrm>
+          <a:prstGeom prst="roundRect">
             <a:avLst/>
           </a:prstGeom>
           <a:solidFill>
-            <a:srgbClr val="8E9E82"/>
+            <a:srgbClr val="73626E"/>
           </a:solidFill>
-          <a:ln>
+          <a:ln cap="rnd">
             <a:solidFill>
-              <a:srgbClr val="8E9E82"/>
+              <a:srgbClr val="73626E"/>
             </a:solidFill>
+            <a:prstDash val="solid"/>
           </a:ln>
         </p:spPr>
         <p:style>
@@ -8740,25 +7613,26 @@
       </p:sp>
       <p:sp>
         <p:nvSpPr>
-          <p:cNvPr id="32" name="5-Point Star 31"/>
+          <p:cNvPr id="42" name="Rounded Rectangle 41"/>
           <p:cNvSpPr/>
           <p:nvPr/>
         </p:nvSpPr>
         <p:spPr>
           <a:xfrm>
-            <a:off x="8745487" y="5401171"/>
-            <a:ext cx="432048" cy="432048"/>
-          </a:xfrm>
-          <a:prstGeom prst="star5">
+            <a:off x="320551" y="3528963"/>
+            <a:ext cx="4680520" cy="2808312"/>
+          </a:xfrm>
+          <a:prstGeom prst="roundRect">
             <a:avLst/>
           </a:prstGeom>
           <a:solidFill>
-            <a:srgbClr val="8E9E82"/>
+            <a:srgbClr val="73626E"/>
           </a:solidFill>
-          <a:ln>
+          <a:ln cap="rnd">
             <a:solidFill>
-              <a:srgbClr val="8E9E82"/>
+              <a:srgbClr val="73626E"/>
             </a:solidFill>
+            <a:prstDash val="solid"/>
           </a:ln>
         </p:spPr>
         <p:style>
@@ -8788,23 +7662,116 @@
       </p:sp>
       <p:sp>
         <p:nvSpPr>
-          <p:cNvPr id="33" name="TextBox 32"/>
+          <p:cNvPr id="17" name="Rounded Rectangle 16"/>
+          <p:cNvSpPr/>
+          <p:nvPr/>
+        </p:nvSpPr>
+        <p:spPr>
+          <a:xfrm>
+            <a:off x="5361111" y="3456955"/>
+            <a:ext cx="4680520" cy="2808312"/>
+          </a:xfrm>
+          <a:prstGeom prst="roundRect">
+            <a:avLst/>
+          </a:prstGeom>
+          <a:solidFill>
+            <a:srgbClr val="73626E"/>
+          </a:solidFill>
+          <a:ln cap="rnd">
+            <a:solidFill>
+              <a:srgbClr val="73626E"/>
+            </a:solidFill>
+            <a:prstDash val="solid"/>
+          </a:ln>
+        </p:spPr>
+        <p:style>
+          <a:lnRef idx="2">
+            <a:schemeClr val="accent1">
+              <a:shade val="50000"/>
+            </a:schemeClr>
+          </a:lnRef>
+          <a:fillRef idx="1">
+            <a:schemeClr val="accent1"/>
+          </a:fillRef>
+          <a:effectRef idx="0">
+            <a:schemeClr val="accent1"/>
+          </a:effectRef>
+          <a:fontRef idx="minor">
+            <a:schemeClr val="lt1"/>
+          </a:fontRef>
+        </p:style>
+        <p:txBody>
+          <a:bodyPr rtlCol="0" anchor="ctr"/>
+          <a:lstStyle/>
+          <a:p>
+            <a:pPr algn="ctr"/>
+            <a:endParaRPr lang="en-US"/>
+          </a:p>
+        </p:txBody>
+      </p:sp>
+      <p:sp>
+        <p:nvSpPr>
+          <p:cNvPr id="7" name="TextBox 6"/>
           <p:cNvSpPr txBox="1"/>
           <p:nvPr/>
         </p:nvSpPr>
         <p:spPr>
           <a:xfrm>
-            <a:off x="320550" y="6553299"/>
-            <a:ext cx="4680521" cy="553998"/>
+            <a:off x="8625343" y="0"/>
+            <a:ext cx="1688704" cy="1446550"/>
+          </a:xfrm>
+          <a:prstGeom prst="rect">
+            <a:avLst/>
+          </a:prstGeom>
+          <a:solidFill>
+            <a:schemeClr val="bg1">
+              <a:lumMod val="85000"/>
+            </a:schemeClr>
+          </a:solidFill>
+        </p:spPr>
+        <p:txBody>
+          <a:bodyPr wrap="square" rtlCol="0">
+            <a:spAutoFit/>
+          </a:bodyPr>
+          <a:lstStyle/>
+          <a:p>
+            <a:pPr algn="ctr"/>
+            <a:endParaRPr lang="en-AU" sz="2800" dirty="0" smtClean="0"/>
+          </a:p>
+          <a:p>
+            <a:pPr algn="ctr"/>
+            <a:r>
+              <a:rPr lang="en-AU" sz="3200" b="1" dirty="0" smtClean="0"/>
+              <a:t>115</a:t>
+            </a:r>
+          </a:p>
+          <a:p>
+            <a:pPr algn="ctr"/>
+            <a:endParaRPr lang="en-AU" sz="2800" dirty="0" smtClean="0">
+              <a:solidFill>
+                <a:schemeClr val="bg1"/>
+              </a:solidFill>
+            </a:endParaRPr>
+          </a:p>
+        </p:txBody>
+      </p:sp>
+      <p:sp>
+        <p:nvSpPr>
+          <p:cNvPr id="3" name="TextBox 2"/>
+          <p:cNvSpPr txBox="1"/>
+          <p:nvPr/>
+        </p:nvSpPr>
+        <p:spPr>
+          <a:xfrm>
+            <a:off x="320552" y="1080691"/>
+            <a:ext cx="9649072" cy="2154436"/>
           </a:xfrm>
           <a:prstGeom prst="rect">
             <a:avLst/>
           </a:prstGeom>
           <a:noFill/>
           <a:ln>
-            <a:solidFill>
-              <a:srgbClr val="00B050"/>
-            </a:solidFill>
+            <a:noFill/>
           </a:ln>
         </p:spPr>
         <p:txBody>
@@ -8813,40 +7780,56 @@
           </a:bodyPr>
           <a:lstStyle/>
           <a:p>
-            <a:pPr algn="ctr"/>
-            <a:r>
-              <a:rPr lang="en-US" dirty="0" smtClean="0">
-                <a:solidFill>
-                  <a:srgbClr val="607890"/>
+            <a:r>
+              <a:rPr lang="en-US" sz="8000" dirty="0" smtClean="0">
+                <a:solidFill>
+                  <a:srgbClr val="F2F0DF"/>
                 </a:solidFill>
                 <a:latin typeface="Corbel" charset="0"/>
                 <a:ea typeface="Corbel" charset="0"/>
                 <a:cs typeface="Corbel" charset="0"/>
               </a:rPr>
-              <a:t>DH Workflows</a:t>
-            </a:r>
-          </a:p>
-        </p:txBody>
-      </p:sp>
-      <p:sp>
-        <p:nvSpPr>
-          <p:cNvPr id="34" name="TextBox 33"/>
+              <a:t>Charon</a:t>
+            </a:r>
+            <a:r>
+              <a:rPr lang="en-US" sz="6000" dirty="0" smtClean="0">
+                <a:solidFill>
+                  <a:srgbClr val="F2F0DF"/>
+                </a:solidFill>
+                <a:latin typeface="Corbel" charset="0"/>
+                <a:ea typeface="Corbel" charset="0"/>
+                <a:cs typeface="Corbel" charset="0"/>
+              </a:rPr>
+              <a:t>: Workflow Support for Digital Humanities Projects</a:t>
+            </a:r>
+            <a:endParaRPr lang="en-US" sz="6000" dirty="0">
+              <a:solidFill>
+                <a:srgbClr val="F2F0DF"/>
+              </a:solidFill>
+              <a:latin typeface="Corbel" charset="0"/>
+              <a:ea typeface="Corbel" charset="0"/>
+              <a:cs typeface="Corbel" charset="0"/>
+            </a:endParaRPr>
+          </a:p>
+        </p:txBody>
+      </p:sp>
+      <p:sp>
+        <p:nvSpPr>
+          <p:cNvPr id="19" name="TextBox 18"/>
           <p:cNvSpPr txBox="1"/>
           <p:nvPr/>
         </p:nvSpPr>
         <p:spPr>
           <a:xfrm>
-            <a:off x="5289103" y="6553299"/>
-            <a:ext cx="4824538" cy="553998"/>
+            <a:off x="320552" y="288603"/>
+            <a:ext cx="9649072" cy="800219"/>
           </a:xfrm>
           <a:prstGeom prst="rect">
             <a:avLst/>
           </a:prstGeom>
           <a:noFill/>
           <a:ln>
-            <a:solidFill>
-              <a:srgbClr val="00B050"/>
-            </a:solidFill>
+            <a:noFill/>
           </a:ln>
         </p:spPr>
         <p:txBody>
@@ -8855,40 +7838,69 @@
           </a:bodyPr>
           <a:lstStyle/>
           <a:p>
-            <a:pPr algn="ctr"/>
-            <a:r>
-              <a:rPr lang="en-US" dirty="0" smtClean="0">
-                <a:solidFill>
-                  <a:srgbClr val="607890"/>
+            <a:r>
+              <a:rPr lang="en-US" sz="2600" dirty="0">
+                <a:solidFill>
+                  <a:schemeClr val="bg1"/>
                 </a:solidFill>
                 <a:latin typeface="Corbel" charset="0"/>
                 <a:ea typeface="Corbel" charset="0"/>
                 <a:cs typeface="Corbel" charset="0"/>
               </a:rPr>
-              <a:t>User Roles</a:t>
-            </a:r>
-          </a:p>
-        </p:txBody>
-      </p:sp>
-      <p:sp>
-        <p:nvSpPr>
-          <p:cNvPr id="35" name="TextBox 34"/>
+              <a:t>Sarah Sweeney, </a:t>
+            </a:r>
+            <a:r>
+              <a:rPr lang="en-US" sz="2600" dirty="0" err="1">
+                <a:solidFill>
+                  <a:schemeClr val="bg1"/>
+                </a:solidFill>
+                <a:latin typeface="Corbel" charset="0"/>
+                <a:ea typeface="Corbel" charset="0"/>
+                <a:cs typeface="Corbel" charset="0"/>
+              </a:rPr>
+              <a:t>sj.sweeney@northeastern.edu</a:t>
+            </a:r>
+            <a:endParaRPr lang="en-US" sz="2600" dirty="0">
+              <a:solidFill>
+                <a:schemeClr val="bg1"/>
+              </a:solidFill>
+              <a:latin typeface="Corbel" charset="0"/>
+              <a:ea typeface="Corbel" charset="0"/>
+              <a:cs typeface="Corbel" charset="0"/>
+            </a:endParaRPr>
+          </a:p>
+          <a:p>
+            <a:r>
+              <a:rPr lang="en-US" sz="2600" dirty="0" smtClean="0">
+                <a:solidFill>
+                  <a:schemeClr val="bg1"/>
+                </a:solidFill>
+                <a:latin typeface="Corbel" charset="0"/>
+                <a:ea typeface="Corbel" charset="0"/>
+                <a:cs typeface="Corbel" charset="0"/>
+              </a:rPr>
+              <a:t>Northeastern University Libraries, Digital Scholarship Group</a:t>
+            </a:r>
+          </a:p>
+        </p:txBody>
+      </p:sp>
+      <p:sp>
+        <p:nvSpPr>
+          <p:cNvPr id="24" name="TextBox 23"/>
           <p:cNvSpPr txBox="1"/>
           <p:nvPr/>
         </p:nvSpPr>
         <p:spPr>
           <a:xfrm>
-            <a:off x="320550" y="7129363"/>
-            <a:ext cx="4680521" cy="430887"/>
+            <a:off x="536575" y="3672979"/>
+            <a:ext cx="4248472" cy="2462213"/>
           </a:xfrm>
           <a:prstGeom prst="rect">
             <a:avLst/>
           </a:prstGeom>
           <a:noFill/>
           <a:ln>
-            <a:solidFill>
-              <a:srgbClr val="00B050"/>
-            </a:solidFill>
+            <a:noFill/>
           </a:ln>
         </p:spPr>
         <p:txBody>
@@ -8897,40 +7909,89 @@
           </a:bodyPr>
           <a:lstStyle/>
           <a:p>
-            <a:pPr algn="ctr"/>
-            <a:r>
-              <a:rPr lang="en-US" sz="2800" dirty="0" smtClean="0">
-                <a:solidFill>
-                  <a:srgbClr val="B38184"/>
-                </a:solidFill>
-                <a:latin typeface="Corbel" charset="0"/>
-                <a:ea typeface="Corbel" charset="0"/>
-                <a:cs typeface="Corbel" charset="0"/>
-              </a:rPr>
-              <a:t>Manual</a:t>
-            </a:r>
-          </a:p>
-        </p:txBody>
-      </p:sp>
-      <p:sp>
-        <p:nvSpPr>
-          <p:cNvPr id="36" name="TextBox 35"/>
+            <a:r>
+              <a:rPr lang="en-US" sz="2000" dirty="0" smtClean="0">
+                <a:solidFill>
+                  <a:schemeClr val="bg1"/>
+                </a:solidFill>
+                <a:latin typeface="Tahoma" charset="0"/>
+                <a:ea typeface="Tahoma" charset="0"/>
+                <a:cs typeface="Tahoma" charset="0"/>
+              </a:rPr>
+              <a:t>We are designing </a:t>
+            </a:r>
+            <a:r>
+              <a:rPr lang="en-US" sz="2000" dirty="0">
+                <a:solidFill>
+                  <a:schemeClr val="bg1"/>
+                </a:solidFill>
+                <a:latin typeface="Tahoma" charset="0"/>
+                <a:ea typeface="Tahoma" charset="0"/>
+                <a:cs typeface="Tahoma" charset="0"/>
+              </a:rPr>
+              <a:t>a Hydra head to </a:t>
+            </a:r>
+            <a:r>
+              <a:rPr lang="en-US" sz="2000" dirty="0" smtClean="0">
+                <a:solidFill>
+                  <a:schemeClr val="bg1"/>
+                </a:solidFill>
+                <a:latin typeface="Tahoma" charset="0"/>
+                <a:ea typeface="Tahoma" charset="0"/>
+                <a:cs typeface="Tahoma" charset="0"/>
+              </a:rPr>
+              <a:t>support </a:t>
+            </a:r>
+            <a:r>
+              <a:rPr lang="en-US" sz="2000" dirty="0">
+                <a:solidFill>
+                  <a:schemeClr val="bg1"/>
+                </a:solidFill>
+                <a:latin typeface="Tahoma" charset="0"/>
+                <a:ea typeface="Tahoma" charset="0"/>
+                <a:cs typeface="Tahoma" charset="0"/>
+              </a:rPr>
+              <a:t>common DH project tasks: annotating, cataloging, proofreading, publishing, text encoding, transcribing, and translating. The end result will be a contributory and collaborative repository environment for many types of users, which </a:t>
+            </a:r>
+            <a:r>
+              <a:rPr lang="en-US" sz="2000" dirty="0" smtClean="0">
+                <a:solidFill>
+                  <a:schemeClr val="bg1"/>
+                </a:solidFill>
+                <a:latin typeface="Tahoma" charset="0"/>
+                <a:ea typeface="Tahoma" charset="0"/>
+                <a:cs typeface="Tahoma" charset="0"/>
+              </a:rPr>
+              <a:t>ideally</a:t>
+            </a:r>
+            <a:endParaRPr lang="en-US" sz="2000" dirty="0">
+              <a:solidFill>
+                <a:schemeClr val="bg1"/>
+              </a:solidFill>
+              <a:latin typeface="Tahoma" charset="0"/>
+              <a:ea typeface="Tahoma" charset="0"/>
+              <a:cs typeface="Tahoma" charset="0"/>
+            </a:endParaRPr>
+          </a:p>
+        </p:txBody>
+      </p:sp>
+      <p:sp>
+        <p:nvSpPr>
+          <p:cNvPr id="26" name="TextBox 25"/>
           <p:cNvSpPr txBox="1"/>
           <p:nvPr/>
         </p:nvSpPr>
         <p:spPr>
           <a:xfrm>
-            <a:off x="319349" y="11305827"/>
-            <a:ext cx="4681722" cy="430887"/>
+            <a:off x="5282596" y="3456955"/>
+            <a:ext cx="4687027" cy="553998"/>
           </a:xfrm>
           <a:prstGeom prst="rect">
             <a:avLst/>
           </a:prstGeom>
           <a:noFill/>
           <a:ln>
-            <a:solidFill>
-              <a:srgbClr val="00B050"/>
-            </a:solidFill>
+            <a:noFill/>
           </a:ln>
         </p:spPr>
         <p:txBody>
@@ -8941,15 +8002,95 @@
           <a:p>
             <a:pPr algn="ctr"/>
             <a:r>
-              <a:rPr lang="en-US" sz="2800" dirty="0" smtClean="0">
-                <a:solidFill>
-                  <a:srgbClr val="B38184"/>
+              <a:rPr lang="en-US" dirty="0" smtClean="0">
+                <a:solidFill>
+                  <a:schemeClr val="bg1"/>
                 </a:solidFill>
                 <a:latin typeface="Corbel" charset="0"/>
                 <a:ea typeface="Corbel" charset="0"/>
                 <a:cs typeface="Corbel" charset="0"/>
               </a:rPr>
-              <a:t>Automatic</a:t>
+              <a:t>Components</a:t>
+            </a:r>
+          </a:p>
+        </p:txBody>
+      </p:sp>
+      <p:sp>
+        <p:nvSpPr>
+          <p:cNvPr id="33" name="TextBox 32"/>
+          <p:cNvSpPr txBox="1"/>
+          <p:nvPr/>
+        </p:nvSpPr>
+        <p:spPr>
+          <a:xfrm>
+            <a:off x="320551" y="6625307"/>
+            <a:ext cx="9692640" cy="553998"/>
+          </a:xfrm>
+          <a:prstGeom prst="rect">
+            <a:avLst/>
+          </a:prstGeom>
+          <a:noFill/>
+          <a:ln>
+            <a:noFill/>
+          </a:ln>
+        </p:spPr>
+        <p:txBody>
+          <a:bodyPr wrap="square" lIns="0" tIns="0" rIns="0" bIns="0" rtlCol="0">
+            <a:spAutoFit/>
+          </a:bodyPr>
+          <a:lstStyle/>
+          <a:p>
+            <a:pPr algn="ctr"/>
+            <a:r>
+              <a:rPr lang="en-US" dirty="0" smtClean="0">
+                <a:solidFill>
+                  <a:schemeClr val="bg1"/>
+                </a:solidFill>
+                <a:latin typeface="Corbel" charset="0"/>
+                <a:ea typeface="Corbel" charset="0"/>
+                <a:cs typeface="Corbel" charset="0"/>
+              </a:rPr>
+              <a:t>DH Workflows</a:t>
+            </a:r>
+          </a:p>
+        </p:txBody>
+      </p:sp>
+      <p:sp>
+        <p:nvSpPr>
+          <p:cNvPr id="34" name="TextBox 33"/>
+          <p:cNvSpPr txBox="1"/>
+          <p:nvPr/>
+        </p:nvSpPr>
+        <p:spPr>
+          <a:xfrm>
+            <a:off x="298768" y="11665867"/>
+            <a:ext cx="9692640" cy="553998"/>
+          </a:xfrm>
+          <a:prstGeom prst="rect">
+            <a:avLst/>
+          </a:prstGeom>
+          <a:noFill/>
+          <a:ln>
+            <a:noFill/>
+          </a:ln>
+        </p:spPr>
+        <p:txBody>
+          <a:bodyPr wrap="square" lIns="0" tIns="0" rIns="0" bIns="0" rtlCol="0">
+            <a:spAutoFit/>
+          </a:bodyPr>
+          <a:lstStyle/>
+          <a:p>
+            <a:pPr algn="ctr"/>
+            <a:r>
+              <a:rPr lang="en-US" dirty="0" smtClean="0">
+                <a:solidFill>
+                  <a:schemeClr val="bg1"/>
+                </a:solidFill>
+                <a:latin typeface="Corbel" charset="0"/>
+                <a:ea typeface="Corbel" charset="0"/>
+                <a:cs typeface="Corbel" charset="0"/>
+              </a:rPr>
+              <a:t>User Roles</a:t>
             </a:r>
           </a:p>
         </p:txBody>
@@ -8976,8 +8117,8 @@
         </p:blipFill>
         <p:spPr>
           <a:xfrm>
-            <a:off x="464567" y="7777435"/>
-            <a:ext cx="4136975" cy="3205180"/>
+            <a:off x="608583" y="7201371"/>
+            <a:ext cx="3252964" cy="2520280"/>
           </a:xfrm>
           <a:prstGeom prst="rect">
             <a:avLst/>
@@ -9006,62 +8147,14 @@
         </p:blipFill>
         <p:spPr>
           <a:xfrm>
-            <a:off x="5433119" y="7201371"/>
-            <a:ext cx="4392488" cy="2764814"/>
+            <a:off x="6081191" y="12241931"/>
+            <a:ext cx="3888432" cy="2447540"/>
           </a:xfrm>
           <a:prstGeom prst="rect">
             <a:avLst/>
           </a:prstGeom>
         </p:spPr>
       </p:pic>
-      <p:sp>
-        <p:nvSpPr>
-          <p:cNvPr id="43" name="Rectangle 42"/>
-          <p:cNvSpPr/>
-          <p:nvPr/>
-        </p:nvSpPr>
-        <p:spPr>
-          <a:xfrm>
-            <a:off x="8097415" y="16202371"/>
-            <a:ext cx="228600" cy="2057400"/>
-          </a:xfrm>
-          <a:prstGeom prst="rect">
-            <a:avLst/>
-          </a:prstGeom>
-          <a:solidFill>
-            <a:schemeClr val="bg1"/>
-          </a:solidFill>
-          <a:ln>
-            <a:solidFill>
-              <a:schemeClr val="bg1"/>
-            </a:solidFill>
-          </a:ln>
-        </p:spPr>
-        <p:style>
-          <a:lnRef idx="2">
-            <a:schemeClr val="accent1">
-              <a:shade val="50000"/>
-            </a:schemeClr>
-          </a:lnRef>
-          <a:fillRef idx="1">
-            <a:schemeClr val="accent1"/>
-          </a:fillRef>
-          <a:effectRef idx="0">
-            <a:schemeClr val="accent1"/>
-          </a:effectRef>
-          <a:fontRef idx="minor">
-            <a:schemeClr val="lt1"/>
-          </a:fontRef>
-        </p:style>
-        <p:txBody>
-          <a:bodyPr rtlCol="0" anchor="ctr"/>
-          <a:lstStyle/>
-          <a:p>
-            <a:pPr algn="ctr"/>
-            <a:endParaRPr lang="en-US"/>
-          </a:p>
-        </p:txBody>
-      </p:sp>
       <p:pic>
         <p:nvPicPr>
           <p:cNvPr id="44" name="Picture 43"/>
@@ -9108,9 +8201,7 @@
           </a:prstGeom>
           <a:noFill/>
           <a:ln>
-            <a:solidFill>
-              <a:srgbClr val="00B050"/>
-            </a:solidFill>
+            <a:noFill/>
           </a:ln>
         </p:spPr>
         <p:txBody>
@@ -9122,7 +8213,7 @@
             <a:r>
               <a:rPr lang="en-US" dirty="0" smtClean="0">
                 <a:solidFill>
-                  <a:srgbClr val="607890"/>
+                  <a:schemeClr val="bg1"/>
                 </a:solidFill>
                 <a:latin typeface="Tahoma" charset="0"/>
                 <a:ea typeface="Tahoma" charset="0"/>
@@ -9748,6 +8839,308 @@
           </a:p>
         </p:txBody>
       </p:sp>
+      <p:pic>
+        <p:nvPicPr>
+          <p:cNvPr id="2" name="Picture 1"/>
+          <p:cNvPicPr>
+            <a:picLocks noChangeAspect="1"/>
+          </p:cNvPicPr>
+          <p:nvPr/>
+        </p:nvPicPr>
+        <p:blipFill>
+          <a:blip r:embed="rId6">
+            <a:extLst>
+              <a:ext uri="{28A0092B-C50C-407E-A947-70E740481C1C}">
+                <a14:useLocalDpi xmlns:a14="http://schemas.microsoft.com/office/drawing/2010/main" val="0"/>
+              </a:ext>
+            </a:extLst>
+          </a:blip>
+          <a:stretch>
+            <a:fillRect/>
+          </a:stretch>
+        </p:blipFill>
+        <p:spPr>
+          <a:xfrm>
+            <a:off x="5433119" y="4177035"/>
+            <a:ext cx="1398588" cy="508577"/>
+          </a:xfrm>
+          <a:prstGeom prst="rect">
+            <a:avLst/>
+          </a:prstGeom>
+        </p:spPr>
+      </p:pic>
+      <p:pic>
+        <p:nvPicPr>
+          <p:cNvPr id="5" name="Picture 4"/>
+          <p:cNvPicPr>
+            <a:picLocks noChangeAspect="1"/>
+          </p:cNvPicPr>
+          <p:nvPr/>
+        </p:nvPicPr>
+        <p:blipFill>
+          <a:blip r:embed="rId7">
+            <a:extLst>
+              <a:ext uri="{28A0092B-C50C-407E-A947-70E740481C1C}">
+                <a14:useLocalDpi xmlns:a14="http://schemas.microsoft.com/office/drawing/2010/main" val="0"/>
+              </a:ext>
+            </a:extLst>
+          </a:blip>
+          <a:stretch>
+            <a:fillRect/>
+          </a:stretch>
+        </p:blipFill>
+        <p:spPr>
+          <a:xfrm>
+            <a:off x="7089303" y="5401171"/>
+            <a:ext cx="1130300" cy="317500"/>
+          </a:xfrm>
+          <a:prstGeom prst="rect">
+            <a:avLst/>
+          </a:prstGeom>
+        </p:spPr>
+      </p:pic>
+      <p:pic>
+        <p:nvPicPr>
+          <p:cNvPr id="11" name="Picture 10"/>
+          <p:cNvPicPr>
+            <a:picLocks noChangeAspect="1"/>
+          </p:cNvPicPr>
+          <p:nvPr/>
+        </p:nvPicPr>
+        <p:blipFill rotWithShape="1">
+          <a:blip r:embed="rId8">
+            <a:extLst>
+              <a:ext uri="{28A0092B-C50C-407E-A947-70E740481C1C}">
+                <a14:useLocalDpi xmlns:a14="http://schemas.microsoft.com/office/drawing/2010/main" val="0"/>
+              </a:ext>
+            </a:extLst>
+          </a:blip>
+          <a:srcRect r="73359" b="5290"/>
+          <a:stretch/>
+        </p:blipFill>
+        <p:spPr>
+          <a:xfrm>
+            <a:off x="5134595" y="4825107"/>
+            <a:ext cx="1845341" cy="1381819"/>
+          </a:xfrm>
+          <a:prstGeom prst="rect">
+            <a:avLst/>
+          </a:prstGeom>
+        </p:spPr>
+      </p:pic>
+      <p:pic>
+        <p:nvPicPr>
+          <p:cNvPr id="13" name="Picture 12"/>
+          <p:cNvPicPr>
+            <a:picLocks noChangeAspect="1"/>
+          </p:cNvPicPr>
+          <p:nvPr/>
+        </p:nvPicPr>
+        <p:blipFill>
+          <a:blip r:embed="rId9">
+            <a:extLst>
+              <a:ext uri="{28A0092B-C50C-407E-A947-70E740481C1C}">
+                <a14:useLocalDpi xmlns:a14="http://schemas.microsoft.com/office/drawing/2010/main" val="0"/>
+              </a:ext>
+            </a:extLst>
+          </a:blip>
+          <a:stretch>
+            <a:fillRect/>
+          </a:stretch>
+        </p:blipFill>
+        <p:spPr>
+          <a:xfrm>
+            <a:off x="8385447" y="5185147"/>
+            <a:ext cx="1369889" cy="1369889"/>
+          </a:xfrm>
+          <a:prstGeom prst="rect">
+            <a:avLst/>
+          </a:prstGeom>
+        </p:spPr>
+      </p:pic>
+      <p:pic>
+        <p:nvPicPr>
+          <p:cNvPr id="14" name="Picture 13"/>
+          <p:cNvPicPr>
+            <a:picLocks noChangeAspect="1"/>
+          </p:cNvPicPr>
+          <p:nvPr/>
+        </p:nvPicPr>
+        <p:blipFill>
+          <a:blip r:embed="rId10">
+            <a:extLst>
+              <a:ext uri="{28A0092B-C50C-407E-A947-70E740481C1C}">
+                <a14:useLocalDpi xmlns:a14="http://schemas.microsoft.com/office/drawing/2010/main" val="0"/>
+              </a:ext>
+            </a:extLst>
+          </a:blip>
+          <a:stretch>
+            <a:fillRect/>
+          </a:stretch>
+        </p:blipFill>
+        <p:spPr>
+          <a:xfrm>
+            <a:off x="9033519" y="4681091"/>
+            <a:ext cx="720080" cy="472032"/>
+          </a:xfrm>
+          <a:prstGeom prst="rect">
+            <a:avLst/>
+          </a:prstGeom>
+        </p:spPr>
+      </p:pic>
+      <p:pic>
+        <p:nvPicPr>
+          <p:cNvPr id="15" name="Picture 14"/>
+          <p:cNvPicPr>
+            <a:picLocks noChangeAspect="1"/>
+          </p:cNvPicPr>
+          <p:nvPr/>
+        </p:nvPicPr>
+        <p:blipFill>
+          <a:blip r:embed="rId11">
+            <a:extLst>
+              <a:ext uri="{28A0092B-C50C-407E-A947-70E740481C1C}">
+                <a14:useLocalDpi xmlns:a14="http://schemas.microsoft.com/office/drawing/2010/main" val="0"/>
+              </a:ext>
+            </a:extLst>
+          </a:blip>
+          <a:stretch>
+            <a:fillRect/>
+          </a:stretch>
+        </p:blipFill>
+        <p:spPr>
+          <a:xfrm>
+            <a:off x="7089303" y="4465067"/>
+            <a:ext cx="1292175" cy="744522"/>
+          </a:xfrm>
+          <a:prstGeom prst="rect">
+            <a:avLst/>
+          </a:prstGeom>
+        </p:spPr>
+      </p:pic>
+      <p:sp>
+        <p:nvSpPr>
+          <p:cNvPr id="38" name="TextBox 37"/>
+          <p:cNvSpPr txBox="1"/>
+          <p:nvPr/>
+        </p:nvSpPr>
+        <p:spPr>
+          <a:xfrm>
+            <a:off x="6657255" y="5833219"/>
+            <a:ext cx="1609627" cy="307777"/>
+          </a:xfrm>
+          <a:prstGeom prst="rect">
+            <a:avLst/>
+          </a:prstGeom>
+          <a:noFill/>
+          <a:ln>
+            <a:noFill/>
+          </a:ln>
+        </p:spPr>
+        <p:txBody>
+          <a:bodyPr wrap="square" lIns="0" tIns="0" rIns="0" bIns="0" rtlCol="0">
+            <a:spAutoFit/>
+          </a:bodyPr>
+          <a:lstStyle/>
+          <a:p>
+            <a:r>
+              <a:rPr lang="en-US" sz="2000" dirty="0" err="1" smtClean="0">
+                <a:solidFill>
+                  <a:schemeClr val="bg1"/>
+                </a:solidFill>
+                <a:latin typeface="Tahoma" charset="0"/>
+                <a:ea typeface="Tahoma" charset="0"/>
+                <a:cs typeface="Tahoma" charset="0"/>
+              </a:rPr>
+              <a:t>ImageMagick</a:t>
+            </a:r>
+            <a:endParaRPr lang="en-US" sz="2000" dirty="0">
+              <a:solidFill>
+                <a:schemeClr val="bg1"/>
+              </a:solidFill>
+              <a:latin typeface="Tahoma" charset="0"/>
+              <a:ea typeface="Tahoma" charset="0"/>
+              <a:cs typeface="Tahoma" charset="0"/>
+            </a:endParaRPr>
+          </a:p>
+        </p:txBody>
+      </p:sp>
+      <p:sp>
+        <p:nvSpPr>
+          <p:cNvPr id="41" name="TextBox 40"/>
+          <p:cNvSpPr txBox="1"/>
+          <p:nvPr/>
+        </p:nvSpPr>
+        <p:spPr>
+          <a:xfrm>
+            <a:off x="8673479" y="4177035"/>
+            <a:ext cx="1025179" cy="307777"/>
+          </a:xfrm>
+          <a:prstGeom prst="rect">
+            <a:avLst/>
+          </a:prstGeom>
+          <a:noFill/>
+          <a:ln>
+            <a:noFill/>
+          </a:ln>
+        </p:spPr>
+        <p:txBody>
+          <a:bodyPr wrap="square" lIns="0" tIns="0" rIns="0" bIns="0" rtlCol="0">
+            <a:spAutoFit/>
+          </a:bodyPr>
+          <a:lstStyle/>
+          <a:p>
+            <a:r>
+              <a:rPr lang="en-US" sz="2000" dirty="0" err="1" smtClean="0">
+                <a:solidFill>
+                  <a:schemeClr val="bg1"/>
+                </a:solidFill>
+                <a:latin typeface="Tahoma" charset="0"/>
+                <a:ea typeface="Tahoma" charset="0"/>
+                <a:cs typeface="Tahoma" charset="0"/>
+              </a:rPr>
+              <a:t>Kakadu</a:t>
+            </a:r>
+            <a:endParaRPr lang="en-US" sz="2000" dirty="0">
+              <a:solidFill>
+                <a:schemeClr val="bg1"/>
+              </a:solidFill>
+              <a:latin typeface="Tahoma" charset="0"/>
+              <a:ea typeface="Tahoma" charset="0"/>
+              <a:cs typeface="Tahoma" charset="0"/>
+            </a:endParaRPr>
+          </a:p>
+        </p:txBody>
+      </p:sp>
+      <p:pic>
+        <p:nvPicPr>
+          <p:cNvPr id="16" name="Picture 15"/>
+          <p:cNvPicPr>
+            <a:picLocks noChangeAspect="1"/>
+          </p:cNvPicPr>
+          <p:nvPr/>
+        </p:nvPicPr>
+        <p:blipFill rotWithShape="1">
+          <a:blip r:embed="rId12">
+            <a:extLst>
+              <a:ext uri="{28A0092B-C50C-407E-A947-70E740481C1C}">
+                <a14:useLocalDpi xmlns:a14="http://schemas.microsoft.com/office/drawing/2010/main" val="0"/>
+              </a:ext>
+            </a:extLst>
+          </a:blip>
+          <a:srcRect l="11490" t="35522"/>
+          <a:stretch/>
+        </p:blipFill>
+        <p:spPr>
+          <a:xfrm>
+            <a:off x="536576" y="12601972"/>
+            <a:ext cx="2808312" cy="1534356"/>
+          </a:xfrm>
+          <a:prstGeom prst="rect">
+            <a:avLst/>
+          </a:prstGeom>
+        </p:spPr>
+      </p:pic>
     </p:spTree>
     <p:extLst>
       <p:ext uri="{BB962C8B-B14F-4D97-AF65-F5344CB8AC3E}">

</xml_diff>

<commit_message>
More layout adjustments, component diagram
</commit_message>
<xml_diff>
--- a/Open Repositories 2017/Charon Poster/OR2017_Charon_Poster_Working.pptx
+++ b/Open Repositories 2017/Charon Poster/OR2017_Charon_Poster_Working.pptx
@@ -131,6 +131,11 @@
         <p15:guide id="5" orient="horz" pos="2223" userDrawn="1">
           <p15:clr>
             <a:srgbClr val="9FCC3B"/>
+          </p15:clr>
+        </p15:guide>
+        <p15:guide id="6" pos="3241" userDrawn="1">
+          <p15:clr>
+            <a:srgbClr val="A4A3A4"/>
           </p15:clr>
         </p15:guide>
       </p15:sldGuideLst>
@@ -4114,7 +4119,7 @@
         <p:spPr>
           <a:xfrm>
             <a:off x="10780" y="-572"/>
-            <a:ext cx="274320" cy="18288000"/>
+            <a:ext cx="182880" cy="18288000"/>
           </a:xfrm>
           <a:prstGeom prst="rect">
             <a:avLst/>
@@ -4161,8 +4166,8 @@
         </p:nvSpPr>
         <p:spPr>
           <a:xfrm>
-            <a:off x="10026635" y="-18366"/>
-            <a:ext cx="274320" cy="18288000"/>
+            <a:off x="10074775" y="-18366"/>
+            <a:ext cx="182880" cy="18288000"/>
           </a:xfrm>
           <a:prstGeom prst="rect">
             <a:avLst/>
@@ -4209,8 +4214,8 @@
         </p:nvSpPr>
         <p:spPr>
           <a:xfrm rot="5400000">
-            <a:off x="5028497" y="-5006912"/>
-            <a:ext cx="274320" cy="10287000"/>
+            <a:off x="5084579" y="-5052632"/>
+            <a:ext cx="182880" cy="10287000"/>
           </a:xfrm>
           <a:prstGeom prst="rect">
             <a:avLst/>
@@ -4257,8 +4262,8 @@
         </p:nvSpPr>
         <p:spPr>
           <a:xfrm rot="5400000">
-            <a:off x="5017120" y="13009943"/>
-            <a:ext cx="274320" cy="10287000"/>
+            <a:off x="5052060" y="13056235"/>
+            <a:ext cx="182880" cy="10287000"/>
           </a:xfrm>
           <a:prstGeom prst="rect">
             <a:avLst/>
@@ -4305,8 +4310,8 @@
         </p:nvSpPr>
         <p:spPr>
           <a:xfrm>
-            <a:off x="42663" y="3240359"/>
-            <a:ext cx="10287000" cy="228600"/>
+            <a:off x="0" y="3240931"/>
+            <a:ext cx="10287000" cy="182880"/>
           </a:xfrm>
           <a:prstGeom prst="rect">
             <a:avLst/>
@@ -4354,7 +4359,7 @@
         <p:spPr>
           <a:xfrm>
             <a:off x="0" y="6265267"/>
-            <a:ext cx="10287000" cy="228600"/>
+            <a:ext cx="10287000" cy="182880"/>
           </a:xfrm>
           <a:prstGeom prst="rect">
             <a:avLst/>
@@ -4402,7 +4407,7 @@
         <p:spPr>
           <a:xfrm>
             <a:off x="13955" y="15985775"/>
-            <a:ext cx="10287000" cy="228600"/>
+            <a:ext cx="10287000" cy="182880"/>
           </a:xfrm>
           <a:prstGeom prst="rect">
             <a:avLst/>
@@ -4449,8 +4454,8 @@
         </p:nvSpPr>
         <p:spPr>
           <a:xfrm>
-            <a:off x="5030787" y="3384375"/>
-            <a:ext cx="228600" cy="2971800"/>
+            <a:off x="5053648" y="3312939"/>
+            <a:ext cx="182880" cy="2971800"/>
           </a:xfrm>
           <a:prstGeom prst="rect">
             <a:avLst/>
@@ -4546,7 +4551,7 @@
         <p:spPr>
           <a:xfrm>
             <a:off x="10780" y="11377263"/>
-            <a:ext cx="10287000" cy="228600"/>
+            <a:ext cx="10287000" cy="182880"/>
           </a:xfrm>
           <a:prstGeom prst="rect">
             <a:avLst/>
@@ -4587,7 +4592,7 @@
       </p:sp>
       <p:sp>
         <p:nvSpPr>
-          <p:cNvPr id="48" name="Rounded Rectangle 47"/>
+          <p:cNvPr id="48" name="Rectangle 47"/>
           <p:cNvSpPr/>
           <p:nvPr/>
         </p:nvSpPr>
@@ -4596,7 +4601,7 @@
             <a:off x="320551" y="16274379"/>
             <a:ext cx="7776864" cy="1728192"/>
           </a:xfrm>
-          <a:prstGeom prst="roundRect">
+          <a:prstGeom prst="rect">
             <a:avLst/>
           </a:prstGeom>
           <a:solidFill>
@@ -4636,7 +4641,7 @@
       </p:sp>
       <p:sp>
         <p:nvSpPr>
-          <p:cNvPr id="47" name="Rounded Rectangle 46"/>
+          <p:cNvPr id="47" name="Rectangle 46"/>
           <p:cNvSpPr/>
           <p:nvPr/>
         </p:nvSpPr>
@@ -4645,7 +4650,7 @@
             <a:off x="266545" y="11665867"/>
             <a:ext cx="9703078" cy="4248472"/>
           </a:xfrm>
-          <a:prstGeom prst="roundRect">
+          <a:prstGeom prst="rect">
             <a:avLst/>
           </a:prstGeom>
           <a:solidFill>
@@ -4685,7 +4690,7 @@
       </p:sp>
       <p:sp>
         <p:nvSpPr>
-          <p:cNvPr id="46" name="Rounded Rectangle 45"/>
+          <p:cNvPr id="46" name="Rectangle 45"/>
           <p:cNvSpPr/>
           <p:nvPr/>
         </p:nvSpPr>
@@ -4694,7 +4699,7 @@
             <a:off x="320551" y="6481291"/>
             <a:ext cx="9649072" cy="4896544"/>
           </a:xfrm>
-          <a:prstGeom prst="roundRect">
+          <a:prstGeom prst="rect">
             <a:avLst/>
           </a:prstGeom>
           <a:solidFill>
@@ -4734,7 +4739,7 @@
       </p:sp>
       <p:sp>
         <p:nvSpPr>
-          <p:cNvPr id="42" name="Rounded Rectangle 41"/>
+          <p:cNvPr id="42" name="Rectangle 41"/>
           <p:cNvSpPr/>
           <p:nvPr/>
         </p:nvSpPr>
@@ -4743,7 +4748,7 @@
             <a:off x="320551" y="3456955"/>
             <a:ext cx="4680520" cy="2808312"/>
           </a:xfrm>
-          <a:prstGeom prst="roundRect">
+          <a:prstGeom prst="rect">
             <a:avLst/>
           </a:prstGeom>
           <a:solidFill>
@@ -4783,7 +4788,7 @@
       </p:sp>
       <p:sp>
         <p:nvSpPr>
-          <p:cNvPr id="17" name="Rounded Rectangle 16"/>
+          <p:cNvPr id="17" name="Rectangle 16"/>
           <p:cNvSpPr/>
           <p:nvPr/>
         </p:nvSpPr>
@@ -4792,11 +4797,13 @@
             <a:off x="5289103" y="3456955"/>
             <a:ext cx="4680520" cy="2808312"/>
           </a:xfrm>
-          <a:prstGeom prst="roundRect">
+          <a:prstGeom prst="rect">
             <a:avLst/>
           </a:prstGeom>
           <a:solidFill>
-            <a:srgbClr val="73626E"/>
+            <a:schemeClr val="bg1">
+              <a:lumMod val="65000"/>
+            </a:schemeClr>
           </a:solidFill>
           <a:ln cap="rnd">
             <a:solidFill>
@@ -4943,16 +4950,6 @@
               </a:rPr>
               <a:t>Repository to Support DH Workflows</a:t>
             </a:r>
-            <a:endParaRPr lang="en-US" sz="6000" dirty="0">
-              <a:solidFill>
-                <a:schemeClr val="bg1">
-                  <a:lumMod val="95000"/>
-                </a:schemeClr>
-              </a:solidFill>
-              <a:latin typeface="Corbel" charset="0"/>
-              <a:ea typeface="Corbel" charset="0"/>
-              <a:cs typeface="Corbel" charset="0"/>
-            </a:endParaRPr>
           </a:p>
         </p:txBody>
       </p:sp>
@@ -5032,8 +5029,10 @@
                 <a:ea typeface="Corbel" charset="0"/>
                 <a:cs typeface="Corbel" charset="0"/>
               </a:rPr>
-              <a:t>Northeastern University </a:t>
-            </a:r>
+              <a:t>Northeastern University Libraries</a:t>
+            </a:r>
+          </a:p>
+          <a:p>
             <a:r>
               <a:rPr lang="en-US" sz="2400" dirty="0" smtClean="0">
                 <a:solidFill>
@@ -5045,35 +5044,7 @@
                 <a:ea typeface="Corbel" charset="0"/>
                 <a:cs typeface="Corbel" charset="0"/>
               </a:rPr>
-              <a:t>Libraries</a:t>
-            </a:r>
-          </a:p>
-          <a:p>
-            <a:r>
-              <a:rPr lang="en-US" sz="2400" dirty="0" smtClean="0">
-                <a:solidFill>
-                  <a:schemeClr val="bg1">
-                    <a:lumMod val="95000"/>
-                  </a:schemeClr>
-                </a:solidFill>
-                <a:latin typeface="Corbel" charset="0"/>
-                <a:ea typeface="Corbel" charset="0"/>
-                <a:cs typeface="Corbel" charset="0"/>
-              </a:rPr>
-              <a:t>Digital </a:t>
-            </a:r>
-            <a:r>
-              <a:rPr lang="en-US" sz="2400" dirty="0" smtClean="0">
-                <a:solidFill>
-                  <a:schemeClr val="bg1">
-                    <a:lumMod val="95000"/>
-                  </a:schemeClr>
-                </a:solidFill>
-                <a:latin typeface="Corbel" charset="0"/>
-                <a:ea typeface="Corbel" charset="0"/>
-                <a:cs typeface="Corbel" charset="0"/>
-              </a:rPr>
-              <a:t>Scholarship Group</a:t>
+              <a:t>Digital Scholarship Group</a:t>
             </a:r>
           </a:p>
         </p:txBody>
@@ -5086,7 +5057,7 @@
         </p:nvSpPr>
         <p:spPr>
           <a:xfrm>
-            <a:off x="536575" y="3672979"/>
+            <a:off x="536575" y="3600971"/>
             <a:ext cx="4248472" cy="2462213"/>
           </a:xfrm>
           <a:prstGeom prst="rect">
@@ -5148,9 +5119,7 @@
             <a:r>
               <a:rPr lang="en-US" dirty="0" smtClean="0">
                 <a:solidFill>
-                  <a:schemeClr val="bg1">
-                    <a:lumMod val="95000"/>
-                  </a:schemeClr>
+                  <a:srgbClr val="73626E"/>
                 </a:solidFill>
                 <a:latin typeface="Corbel" charset="0"/>
                 <a:ea typeface="Corbel" charset="0"/>
@@ -5311,20 +5280,7 @@
                 <a:ea typeface="Tahoma" charset="0"/>
                 <a:cs typeface="Tahoma" charset="0"/>
               </a:rPr>
-              <a:t>Lorem </a:t>
-            </a:r>
-            <a:r>
-              <a:rPr lang="en-US" sz="2000" dirty="0" smtClean="0">
-                <a:solidFill>
-                  <a:schemeClr val="bg1">
-                    <a:lumMod val="95000"/>
-                  </a:schemeClr>
-                </a:solidFill>
-                <a:latin typeface="Tahoma" charset="0"/>
-                <a:ea typeface="Tahoma" charset="0"/>
-                <a:cs typeface="Tahoma" charset="0"/>
-              </a:rPr>
-              <a:t>ipsum dolor sit </a:t>
+              <a:t>Lorem ipsum dolor sit </a:t>
             </a:r>
             <a:r>
               <a:rPr lang="en-US" sz="2000" dirty="0" err="1" smtClean="0">
@@ -6078,20 +6034,7 @@
                 <a:ea typeface="Tahoma" charset="0"/>
                 <a:cs typeface="Tahoma" charset="0"/>
               </a:rPr>
-              <a:t>Next </a:t>
-            </a:r>
-            <a:r>
-              <a:rPr lang="en-US" smtClean="0">
-                <a:solidFill>
-                  <a:schemeClr val="bg1">
-                    <a:lumMod val="95000"/>
-                  </a:schemeClr>
-                </a:solidFill>
-                <a:latin typeface="Tahoma" charset="0"/>
-                <a:ea typeface="Tahoma" charset="0"/>
-                <a:cs typeface="Tahoma" charset="0"/>
-              </a:rPr>
-              <a:t>Steps</a:t>
+              <a:t>Next Steps</a:t>
             </a:r>
             <a:endParaRPr lang="en-US" dirty="0" smtClean="0">
               <a:solidFill>
@@ -6254,7 +6197,7 @@
         </p:blipFill>
         <p:spPr>
           <a:xfrm>
-            <a:off x="281828" y="2952899"/>
+            <a:off x="1915219" y="6841331"/>
             <a:ext cx="1398588" cy="508577"/>
           </a:xfrm>
           <a:prstGeom prst="rect">
@@ -6284,7 +6227,7 @@
         </p:blipFill>
         <p:spPr>
           <a:xfrm>
-            <a:off x="1938012" y="4177035"/>
+            <a:off x="3571403" y="8065467"/>
             <a:ext cx="1130300" cy="317500"/>
           </a:xfrm>
           <a:prstGeom prst="rect">
@@ -6313,7 +6256,7 @@
         </p:blipFill>
         <p:spPr>
           <a:xfrm>
-            <a:off x="-16696" y="3600971"/>
+            <a:off x="1616695" y="7489403"/>
             <a:ext cx="1845341" cy="1381819"/>
           </a:xfrm>
           <a:prstGeom prst="rect">
@@ -6343,7 +6286,7 @@
         </p:blipFill>
         <p:spPr>
           <a:xfrm>
-            <a:off x="3234156" y="3961011"/>
+            <a:off x="4867547" y="7849443"/>
             <a:ext cx="1369889" cy="1369889"/>
           </a:xfrm>
           <a:prstGeom prst="rect">
@@ -6373,7 +6316,7 @@
         </p:blipFill>
         <p:spPr>
           <a:xfrm>
-            <a:off x="3882228" y="3456955"/>
+            <a:off x="5515619" y="7345387"/>
             <a:ext cx="720080" cy="472032"/>
           </a:xfrm>
           <a:prstGeom prst="rect">
@@ -6403,7 +6346,7 @@
         </p:blipFill>
         <p:spPr>
           <a:xfrm>
-            <a:off x="1938012" y="3240931"/>
+            <a:off x="3571403" y="7129363"/>
             <a:ext cx="1292175" cy="744522"/>
           </a:xfrm>
           <a:prstGeom prst="rect">
@@ -6419,7 +6362,7 @@
         </p:nvSpPr>
         <p:spPr>
           <a:xfrm>
-            <a:off x="1505964" y="4609083"/>
+            <a:off x="3139355" y="8497515"/>
             <a:ext cx="1609627" cy="307777"/>
           </a:xfrm>
           <a:prstGeom prst="rect">
@@ -6460,7 +6403,7 @@
         </p:nvSpPr>
         <p:spPr>
           <a:xfrm>
-            <a:off x="3522188" y="2952899"/>
+            <a:off x="5155579" y="6841331"/>
             <a:ext cx="1025179" cy="307777"/>
           </a:xfrm>
           <a:prstGeom prst="rect">
@@ -6486,6 +6429,565 @@
               <a:t>Kakadu</a:t>
             </a:r>
             <a:endParaRPr lang="en-US" sz="2000" dirty="0">
+              <a:latin typeface="Tahoma" charset="0"/>
+              <a:ea typeface="Tahoma" charset="0"/>
+              <a:cs typeface="Tahoma" charset="0"/>
+            </a:endParaRPr>
+          </a:p>
+        </p:txBody>
+      </p:sp>
+      <p:sp>
+        <p:nvSpPr>
+          <p:cNvPr id="33" name="TextBox 32"/>
+          <p:cNvSpPr txBox="1"/>
+          <p:nvPr/>
+        </p:nvSpPr>
+        <p:spPr>
+          <a:xfrm>
+            <a:off x="2048743" y="13489492"/>
+            <a:ext cx="5400600" cy="408623"/>
+          </a:xfrm>
+          <a:prstGeom prst="roundRect">
+            <a:avLst/>
+          </a:prstGeom>
+          <a:noFill/>
+          <a:ln w="19050">
+            <a:solidFill>
+              <a:schemeClr val="accent3"/>
+            </a:solidFill>
+          </a:ln>
+        </p:spPr>
+        <p:txBody>
+          <a:bodyPr wrap="square" rtlCol="0">
+            <a:spAutoFit/>
+          </a:bodyPr>
+          <a:lstStyle/>
+          <a:p>
+            <a:pPr algn="ctr"/>
+            <a:r>
+              <a:rPr lang="en-US" sz="1800" smtClean="0">
+                <a:latin typeface="Tahoma" charset="0"/>
+                <a:ea typeface="Tahoma" charset="0"/>
+                <a:cs typeface="Tahoma" charset="0"/>
+              </a:rPr>
+              <a:t>Fedora 4</a:t>
+            </a:r>
+            <a:endParaRPr lang="en-US" sz="1800">
+              <a:latin typeface="Tahoma" charset="0"/>
+              <a:ea typeface="Tahoma" charset="0"/>
+              <a:cs typeface="Tahoma" charset="0"/>
+            </a:endParaRPr>
+          </a:p>
+        </p:txBody>
+      </p:sp>
+      <p:sp>
+        <p:nvSpPr>
+          <p:cNvPr id="34" name="TextBox 33"/>
+          <p:cNvSpPr txBox="1"/>
+          <p:nvPr/>
+        </p:nvSpPr>
+        <p:spPr>
+          <a:xfrm>
+            <a:off x="3920951" y="11449843"/>
+            <a:ext cx="1584176" cy="408623"/>
+          </a:xfrm>
+          <a:prstGeom prst="roundRect">
+            <a:avLst/>
+          </a:prstGeom>
+          <a:noFill/>
+          <a:ln w="19050">
+            <a:solidFill>
+              <a:schemeClr val="accent3"/>
+            </a:solidFill>
+          </a:ln>
+        </p:spPr>
+        <p:txBody>
+          <a:bodyPr wrap="square" rtlCol="0">
+            <a:spAutoFit/>
+          </a:bodyPr>
+          <a:lstStyle/>
+          <a:p>
+            <a:pPr algn="ctr"/>
+            <a:r>
+              <a:rPr lang="en-US" sz="1800" dirty="0" smtClean="0">
+                <a:latin typeface="Tahoma" charset="0"/>
+                <a:ea typeface="Tahoma" charset="0"/>
+                <a:cs typeface="Tahoma" charset="0"/>
+              </a:rPr>
+              <a:t>Charon</a:t>
+            </a:r>
+          </a:p>
+        </p:txBody>
+      </p:sp>
+      <p:sp>
+        <p:nvSpPr>
+          <p:cNvPr id="35" name="TextBox 34"/>
+          <p:cNvSpPr txBox="1"/>
+          <p:nvPr/>
+        </p:nvSpPr>
+        <p:spPr>
+          <a:xfrm>
+            <a:off x="2048743" y="10441731"/>
+            <a:ext cx="5400600" cy="408623"/>
+          </a:xfrm>
+          <a:prstGeom prst="roundRect">
+            <a:avLst/>
+          </a:prstGeom>
+          <a:noFill/>
+          <a:ln w="19050">
+            <a:solidFill>
+              <a:schemeClr val="accent3"/>
+            </a:solidFill>
+          </a:ln>
+        </p:spPr>
+        <p:txBody>
+          <a:bodyPr wrap="square" rtlCol="0">
+            <a:spAutoFit/>
+          </a:bodyPr>
+          <a:lstStyle/>
+          <a:p>
+            <a:pPr algn="ctr"/>
+            <a:r>
+              <a:rPr lang="en-US" sz="1800" dirty="0" smtClean="0">
+                <a:latin typeface="Tahoma" charset="0"/>
+                <a:ea typeface="Tahoma" charset="0"/>
+                <a:cs typeface="Tahoma" charset="0"/>
+              </a:rPr>
+              <a:t>CERES Publisher</a:t>
+            </a:r>
+          </a:p>
+        </p:txBody>
+      </p:sp>
+      <p:sp>
+        <p:nvSpPr>
+          <p:cNvPr id="36" name="Rounded Rectangle 35"/>
+          <p:cNvSpPr/>
+          <p:nvPr/>
+        </p:nvSpPr>
+        <p:spPr>
+          <a:xfrm>
+            <a:off x="2048743" y="11449843"/>
+            <a:ext cx="5400600" cy="1944216"/>
+          </a:xfrm>
+          <a:prstGeom prst="roundRect">
+            <a:avLst/>
+          </a:prstGeom>
+          <a:noFill/>
+          <a:ln>
+            <a:solidFill>
+              <a:schemeClr val="accent3"/>
+            </a:solidFill>
+          </a:ln>
+        </p:spPr>
+        <p:style>
+          <a:lnRef idx="2">
+            <a:schemeClr val="accent1">
+              <a:shade val="50000"/>
+            </a:schemeClr>
+          </a:lnRef>
+          <a:fillRef idx="1">
+            <a:schemeClr val="accent1"/>
+          </a:fillRef>
+          <a:effectRef idx="0">
+            <a:schemeClr val="accent1"/>
+          </a:effectRef>
+          <a:fontRef idx="minor">
+            <a:schemeClr val="lt1"/>
+          </a:fontRef>
+        </p:style>
+        <p:txBody>
+          <a:bodyPr rtlCol="0" anchor="ctr"/>
+          <a:lstStyle/>
+          <a:p>
+            <a:pPr algn="ctr"/>
+            <a:endParaRPr lang="en-US" sz="1800">
+              <a:latin typeface="Tahoma" charset="0"/>
+              <a:ea typeface="Tahoma" charset="0"/>
+              <a:cs typeface="Tahoma" charset="0"/>
+            </a:endParaRPr>
+          </a:p>
+        </p:txBody>
+      </p:sp>
+      <p:sp>
+        <p:nvSpPr>
+          <p:cNvPr id="37" name="TextBox 36"/>
+          <p:cNvSpPr txBox="1"/>
+          <p:nvPr/>
+        </p:nvSpPr>
+        <p:spPr>
+          <a:xfrm>
+            <a:off x="2264767" y="12313939"/>
+            <a:ext cx="1440160" cy="408623"/>
+          </a:xfrm>
+          <a:prstGeom prst="roundRect">
+            <a:avLst/>
+          </a:prstGeom>
+          <a:noFill/>
+          <a:ln w="19050">
+            <a:solidFill>
+              <a:schemeClr val="accent3"/>
+            </a:solidFill>
+          </a:ln>
+        </p:spPr>
+        <p:txBody>
+          <a:bodyPr wrap="square" rtlCol="0">
+            <a:spAutoFit/>
+          </a:bodyPr>
+          <a:lstStyle/>
+          <a:p>
+            <a:pPr algn="ctr"/>
+            <a:r>
+              <a:rPr lang="en-US" sz="1800" dirty="0" smtClean="0">
+                <a:latin typeface="Tahoma" charset="0"/>
+                <a:ea typeface="Tahoma" charset="0"/>
+                <a:cs typeface="Tahoma" charset="0"/>
+              </a:rPr>
+              <a:t>Hydra</a:t>
+            </a:r>
+          </a:p>
+        </p:txBody>
+      </p:sp>
+      <p:sp>
+        <p:nvSpPr>
+          <p:cNvPr id="38" name="TextBox 37"/>
+          <p:cNvSpPr txBox="1"/>
+          <p:nvPr/>
+        </p:nvSpPr>
+        <p:spPr>
+          <a:xfrm>
+            <a:off x="5649143" y="12745987"/>
+            <a:ext cx="1728192" cy="408623"/>
+          </a:xfrm>
+          <a:prstGeom prst="roundRect">
+            <a:avLst/>
+          </a:prstGeom>
+          <a:noFill/>
+          <a:ln w="19050">
+            <a:solidFill>
+              <a:schemeClr val="accent3"/>
+            </a:solidFill>
+          </a:ln>
+        </p:spPr>
+        <p:txBody>
+          <a:bodyPr wrap="square" rtlCol="0">
+            <a:spAutoFit/>
+          </a:bodyPr>
+          <a:lstStyle/>
+          <a:p>
+            <a:pPr algn="ctr"/>
+            <a:r>
+              <a:rPr lang="en-US" sz="1800" dirty="0" err="1" smtClean="0">
+                <a:latin typeface="Tahoma" charset="0"/>
+                <a:ea typeface="Tahoma" charset="0"/>
+                <a:cs typeface="Tahoma" charset="0"/>
+              </a:rPr>
+              <a:t>ImageMagick</a:t>
+            </a:r>
+            <a:endParaRPr lang="en-US" sz="1800" dirty="0" smtClean="0">
+              <a:latin typeface="Tahoma" charset="0"/>
+              <a:ea typeface="Tahoma" charset="0"/>
+              <a:cs typeface="Tahoma" charset="0"/>
+            </a:endParaRPr>
+          </a:p>
+        </p:txBody>
+      </p:sp>
+      <p:sp>
+        <p:nvSpPr>
+          <p:cNvPr id="39" name="TextBox 38"/>
+          <p:cNvSpPr txBox="1"/>
+          <p:nvPr/>
+        </p:nvSpPr>
+        <p:spPr>
+          <a:xfrm>
+            <a:off x="3776935" y="12745987"/>
+            <a:ext cx="1728192" cy="408623"/>
+          </a:xfrm>
+          <a:prstGeom prst="roundRect">
+            <a:avLst/>
+          </a:prstGeom>
+          <a:noFill/>
+          <a:ln w="19050">
+            <a:solidFill>
+              <a:schemeClr val="accent3"/>
+            </a:solidFill>
+          </a:ln>
+        </p:spPr>
+        <p:txBody>
+          <a:bodyPr wrap="square" rtlCol="0">
+            <a:spAutoFit/>
+          </a:bodyPr>
+          <a:lstStyle/>
+          <a:p>
+            <a:pPr algn="ctr"/>
+            <a:r>
+              <a:rPr lang="en-US" sz="1800" dirty="0" smtClean="0">
+                <a:latin typeface="Tahoma" charset="0"/>
+                <a:ea typeface="Tahoma" charset="0"/>
+                <a:cs typeface="Tahoma" charset="0"/>
+              </a:rPr>
+              <a:t>T-Pen</a:t>
+            </a:r>
+          </a:p>
+        </p:txBody>
+      </p:sp>
+      <p:sp>
+        <p:nvSpPr>
+          <p:cNvPr id="40" name="TextBox 39"/>
+          <p:cNvSpPr txBox="1"/>
+          <p:nvPr/>
+        </p:nvSpPr>
+        <p:spPr>
+          <a:xfrm>
+            <a:off x="3776935" y="12313939"/>
+            <a:ext cx="1728192" cy="408623"/>
+          </a:xfrm>
+          <a:prstGeom prst="roundRect">
+            <a:avLst/>
+          </a:prstGeom>
+          <a:noFill/>
+          <a:ln w="19050">
+            <a:solidFill>
+              <a:schemeClr val="accent3"/>
+            </a:solidFill>
+          </a:ln>
+        </p:spPr>
+        <p:txBody>
+          <a:bodyPr wrap="square" rtlCol="0">
+            <a:spAutoFit/>
+          </a:bodyPr>
+          <a:lstStyle/>
+          <a:p>
+            <a:pPr algn="ctr"/>
+            <a:r>
+              <a:rPr lang="en-US" sz="1800" smtClean="0">
+                <a:latin typeface="Tahoma" charset="0"/>
+                <a:ea typeface="Tahoma" charset="0"/>
+                <a:cs typeface="Tahoma" charset="0"/>
+              </a:rPr>
+              <a:t>MySQL</a:t>
+            </a:r>
+            <a:endParaRPr lang="en-US" sz="1800" dirty="0" smtClean="0">
+              <a:latin typeface="Tahoma" charset="0"/>
+              <a:ea typeface="Tahoma" charset="0"/>
+              <a:cs typeface="Tahoma" charset="0"/>
+            </a:endParaRPr>
+          </a:p>
+        </p:txBody>
+      </p:sp>
+      <p:sp>
+        <p:nvSpPr>
+          <p:cNvPr id="41" name="TextBox 40"/>
+          <p:cNvSpPr txBox="1"/>
+          <p:nvPr/>
+        </p:nvSpPr>
+        <p:spPr>
+          <a:xfrm>
+            <a:off x="5649143" y="12313939"/>
+            <a:ext cx="1728192" cy="408623"/>
+          </a:xfrm>
+          <a:prstGeom prst="roundRect">
+            <a:avLst/>
+          </a:prstGeom>
+          <a:noFill/>
+          <a:ln w="19050">
+            <a:solidFill>
+              <a:schemeClr val="accent3"/>
+            </a:solidFill>
+          </a:ln>
+        </p:spPr>
+        <p:txBody>
+          <a:bodyPr wrap="square" rtlCol="0">
+            <a:spAutoFit/>
+          </a:bodyPr>
+          <a:lstStyle/>
+          <a:p>
+            <a:pPr algn="ctr"/>
+            <a:r>
+              <a:rPr lang="en-US" sz="1800" smtClean="0">
+                <a:latin typeface="Tahoma" charset="0"/>
+                <a:ea typeface="Tahoma" charset="0"/>
+                <a:cs typeface="Tahoma" charset="0"/>
+              </a:rPr>
+              <a:t>Kakadu</a:t>
+            </a:r>
+            <a:endParaRPr lang="en-US" sz="1800" dirty="0" smtClean="0">
+              <a:latin typeface="Tahoma" charset="0"/>
+              <a:ea typeface="Tahoma" charset="0"/>
+              <a:cs typeface="Tahoma" charset="0"/>
+            </a:endParaRPr>
+          </a:p>
+        </p:txBody>
+      </p:sp>
+      <p:sp>
+        <p:nvSpPr>
+          <p:cNvPr id="42" name="TextBox 41"/>
+          <p:cNvSpPr txBox="1"/>
+          <p:nvPr/>
+        </p:nvSpPr>
+        <p:spPr>
+          <a:xfrm>
+            <a:off x="3776935" y="11881891"/>
+            <a:ext cx="1728192" cy="408623"/>
+          </a:xfrm>
+          <a:prstGeom prst="roundRect">
+            <a:avLst/>
+          </a:prstGeom>
+          <a:noFill/>
+          <a:ln w="19050">
+            <a:solidFill>
+              <a:schemeClr val="accent3"/>
+            </a:solidFill>
+          </a:ln>
+        </p:spPr>
+        <p:txBody>
+          <a:bodyPr wrap="square" rtlCol="0">
+            <a:spAutoFit/>
+          </a:bodyPr>
+          <a:lstStyle/>
+          <a:p>
+            <a:pPr algn="ctr"/>
+            <a:r>
+              <a:rPr lang="en-US" sz="1800" dirty="0" err="1" smtClean="0">
+                <a:latin typeface="Tahoma" charset="0"/>
+                <a:ea typeface="Tahoma" charset="0"/>
+                <a:cs typeface="Tahoma" charset="0"/>
+              </a:rPr>
+              <a:t>eXistdb</a:t>
+            </a:r>
+            <a:endParaRPr lang="en-US" sz="1800" dirty="0" smtClean="0">
+              <a:latin typeface="Tahoma" charset="0"/>
+              <a:ea typeface="Tahoma" charset="0"/>
+              <a:cs typeface="Tahoma" charset="0"/>
+            </a:endParaRPr>
+          </a:p>
+        </p:txBody>
+      </p:sp>
+      <p:sp>
+        <p:nvSpPr>
+          <p:cNvPr id="43" name="TextBox 42"/>
+          <p:cNvSpPr txBox="1"/>
+          <p:nvPr/>
+        </p:nvSpPr>
+        <p:spPr>
+          <a:xfrm>
+            <a:off x="5649143" y="11881891"/>
+            <a:ext cx="1728192" cy="408623"/>
+          </a:xfrm>
+          <a:prstGeom prst="roundRect">
+            <a:avLst/>
+          </a:prstGeom>
+          <a:noFill/>
+          <a:ln w="19050">
+            <a:solidFill>
+              <a:schemeClr val="accent3"/>
+            </a:solidFill>
+          </a:ln>
+        </p:spPr>
+        <p:txBody>
+          <a:bodyPr wrap="square" rtlCol="0">
+            <a:spAutoFit/>
+          </a:bodyPr>
+          <a:lstStyle/>
+          <a:p>
+            <a:pPr algn="ctr"/>
+            <a:r>
+              <a:rPr lang="en-US" sz="1800" smtClean="0">
+                <a:latin typeface="Tahoma" charset="0"/>
+                <a:ea typeface="Tahoma" charset="0"/>
+                <a:cs typeface="Tahoma" charset="0"/>
+              </a:rPr>
+              <a:t>CWRC Writer</a:t>
+            </a:r>
+            <a:endParaRPr lang="en-US" sz="1800" dirty="0" smtClean="0">
+              <a:latin typeface="Tahoma" charset="0"/>
+              <a:ea typeface="Tahoma" charset="0"/>
+              <a:cs typeface="Tahoma" charset="0"/>
+            </a:endParaRPr>
+          </a:p>
+        </p:txBody>
+      </p:sp>
+      <p:sp>
+        <p:nvSpPr>
+          <p:cNvPr id="44" name="TextBox 43"/>
+          <p:cNvSpPr txBox="1"/>
+          <p:nvPr/>
+        </p:nvSpPr>
+        <p:spPr>
+          <a:xfrm>
+            <a:off x="2048743" y="10945787"/>
+            <a:ext cx="5400600" cy="408623"/>
+          </a:xfrm>
+          <a:prstGeom prst="roundRect">
+            <a:avLst/>
+          </a:prstGeom>
+          <a:noFill/>
+          <a:ln w="19050">
+            <a:solidFill>
+              <a:schemeClr val="accent3"/>
+            </a:solidFill>
+          </a:ln>
+        </p:spPr>
+        <p:txBody>
+          <a:bodyPr wrap="square" rtlCol="0">
+            <a:spAutoFit/>
+          </a:bodyPr>
+          <a:lstStyle/>
+          <a:p>
+            <a:pPr algn="ctr"/>
+            <a:r>
+              <a:rPr lang="en-US" sz="1800" dirty="0" smtClean="0">
+                <a:latin typeface="Tahoma" charset="0"/>
+                <a:ea typeface="Tahoma" charset="0"/>
+                <a:cs typeface="Tahoma" charset="0"/>
+              </a:rPr>
+              <a:t>REST API</a:t>
+            </a:r>
+          </a:p>
+        </p:txBody>
+      </p:sp>
+      <p:sp>
+        <p:nvSpPr>
+          <p:cNvPr id="45" name="Rounded Rectangle 44"/>
+          <p:cNvSpPr/>
+          <p:nvPr/>
+        </p:nvSpPr>
+        <p:spPr>
+          <a:xfrm>
+            <a:off x="2264767" y="11881891"/>
+            <a:ext cx="1440160" cy="1224136"/>
+          </a:xfrm>
+          <a:prstGeom prst="roundRect">
+            <a:avLst/>
+          </a:prstGeom>
+          <a:noFill/>
+          <a:ln>
+            <a:solidFill>
+              <a:schemeClr val="accent3"/>
+            </a:solidFill>
+          </a:ln>
+        </p:spPr>
+        <p:style>
+          <a:lnRef idx="2">
+            <a:schemeClr val="accent1">
+              <a:shade val="50000"/>
+            </a:schemeClr>
+          </a:lnRef>
+          <a:fillRef idx="1">
+            <a:schemeClr val="accent1"/>
+          </a:fillRef>
+          <a:effectRef idx="0">
+            <a:schemeClr val="accent1"/>
+          </a:effectRef>
+          <a:fontRef idx="minor">
+            <a:schemeClr val="lt1"/>
+          </a:fontRef>
+        </p:style>
+        <p:txBody>
+          <a:bodyPr rtlCol="0" anchor="ctr"/>
+          <a:lstStyle/>
+          <a:p>
+            <a:pPr algn="ctr"/>
+            <a:endParaRPr lang="en-US" sz="1800">
               <a:latin typeface="Tahoma" charset="0"/>
               <a:ea typeface="Tahoma" charset="0"/>
               <a:cs typeface="Tahoma" charset="0"/>

</xml_diff>

<commit_message>
More edits to spacing, sizing, etc
</commit_message>
<xml_diff>
--- a/Open Repositories 2017/Charon Poster/OR2017_Charon_Poster_Working.pptx
+++ b/Open Repositories 2017/Charon Poster/OR2017_Charon_Poster_Working.pptx
@@ -120,12 +120,17 @@
   <p:extLst>
     <p:ext uri="{EFAFB233-063F-42B5-8137-9DF3F51BA10A}">
       <p15:sldGuideLst xmlns:p15="http://schemas.microsoft.com/office/powerpoint/2012/main">
-        <p15:guide id="1" orient="horz" pos="5852" userDrawn="1">
+        <p15:guide id="1" orient="horz" pos="6714" userDrawn="1">
           <p15:clr>
             <a:srgbClr val="A4A3A4"/>
           </p15:clr>
         </p15:guide>
-        <p15:guide id="2" pos="5237" userDrawn="1">
+        <p15:guide id="2" pos="429" userDrawn="1">
+          <p15:clr>
+            <a:srgbClr val="A4A3A4"/>
+          </p15:clr>
+        </p15:guide>
+        <p15:guide id="3" pos="6280" userDrawn="1">
           <p15:clr>
             <a:srgbClr val="A4A3A4"/>
           </p15:clr>
@@ -415,7 +420,7 @@
           <a:p>
             <a:fld id="{60829E41-64EF-604D-A40A-7DA186A06455}" type="datetimeFigureOut">
               <a:rPr lang="en-US" smtClean="0"/>
-              <a:t>5/25/17</a:t>
+              <a:t>5/26/17</a:t>
             </a:fld>
             <a:endParaRPr lang="en-US"/>
           </a:p>
@@ -1537,7 +1542,7 @@
             <a:fld id="{E8B92B60-3ACF-4E3B-ACCA-3CF86291A092}" type="datetimeFigureOut">
               <a:rPr lang="en-AU" smtClean="0"/>
               <a:pPr/>
-              <a:t>25/05/2017</a:t>
+              <a:t>26/05/2017</a:t>
             </a:fld>
             <a:endParaRPr lang="en-AU"/>
           </a:p>
@@ -1704,7 +1709,7 @@
             <a:fld id="{E8B92B60-3ACF-4E3B-ACCA-3CF86291A092}" type="datetimeFigureOut">
               <a:rPr lang="en-AU" smtClean="0"/>
               <a:pPr/>
-              <a:t>25/05/2017</a:t>
+              <a:t>26/05/2017</a:t>
             </a:fld>
             <a:endParaRPr lang="en-AU"/>
           </a:p>
@@ -1881,7 +1886,7 @@
             <a:fld id="{E8B92B60-3ACF-4E3B-ACCA-3CF86291A092}" type="datetimeFigureOut">
               <a:rPr lang="en-AU" smtClean="0"/>
               <a:pPr/>
-              <a:t>25/05/2017</a:t>
+              <a:t>26/05/2017</a:t>
             </a:fld>
             <a:endParaRPr lang="en-AU"/>
           </a:p>
@@ -2048,7 +2053,7 @@
             <a:fld id="{E8B92B60-3ACF-4E3B-ACCA-3CF86291A092}" type="datetimeFigureOut">
               <a:rPr lang="en-AU" smtClean="0"/>
               <a:pPr/>
-              <a:t>25/05/2017</a:t>
+              <a:t>26/05/2017</a:t>
             </a:fld>
             <a:endParaRPr lang="en-AU"/>
           </a:p>
@@ -2291,7 +2296,7 @@
             <a:fld id="{E8B92B60-3ACF-4E3B-ACCA-3CF86291A092}" type="datetimeFigureOut">
               <a:rPr lang="en-AU" smtClean="0"/>
               <a:pPr/>
-              <a:t>25/05/2017</a:t>
+              <a:t>26/05/2017</a:t>
             </a:fld>
             <a:endParaRPr lang="en-AU"/>
           </a:p>
@@ -2576,7 +2581,7 @@
             <a:fld id="{E8B92B60-3ACF-4E3B-ACCA-3CF86291A092}" type="datetimeFigureOut">
               <a:rPr lang="en-AU" smtClean="0"/>
               <a:pPr/>
-              <a:t>25/05/2017</a:t>
+              <a:t>26/05/2017</a:t>
             </a:fld>
             <a:endParaRPr lang="en-AU"/>
           </a:p>
@@ -3000,7 +3005,7 @@
             <a:fld id="{E8B92B60-3ACF-4E3B-ACCA-3CF86291A092}" type="datetimeFigureOut">
               <a:rPr lang="en-AU" smtClean="0"/>
               <a:pPr/>
-              <a:t>25/05/2017</a:t>
+              <a:t>26/05/2017</a:t>
             </a:fld>
             <a:endParaRPr lang="en-AU"/>
           </a:p>
@@ -3115,7 +3120,7 @@
             <a:fld id="{E8B92B60-3ACF-4E3B-ACCA-3CF86291A092}" type="datetimeFigureOut">
               <a:rPr lang="en-AU" smtClean="0"/>
               <a:pPr/>
-              <a:t>25/05/2017</a:t>
+              <a:t>26/05/2017</a:t>
             </a:fld>
             <a:endParaRPr lang="en-AU"/>
           </a:p>
@@ -3207,7 +3212,7 @@
             <a:fld id="{E8B92B60-3ACF-4E3B-ACCA-3CF86291A092}" type="datetimeFigureOut">
               <a:rPr lang="en-AU" smtClean="0"/>
               <a:pPr/>
-              <a:t>25/05/2017</a:t>
+              <a:t>26/05/2017</a:t>
             </a:fld>
             <a:endParaRPr lang="en-AU"/>
           </a:p>
@@ -3481,7 +3486,7 @@
             <a:fld id="{E8B92B60-3ACF-4E3B-ACCA-3CF86291A092}" type="datetimeFigureOut">
               <a:rPr lang="en-AU" smtClean="0"/>
               <a:pPr/>
-              <a:t>25/05/2017</a:t>
+              <a:t>26/05/2017</a:t>
             </a:fld>
             <a:endParaRPr lang="en-AU"/>
           </a:p>
@@ -3731,7 +3736,7 @@
             <a:fld id="{E8B92B60-3ACF-4E3B-ACCA-3CF86291A092}" type="datetimeFigureOut">
               <a:rPr lang="en-AU" smtClean="0"/>
               <a:pPr/>
-              <a:t>25/05/2017</a:t>
+              <a:t>26/05/2017</a:t>
             </a:fld>
             <a:endParaRPr lang="en-AU"/>
           </a:p>
@@ -3941,7 +3946,7 @@
             <a:fld id="{E8B92B60-3ACF-4E3B-ACCA-3CF86291A092}" type="datetimeFigureOut">
               <a:rPr lang="en-AU" smtClean="0"/>
               <a:pPr/>
-              <a:t>25/05/2017</a:t>
+              <a:t>26/05/2017</a:t>
             </a:fld>
             <a:endParaRPr lang="en-AU"/>
           </a:p>
@@ -4331,8 +4336,8 @@
         </p:nvSpPr>
         <p:spPr>
           <a:xfrm>
-            <a:off x="240699" y="16922451"/>
-            <a:ext cx="9784818" cy="1160512"/>
+            <a:off x="266858" y="16922451"/>
+            <a:ext cx="9792965" cy="1160512"/>
           </a:xfrm>
           <a:prstGeom prst="roundRect">
             <a:avLst>
@@ -4389,8 +4394,8 @@
         </p:nvSpPr>
         <p:spPr>
           <a:xfrm rot="5400000">
-            <a:off x="4812937" y="12862113"/>
-            <a:ext cx="1160512" cy="9281188"/>
+            <a:off x="4825894" y="12849156"/>
+            <a:ext cx="1160512" cy="9307102"/>
           </a:xfrm>
           <a:prstGeom prst="round2SameRect">
             <a:avLst>
@@ -4446,7 +4451,7 @@
         </p:nvSpPr>
         <p:spPr>
           <a:xfrm>
-            <a:off x="248543" y="6841331"/>
+            <a:off x="248543" y="11881891"/>
             <a:ext cx="9793088" cy="4896544"/>
           </a:xfrm>
           <a:prstGeom prst="roundRect">
@@ -4504,8 +4509,8 @@
         </p:nvSpPr>
         <p:spPr>
           <a:xfrm rot="5400000">
-            <a:off x="2984847" y="4609083"/>
-            <a:ext cx="4896544" cy="9361040"/>
+            <a:off x="2957878" y="9676612"/>
+            <a:ext cx="4896544" cy="9307101"/>
           </a:xfrm>
           <a:prstGeom prst="round2SameRect">
             <a:avLst>
@@ -4561,8 +4566,8 @@
         </p:nvSpPr>
         <p:spPr>
           <a:xfrm>
-            <a:off x="248543" y="12025907"/>
-            <a:ext cx="9793088" cy="4680520"/>
+            <a:off x="270114" y="6985347"/>
+            <a:ext cx="9573685" cy="4680520"/>
           </a:xfrm>
           <a:prstGeom prst="roundRect">
             <a:avLst>
@@ -4619,8 +4624,8 @@
         </p:nvSpPr>
         <p:spPr>
           <a:xfrm rot="5400000">
-            <a:off x="3056855" y="9721651"/>
-            <a:ext cx="4680520" cy="9289032"/>
+            <a:off x="3075270" y="4681314"/>
+            <a:ext cx="4680520" cy="9288585"/>
           </a:xfrm>
           <a:prstGeom prst="round2SameRect">
             <a:avLst>
@@ -4676,8 +4681,8 @@
         </p:nvSpPr>
         <p:spPr>
           <a:xfrm>
-            <a:off x="248543" y="3312939"/>
-            <a:ext cx="9793088" cy="3240360"/>
+            <a:off x="249357" y="3312939"/>
+            <a:ext cx="9793088" cy="3456384"/>
           </a:xfrm>
           <a:prstGeom prst="roundRect">
             <a:avLst>
@@ -4734,8 +4739,8 @@
         </p:nvSpPr>
         <p:spPr>
           <a:xfrm rot="5400000">
-            <a:off x="3776935" y="288603"/>
-            <a:ext cx="3240360" cy="9289032"/>
+            <a:off x="3678364" y="387987"/>
+            <a:ext cx="3456384" cy="9306287"/>
           </a:xfrm>
           <a:prstGeom prst="round2SameRect">
             <a:avLst/>
@@ -4788,7 +4793,7 @@
         </p:nvSpPr>
         <p:spPr>
           <a:xfrm>
-            <a:off x="1015180" y="4249043"/>
+            <a:off x="1015994" y="4249043"/>
             <a:ext cx="4176464" cy="1800200"/>
           </a:xfrm>
           <a:prstGeom prst="roundRect">
@@ -4845,8 +4850,8 @@
         </p:nvSpPr>
         <p:spPr>
           <a:xfrm>
-            <a:off x="5361111" y="3456955"/>
-            <a:ext cx="4680520" cy="2954655"/>
+            <a:off x="5793159" y="3456955"/>
+            <a:ext cx="4249286" cy="3262432"/>
           </a:xfrm>
           <a:prstGeom prst="rect">
             <a:avLst/>
@@ -5052,7 +5057,7 @@
         </p:nvSpPr>
         <p:spPr>
           <a:xfrm>
-            <a:off x="248543" y="3312939"/>
+            <a:off x="249357" y="3312939"/>
             <a:ext cx="5184576" cy="3240360"/>
           </a:xfrm>
           <a:prstGeom prst="rect">
@@ -5357,12 +5362,18 @@
         </p:blipFill>
         <p:spPr>
           <a:xfrm>
-            <a:off x="8961511" y="17066467"/>
+            <a:off x="9051711" y="17066467"/>
             <a:ext cx="936104" cy="936104"/>
           </a:xfrm>
           <a:prstGeom prst="rect">
             <a:avLst/>
           </a:prstGeom>
+          <a:noFill/>
+          <a:ln w="63500">
+            <a:solidFill>
+              <a:srgbClr val="00B050"/>
+            </a:solidFill>
+          </a:ln>
         </p:spPr>
       </p:pic>
       <p:sp>
@@ -5373,7 +5384,7 @@
         </p:nvSpPr>
         <p:spPr>
           <a:xfrm>
-            <a:off x="896615" y="16994459"/>
+            <a:off x="986815" y="16994459"/>
             <a:ext cx="8013773" cy="1000274"/>
           </a:xfrm>
           <a:prstGeom prst="rect">
@@ -5401,33 +5412,7 @@
                 <a:ea typeface="Corbel" charset="0"/>
                 <a:cs typeface="Corbel" charset="0"/>
               </a:rPr>
-              <a:t>This project is still in development and we would like your </a:t>
-            </a:r>
-            <a:r>
-              <a:rPr lang="en-US" sz="2000" smtClean="0">
-                <a:solidFill>
-                  <a:schemeClr val="bg1">
-                    <a:lumMod val="95000"/>
-                  </a:schemeClr>
-                </a:solidFill>
-                <a:latin typeface="Corbel" charset="0"/>
-                <a:ea typeface="Corbel" charset="0"/>
-                <a:cs typeface="Corbel" charset="0"/>
-              </a:rPr>
-              <a:t>input</a:t>
-            </a:r>
-            <a:r>
-              <a:rPr lang="en-US" sz="2000" smtClean="0">
-                <a:solidFill>
-                  <a:schemeClr val="bg1">
-                    <a:lumMod val="95000"/>
-                  </a:schemeClr>
-                </a:solidFill>
-                <a:latin typeface="Corbel" charset="0"/>
-                <a:ea typeface="Corbel" charset="0"/>
-                <a:cs typeface="Corbel" charset="0"/>
-              </a:rPr>
-              <a:t>!</a:t>
+              <a:t>This project is still in development and we would like your input!</a:t>
             </a:r>
           </a:p>
           <a:p>
@@ -5454,7 +5439,57 @@
                 <a:ea typeface="Corbel" charset="0"/>
                 <a:cs typeface="Corbel" charset="0"/>
               </a:rPr>
-              <a:t>Scan the QR code on the right to review and comment on Charon's technical specification. Any and all feedback is welcome!</a:t>
+              <a:t>Scan the QR code on the </a:t>
+            </a:r>
+            <a:r>
+              <a:rPr lang="en-US" sz="2000" dirty="0" smtClean="0">
+                <a:solidFill>
+                  <a:schemeClr val="bg1">
+                    <a:lumMod val="95000"/>
+                  </a:schemeClr>
+                </a:solidFill>
+                <a:latin typeface="Corbel" charset="0"/>
+                <a:ea typeface="Corbel" charset="0"/>
+                <a:cs typeface="Corbel" charset="0"/>
+              </a:rPr>
+              <a:t>right or visit </a:t>
+            </a:r>
+            <a:r>
+              <a:rPr lang="en-US" sz="2000" dirty="0" smtClean="0">
+                <a:solidFill>
+                  <a:srgbClr val="00B050"/>
+                </a:solidFill>
+                <a:latin typeface="Corbel" charset="0"/>
+                <a:ea typeface="Corbel" charset="0"/>
+                <a:cs typeface="Corbel" charset="0"/>
+              </a:rPr>
+              <a:t>[URL]</a:t>
+            </a:r>
+            <a:r>
+              <a:rPr lang="en-US" sz="2000" dirty="0" smtClean="0">
+                <a:solidFill>
+                  <a:schemeClr val="bg1">
+                    <a:lumMod val="95000"/>
+                  </a:schemeClr>
+                </a:solidFill>
+                <a:latin typeface="Corbel" charset="0"/>
+                <a:ea typeface="Corbel" charset="0"/>
+                <a:cs typeface="Corbel" charset="0"/>
+              </a:rPr>
+              <a:t> </a:t>
+            </a:r>
+            <a:r>
+              <a:rPr lang="en-US" sz="2000" dirty="0" smtClean="0">
+                <a:solidFill>
+                  <a:schemeClr val="bg1">
+                    <a:lumMod val="95000"/>
+                  </a:schemeClr>
+                </a:solidFill>
+                <a:latin typeface="Corbel" charset="0"/>
+                <a:ea typeface="Corbel" charset="0"/>
+                <a:cs typeface="Corbel" charset="0"/>
+              </a:rPr>
+              <a:t>to review and comment on Charon's technical specification. Any and all feedback is welcome!</a:t>
             </a:r>
             <a:endParaRPr lang="en-US" sz="2000" dirty="0">
               <a:solidFill>
@@ -5477,19 +5512,19 @@
         </p:nvSpPr>
         <p:spPr>
           <a:xfrm rot="16200000">
-            <a:off x="-76071" y="17319076"/>
-            <a:ext cx="1080122" cy="430887"/>
+            <a:off x="-93611" y="17264605"/>
+            <a:ext cx="1152128" cy="467820"/>
           </a:xfrm>
           <a:prstGeom prst="rect">
             <a:avLst/>
           </a:prstGeom>
           <a:noFill/>
-          <a:ln>
+          <a:ln w="19050">
             <a:noFill/>
           </a:ln>
         </p:spPr>
         <p:txBody>
-          <a:bodyPr wrap="square" lIns="0" tIns="0" rIns="0" bIns="0" rtlCol="0">
+          <a:bodyPr wrap="square" lIns="0" tIns="18288" rIns="0" bIns="18288" rtlCol="0">
             <a:spAutoFit/>
           </a:bodyPr>
           <a:lstStyle/>
@@ -5506,14 +5541,6 @@
               </a:rPr>
               <a:t>You!</a:t>
             </a:r>
-            <a:endParaRPr lang="en-US" sz="2800" dirty="0" smtClean="0">
-              <a:solidFill>
-                <a:srgbClr val="73626E"/>
-              </a:solidFill>
-              <a:latin typeface="Corbel" charset="0"/>
-              <a:ea typeface="Corbel" charset="0"/>
-              <a:cs typeface="Corbel" charset="0"/>
-            </a:endParaRPr>
           </a:p>
         </p:txBody>
       </p:sp>
@@ -5525,7 +5552,7 @@
         </p:nvSpPr>
         <p:spPr>
           <a:xfrm>
-            <a:off x="1735260" y="6121251"/>
+            <a:off x="1736074" y="6121251"/>
             <a:ext cx="2736304" cy="381381"/>
           </a:xfrm>
           <a:prstGeom prst="roundRect">
@@ -5577,7 +5604,7 @@
         </p:nvSpPr>
         <p:spPr>
           <a:xfrm>
-            <a:off x="1735260" y="3384947"/>
+            <a:off x="1736074" y="3384947"/>
             <a:ext cx="2736304" cy="381381"/>
           </a:xfrm>
           <a:prstGeom prst="roundRect">
@@ -5621,7 +5648,7 @@
         </p:nvSpPr>
         <p:spPr>
           <a:xfrm rot="16200000">
-            <a:off x="-1789178" y="14132257"/>
+            <a:off x="-1839615" y="9091697"/>
             <a:ext cx="4680520" cy="467820"/>
           </a:xfrm>
           <a:prstGeom prst="rect">
@@ -5661,7 +5688,7 @@
         </p:nvSpPr>
         <p:spPr>
           <a:xfrm>
-            <a:off x="1735259" y="3816995"/>
+            <a:off x="1736073" y="3816995"/>
             <a:ext cx="2736305" cy="381381"/>
           </a:xfrm>
           <a:prstGeom prst="roundRect">
@@ -5705,8 +5732,8 @@
         </p:nvSpPr>
         <p:spPr>
           <a:xfrm rot="16200000">
-            <a:off x="-1965819" y="9056140"/>
-            <a:ext cx="5040560" cy="467820"/>
+            <a:off x="-1947627" y="14096253"/>
+            <a:ext cx="4896544" cy="467820"/>
           </a:xfrm>
           <a:prstGeom prst="rect">
             <a:avLst/>
@@ -5758,7 +5785,7 @@
         </p:blipFill>
         <p:spPr>
           <a:xfrm>
-            <a:off x="896615" y="8713539"/>
+            <a:off x="896615" y="13754099"/>
             <a:ext cx="5112568" cy="2889794"/>
           </a:xfrm>
           <a:prstGeom prst="rect">
@@ -5774,7 +5801,7 @@
         </p:nvSpPr>
         <p:spPr>
           <a:xfrm rot="10800000" flipV="1">
-            <a:off x="4280991" y="7489403"/>
+            <a:off x="4280991" y="12529963"/>
             <a:ext cx="5832648" cy="2880320"/>
           </a:xfrm>
           <a:prstGeom prst="arc">
@@ -5827,7 +5854,7 @@
         </p:nvSpPr>
         <p:spPr>
           <a:xfrm rot="10800000" flipV="1">
-            <a:off x="4352999" y="8209483"/>
+            <a:off x="4352999" y="13250043"/>
             <a:ext cx="5400600" cy="2232248"/>
           </a:xfrm>
           <a:prstGeom prst="arc">
@@ -5880,7 +5907,7 @@
         </p:nvSpPr>
         <p:spPr>
           <a:xfrm rot="10800000" flipV="1">
-            <a:off x="5649143" y="9361611"/>
+            <a:off x="5649143" y="14402171"/>
             <a:ext cx="1944216" cy="1512168"/>
           </a:xfrm>
           <a:prstGeom prst="arc">
@@ -5933,7 +5960,7 @@
         </p:nvSpPr>
         <p:spPr>
           <a:xfrm rot="10800000" flipV="1">
-            <a:off x="4715597" y="8281491"/>
+            <a:off x="4715597" y="13322051"/>
             <a:ext cx="5149499" cy="2808312"/>
           </a:xfrm>
           <a:prstGeom prst="arc">
@@ -5986,7 +6013,7 @@
         </p:nvSpPr>
         <p:spPr>
           <a:xfrm>
-            <a:off x="6297215" y="7849443"/>
+            <a:off x="6297215" y="12890003"/>
             <a:ext cx="3528392" cy="1055608"/>
           </a:xfrm>
           <a:prstGeom prst="roundRect">
@@ -6065,14 +6092,14 @@
       </p:sp>
       <p:sp>
         <p:nvSpPr>
-          <p:cNvPr id="83" name="TextBox 82"/>
+          <p:cNvPr id="84" name="TextBox 83"/>
           <p:cNvSpPr txBox="1"/>
           <p:nvPr/>
         </p:nvSpPr>
         <p:spPr>
           <a:xfrm>
-            <a:off x="896615" y="6985347"/>
-            <a:ext cx="3528392" cy="1362075"/>
+            <a:off x="6297215" y="14042131"/>
+            <a:ext cx="3528392" cy="2587943"/>
           </a:xfrm>
           <a:prstGeom prst="roundRect">
             <a:avLst/>
@@ -6101,7 +6128,7 @@
                 <a:ea typeface="Corbel" charset="0"/>
                 <a:cs typeface="Corbel" charset="0"/>
               </a:rPr>
-              <a:t>Editors</a:t>
+              <a:t>Administrator(s)</a:t>
             </a:r>
           </a:p>
           <a:p>
@@ -6153,6 +6180,40 @@
                 <a:cs typeface="Corbel" charset="0"/>
               </a:rPr>
               <a:t>Accept and reject deposits</a:t>
+            </a:r>
+          </a:p>
+          <a:p>
+            <a:pPr marL="342900" indent="-342900">
+              <a:buFont typeface="Arial" charset="0"/>
+              <a:buChar char="•"/>
+            </a:pPr>
+            <a:r>
+              <a:rPr lang="en-US" sz="1800" dirty="0" smtClean="0">
+                <a:solidFill>
+                  <a:srgbClr val="73626E"/>
+                </a:solidFill>
+                <a:latin typeface="Corbel" charset="0"/>
+                <a:ea typeface="Corbel" charset="0"/>
+                <a:cs typeface="Corbel" charset="0"/>
+              </a:rPr>
+              <a:t>Configure users, models, and workflows</a:t>
+            </a:r>
+          </a:p>
+          <a:p>
+            <a:pPr marL="342900" indent="-342900">
+              <a:buFont typeface="Arial" charset="0"/>
+              <a:buChar char="•"/>
+            </a:pPr>
+            <a:r>
+              <a:rPr lang="en-US" sz="1800" dirty="0" smtClean="0">
+                <a:solidFill>
+                  <a:srgbClr val="73626E"/>
+                </a:solidFill>
+                <a:latin typeface="Corbel" charset="0"/>
+                <a:ea typeface="Corbel" charset="0"/>
+                <a:cs typeface="Corbel" charset="0"/>
+              </a:rPr>
+              <a:t>Bulk review and processing</a:t>
             </a:r>
             <a:endParaRPr lang="en-US" sz="1800" dirty="0">
               <a:solidFill>
@@ -6167,149 +6228,13 @@
       </p:sp>
       <p:sp>
         <p:nvSpPr>
-          <p:cNvPr id="84" name="TextBox 83"/>
-          <p:cNvSpPr txBox="1"/>
-          <p:nvPr/>
-        </p:nvSpPr>
-        <p:spPr>
-          <a:xfrm>
-            <a:off x="6297215" y="9001571"/>
-            <a:ext cx="3528392" cy="2587943"/>
-          </a:xfrm>
-          <a:prstGeom prst="roundRect">
-            <a:avLst/>
-          </a:prstGeom>
-          <a:solidFill>
-            <a:schemeClr val="bg1">
-              <a:lumMod val="85000"/>
-            </a:schemeClr>
-          </a:solidFill>
-          <a:ln>
-            <a:noFill/>
-          </a:ln>
-        </p:spPr>
-        <p:txBody>
-          <a:bodyPr wrap="square" rtlCol="0">
-            <a:spAutoFit/>
-          </a:bodyPr>
-          <a:lstStyle/>
-          <a:p>
-            <a:r>
-              <a:rPr lang="en-US" sz="2000" b="1" dirty="0" smtClean="0">
-                <a:solidFill>
-                  <a:srgbClr val="73626E"/>
-                </a:solidFill>
-                <a:latin typeface="Corbel" charset="0"/>
-                <a:ea typeface="Corbel" charset="0"/>
-                <a:cs typeface="Corbel" charset="0"/>
-              </a:rPr>
-              <a:t>Administrator(s)</a:t>
-            </a:r>
-          </a:p>
-          <a:p>
-            <a:pPr marL="342900" indent="-342900">
-              <a:buFont typeface="Arial" charset="0"/>
-              <a:buChar char="•"/>
-            </a:pPr>
-            <a:r>
-              <a:rPr lang="en-US" sz="1800" dirty="0" smtClean="0">
-                <a:solidFill>
-                  <a:srgbClr val="73626E"/>
-                </a:solidFill>
-                <a:latin typeface="Corbel" charset="0"/>
-                <a:ea typeface="Corbel" charset="0"/>
-                <a:cs typeface="Corbel" charset="0"/>
-              </a:rPr>
-              <a:t>Contribute files and metadata</a:t>
-            </a:r>
-          </a:p>
-          <a:p>
-            <a:pPr marL="342900" indent="-342900">
-              <a:buFont typeface="Arial" charset="0"/>
-              <a:buChar char="•"/>
-            </a:pPr>
-            <a:r>
-              <a:rPr lang="en-US" sz="1800" dirty="0" smtClean="0">
-                <a:solidFill>
-                  <a:srgbClr val="73626E"/>
-                </a:solidFill>
-                <a:latin typeface="Corbel" charset="0"/>
-                <a:ea typeface="Corbel" charset="0"/>
-                <a:cs typeface="Corbel" charset="0"/>
-              </a:rPr>
-              <a:t>Claim and execute tasks</a:t>
-            </a:r>
-          </a:p>
-          <a:p>
-            <a:pPr marL="342900" indent="-342900">
-              <a:buFont typeface="Arial" charset="0"/>
-              <a:buChar char="•"/>
-            </a:pPr>
-            <a:r>
-              <a:rPr lang="en-US" sz="1800" dirty="0" smtClean="0">
-                <a:solidFill>
-                  <a:srgbClr val="73626E"/>
-                </a:solidFill>
-                <a:latin typeface="Corbel" charset="0"/>
-                <a:ea typeface="Corbel" charset="0"/>
-                <a:cs typeface="Corbel" charset="0"/>
-              </a:rPr>
-              <a:t>Accept and reject deposits</a:t>
-            </a:r>
-          </a:p>
-          <a:p>
-            <a:pPr marL="342900" indent="-342900">
-              <a:buFont typeface="Arial" charset="0"/>
-              <a:buChar char="•"/>
-            </a:pPr>
-            <a:r>
-              <a:rPr lang="en-US" sz="1800" dirty="0" smtClean="0">
-                <a:solidFill>
-                  <a:srgbClr val="73626E"/>
-                </a:solidFill>
-                <a:latin typeface="Corbel" charset="0"/>
-                <a:ea typeface="Corbel" charset="0"/>
-                <a:cs typeface="Corbel" charset="0"/>
-              </a:rPr>
-              <a:t>Configure users, models, and workflows</a:t>
-            </a:r>
-          </a:p>
-          <a:p>
-            <a:pPr marL="342900" indent="-342900">
-              <a:buFont typeface="Arial" charset="0"/>
-              <a:buChar char="•"/>
-            </a:pPr>
-            <a:r>
-              <a:rPr lang="en-US" sz="1800" dirty="0" smtClean="0">
-                <a:solidFill>
-                  <a:srgbClr val="73626E"/>
-                </a:solidFill>
-                <a:latin typeface="Corbel" charset="0"/>
-                <a:ea typeface="Corbel" charset="0"/>
-                <a:cs typeface="Corbel" charset="0"/>
-              </a:rPr>
-              <a:t>Bulk review and processing</a:t>
-            </a:r>
-            <a:endParaRPr lang="en-US" sz="1800" dirty="0">
-              <a:solidFill>
-                <a:srgbClr val="73626E"/>
-              </a:solidFill>
-              <a:latin typeface="Corbel" charset="0"/>
-              <a:ea typeface="Corbel" charset="0"/>
-              <a:cs typeface="Corbel" charset="0"/>
-            </a:endParaRPr>
-          </a:p>
-        </p:txBody>
-      </p:sp>
-      <p:sp>
-        <p:nvSpPr>
           <p:cNvPr id="93" name="Arc 92"/>
           <p:cNvSpPr/>
           <p:nvPr/>
         </p:nvSpPr>
         <p:spPr>
           <a:xfrm rot="10800000" flipV="1">
-            <a:off x="4064967" y="7489403"/>
+            <a:off x="4064967" y="12529963"/>
             <a:ext cx="5904656" cy="3024336"/>
           </a:xfrm>
           <a:prstGeom prst="arc">
@@ -6362,10 +6287,10 @@
         </p:nvSpPr>
         <p:spPr>
           <a:xfrm>
-            <a:off x="896615" y="12175147"/>
-            <a:ext cx="2664296" cy="1323439"/>
-          </a:xfrm>
-          <a:prstGeom prst="rect">
+            <a:off x="914807" y="8137475"/>
+            <a:ext cx="2804933" cy="1464231"/>
+          </a:xfrm>
+          <a:prstGeom prst="roundRect">
             <a:avLst/>
           </a:prstGeom>
           <a:solidFill>
@@ -6476,31 +6401,29 @@
         </p:blipFill>
         <p:spPr>
           <a:xfrm>
-            <a:off x="3739206" y="13466067"/>
+            <a:off x="3870514" y="8101024"/>
             <a:ext cx="707875" cy="576064"/>
           </a:xfrm>
           <a:prstGeom prst="rect">
             <a:avLst/>
           </a:prstGeom>
           <a:ln>
-            <a:solidFill>
-              <a:schemeClr val="bg1"/>
-            </a:solidFill>
+            <a:noFill/>
           </a:ln>
         </p:spPr>
       </p:pic>
       <p:sp>
         <p:nvSpPr>
-          <p:cNvPr id="98" name="Diamond 97"/>
+          <p:cNvPr id="99" name="Rectangle 98"/>
           <p:cNvSpPr/>
           <p:nvPr/>
         </p:nvSpPr>
         <p:spPr>
           <a:xfrm>
-            <a:off x="4759523" y="13322051"/>
-            <a:ext cx="864096" cy="864096"/>
-          </a:xfrm>
-          <a:prstGeom prst="diamond">
+            <a:off x="6318786" y="7596968"/>
+            <a:ext cx="685800" cy="685800"/>
+          </a:xfrm>
+          <a:prstGeom prst="rect">
             <a:avLst/>
           </a:prstGeom>
           <a:solidFill>
@@ -6529,7 +6452,7 @@
           </a:fontRef>
         </p:style>
         <p:txBody>
-          <a:bodyPr lIns="0" tIns="0" rIns="0" bIns="0" rtlCol="0" anchor="ctr"/>
+          <a:bodyPr rtlCol="0" anchor="ctr"/>
           <a:lstStyle/>
           <a:p>
             <a:pPr algn="ctr"/>
@@ -6542,7 +6465,7 @@
                 <a:ea typeface="Corbel" charset="0"/>
                 <a:cs typeface="Corbel" charset="0"/>
               </a:rPr>
-              <a:t>Role</a:t>
+              <a:t>Task</a:t>
             </a:r>
             <a:endParaRPr lang="en-US" sz="1800" dirty="0">
               <a:solidFill>
@@ -6557,13 +6480,13 @@
       </p:sp>
       <p:sp>
         <p:nvSpPr>
-          <p:cNvPr id="99" name="Rectangle 98"/>
+          <p:cNvPr id="100" name="Rectangle 99"/>
           <p:cNvSpPr/>
           <p:nvPr/>
         </p:nvSpPr>
         <p:spPr>
           <a:xfrm>
-            <a:off x="6127675" y="12962011"/>
+            <a:off x="6318786" y="8493620"/>
             <a:ext cx="685800" cy="685800"/>
           </a:xfrm>
           <a:prstGeom prst="rect">
@@ -6623,14 +6546,14 @@
       </p:sp>
       <p:sp>
         <p:nvSpPr>
-          <p:cNvPr id="100" name="Rectangle 99"/>
+          <p:cNvPr id="101" name="Rectangle 100"/>
           <p:cNvSpPr/>
           <p:nvPr/>
         </p:nvSpPr>
         <p:spPr>
           <a:xfrm>
-            <a:off x="6127675" y="13898115"/>
-            <a:ext cx="685800" cy="685800"/>
+            <a:off x="7361177" y="7596968"/>
+            <a:ext cx="1152128" cy="685800"/>
           </a:xfrm>
           <a:prstGeom prst="rect">
             <a:avLst/>
@@ -6674,7 +6597,7 @@
                 <a:ea typeface="Corbel" charset="0"/>
                 <a:cs typeface="Corbel" charset="0"/>
               </a:rPr>
-              <a:t>Task</a:t>
+              <a:t>Interface</a:t>
             </a:r>
             <a:endParaRPr lang="en-US" sz="1800" dirty="0">
               <a:solidFill>
@@ -6689,13 +6612,13 @@
       </p:sp>
       <p:sp>
         <p:nvSpPr>
-          <p:cNvPr id="101" name="Rectangle 100"/>
+          <p:cNvPr id="102" name="Rectangle 101"/>
           <p:cNvSpPr/>
           <p:nvPr/>
         </p:nvSpPr>
         <p:spPr>
           <a:xfrm>
-            <a:off x="7411614" y="12708880"/>
+            <a:off x="7398906" y="8821104"/>
             <a:ext cx="1152128" cy="685800"/>
           </a:xfrm>
           <a:prstGeom prst="rect">
@@ -6732,7 +6655,7 @@
           <a:p>
             <a:pPr algn="ctr"/>
             <a:r>
-              <a:rPr lang="en-US" sz="1800" dirty="0" smtClean="0">
+              <a:rPr lang="en-US" sz="1800" smtClean="0">
                 <a:solidFill>
                   <a:srgbClr val="73626E"/>
                 </a:solidFill>
@@ -6755,14 +6678,14 @@
       </p:sp>
       <p:sp>
         <p:nvSpPr>
-          <p:cNvPr id="102" name="Rectangle 101"/>
+          <p:cNvPr id="104" name="Rectangle 103"/>
           <p:cNvSpPr/>
           <p:nvPr/>
         </p:nvSpPr>
         <p:spPr>
           <a:xfrm>
-            <a:off x="7411614" y="14186147"/>
-            <a:ext cx="1152128" cy="685800"/>
+            <a:off x="9017362" y="7236928"/>
+            <a:ext cx="685800" cy="685800"/>
           </a:xfrm>
           <a:prstGeom prst="rect">
             <a:avLst/>
@@ -6798,7 +6721,7 @@
           <a:p>
             <a:pPr algn="ctr"/>
             <a:r>
-              <a:rPr lang="en-US" sz="1800" smtClean="0">
+              <a:rPr lang="en-US" sz="1800" dirty="0" smtClean="0">
                 <a:solidFill>
                   <a:srgbClr val="73626E"/>
                 </a:solidFill>
@@ -6806,7 +6729,7 @@
                 <a:ea typeface="Corbel" charset="0"/>
                 <a:cs typeface="Corbel" charset="0"/>
               </a:rPr>
-              <a:t>Interface</a:t>
+              <a:t>Tool</a:t>
             </a:r>
             <a:endParaRPr lang="en-US" sz="1800" dirty="0">
               <a:solidFill>
@@ -6821,13 +6744,13 @@
       </p:sp>
       <p:sp>
         <p:nvSpPr>
-          <p:cNvPr id="104" name="Rectangle 103"/>
+          <p:cNvPr id="105" name="Rectangle 104"/>
           <p:cNvSpPr/>
           <p:nvPr/>
         </p:nvSpPr>
         <p:spPr>
           <a:xfrm>
-            <a:off x="9067799" y="12313939"/>
+            <a:off x="9017362" y="8029016"/>
             <a:ext cx="685800" cy="685800"/>
           </a:xfrm>
           <a:prstGeom prst="rect">
@@ -6864,7 +6787,7 @@
           <a:p>
             <a:pPr algn="ctr"/>
             <a:r>
-              <a:rPr lang="en-US" sz="1800" dirty="0" smtClean="0">
+              <a:rPr lang="en-US" sz="1800" smtClean="0">
                 <a:solidFill>
                   <a:srgbClr val="73626E"/>
                 </a:solidFill>
@@ -6887,13 +6810,13 @@
       </p:sp>
       <p:sp>
         <p:nvSpPr>
-          <p:cNvPr id="105" name="Rectangle 104"/>
+          <p:cNvPr id="106" name="Rectangle 105"/>
           <p:cNvSpPr/>
           <p:nvPr/>
         </p:nvSpPr>
         <p:spPr>
           <a:xfrm>
-            <a:off x="9067799" y="13166595"/>
+            <a:off x="9017361" y="8821104"/>
             <a:ext cx="685800" cy="685800"/>
           </a:xfrm>
           <a:prstGeom prst="rect">
@@ -6951,72 +6874,6 @@
           </a:p>
         </p:txBody>
       </p:sp>
-      <p:sp>
-        <p:nvSpPr>
-          <p:cNvPr id="106" name="Rectangle 105"/>
-          <p:cNvSpPr/>
-          <p:nvPr/>
-        </p:nvSpPr>
-        <p:spPr>
-          <a:xfrm>
-            <a:off x="9067798" y="14186147"/>
-            <a:ext cx="685800" cy="685800"/>
-          </a:xfrm>
-          <a:prstGeom prst="rect">
-            <a:avLst/>
-          </a:prstGeom>
-          <a:solidFill>
-            <a:schemeClr val="bg1">
-              <a:lumMod val="85000"/>
-            </a:schemeClr>
-          </a:solidFill>
-          <a:ln>
-            <a:noFill/>
-          </a:ln>
-        </p:spPr>
-        <p:style>
-          <a:lnRef idx="2">
-            <a:schemeClr val="accent1">
-              <a:shade val="50000"/>
-            </a:schemeClr>
-          </a:lnRef>
-          <a:fillRef idx="1">
-            <a:schemeClr val="accent1"/>
-          </a:fillRef>
-          <a:effectRef idx="0">
-            <a:schemeClr val="accent1"/>
-          </a:effectRef>
-          <a:fontRef idx="minor">
-            <a:schemeClr val="lt1"/>
-          </a:fontRef>
-        </p:style>
-        <p:txBody>
-          <a:bodyPr rtlCol="0" anchor="ctr"/>
-          <a:lstStyle/>
-          <a:p>
-            <a:pPr algn="ctr"/>
-            <a:r>
-              <a:rPr lang="en-US" sz="1800" smtClean="0">
-                <a:solidFill>
-                  <a:srgbClr val="73626E"/>
-                </a:solidFill>
-                <a:latin typeface="Corbel" charset="0"/>
-                <a:ea typeface="Corbel" charset="0"/>
-                <a:cs typeface="Corbel" charset="0"/>
-              </a:rPr>
-              <a:t>Tool</a:t>
-            </a:r>
-            <a:endParaRPr lang="en-US" sz="1800" dirty="0">
-              <a:solidFill>
-                <a:srgbClr val="73626E"/>
-              </a:solidFill>
-              <a:latin typeface="Corbel" charset="0"/>
-              <a:ea typeface="Corbel" charset="0"/>
-              <a:cs typeface="Corbel" charset="0"/>
-            </a:endParaRPr>
-          </a:p>
-        </p:txBody>
-      </p:sp>
       <p:cxnSp>
         <p:nvCxnSpPr>
           <p:cNvPr id="109" name="Straight Arrow Connector 108"/>
@@ -7027,7 +6884,7 @@
         </p:nvCxnSpPr>
         <p:spPr>
           <a:xfrm>
-            <a:off x="4447081" y="13754099"/>
+            <a:off x="4578389" y="8389056"/>
             <a:ext cx="481982" cy="0"/>
           </a:xfrm>
           <a:prstGeom prst="straightConnector1">
@@ -7069,8 +6926,8 @@
         </p:nvCxnSpPr>
         <p:spPr>
           <a:xfrm>
-            <a:off x="6813475" y="14241015"/>
-            <a:ext cx="598139" cy="288032"/>
+            <a:off x="7004586" y="8836520"/>
+            <a:ext cx="394320" cy="327484"/>
           </a:xfrm>
           <a:prstGeom prst="bentConnector3">
             <a:avLst>
@@ -7112,8 +6969,8 @@
         </p:nvCxnSpPr>
         <p:spPr>
           <a:xfrm flipH="1">
-            <a:off x="8563742" y="14529047"/>
-            <a:ext cx="504056" cy="0"/>
+            <a:off x="8551034" y="9164004"/>
+            <a:ext cx="466327" cy="0"/>
           </a:xfrm>
           <a:prstGeom prst="straightConnector1">
             <a:avLst/>
@@ -7145,16 +7002,16 @@
       </p:cxnSp>
       <p:sp>
         <p:nvSpPr>
-          <p:cNvPr id="171" name="TextBox 170"/>
-          <p:cNvSpPr txBox="1"/>
-          <p:nvPr/>
-        </p:nvSpPr>
-        <p:spPr>
-          <a:xfrm>
-            <a:off x="896615" y="13543299"/>
-            <a:ext cx="2664296" cy="1015663"/>
-          </a:xfrm>
-          <a:prstGeom prst="rect">
+          <p:cNvPr id="21" name="Rounded Rectangle 20"/>
+          <p:cNvSpPr/>
+          <p:nvPr/>
+        </p:nvSpPr>
+        <p:spPr>
+          <a:xfrm>
+            <a:off x="5886738" y="9829216"/>
+            <a:ext cx="3888432" cy="1656184"/>
+          </a:xfrm>
+          <a:prstGeom prst="roundRect">
             <a:avLst/>
           </a:prstGeom>
           <a:solidFill>
@@ -7162,74 +7019,47 @@
               <a:lumMod val="85000"/>
             </a:schemeClr>
           </a:solidFill>
-        </p:spPr>
-        <p:txBody>
-          <a:bodyPr wrap="square" rtlCol="0">
-            <a:spAutoFit/>
-          </a:bodyPr>
+          <a:ln>
+            <a:noFill/>
+          </a:ln>
+        </p:spPr>
+        <p:style>
+          <a:lnRef idx="2">
+            <a:schemeClr val="accent1">
+              <a:shade val="50000"/>
+            </a:schemeClr>
+          </a:lnRef>
+          <a:fillRef idx="1">
+            <a:schemeClr val="accent1"/>
+          </a:fillRef>
+          <a:effectRef idx="0">
+            <a:schemeClr val="accent1"/>
+          </a:effectRef>
+          <a:fontRef idx="minor">
+            <a:schemeClr val="lt1"/>
+          </a:fontRef>
+        </p:style>
+        <p:txBody>
+          <a:bodyPr rtlCol="0" anchor="ctr"/>
           <a:lstStyle/>
           <a:p>
             <a:pPr algn="ctr"/>
-            <a:r>
-              <a:rPr lang="en-US" sz="2000" b="1" dirty="0" smtClean="0">
-                <a:solidFill>
-                  <a:srgbClr val="73626E"/>
-                </a:solidFill>
-                <a:latin typeface="Corbel" charset="0"/>
-                <a:ea typeface="Corbel" charset="0"/>
-                <a:cs typeface="Corbel" charset="0"/>
-              </a:rPr>
-              <a:t>{ Submit 📮 }</a:t>
-            </a:r>
-          </a:p>
-          <a:p>
-            <a:pPr marL="342900" indent="-342900">
-              <a:buFont typeface="Arial" charset="0"/>
-              <a:buChar char="•"/>
-            </a:pPr>
-            <a:r>
-              <a:rPr lang="en-US" sz="2000" dirty="0" smtClean="0">
-                <a:solidFill>
-                  <a:srgbClr val="73626E"/>
-                </a:solidFill>
-                <a:latin typeface="Corbel" charset="0"/>
-                <a:ea typeface="Corbel" charset="0"/>
-                <a:cs typeface="Corbel" charset="0"/>
-              </a:rPr>
-              <a:t>Deposit files</a:t>
-            </a:r>
-          </a:p>
-          <a:p>
-            <a:pPr marL="342900" indent="-342900">
-              <a:buFont typeface="Arial" charset="0"/>
-              <a:buChar char="•"/>
-            </a:pPr>
-            <a:r>
-              <a:rPr lang="en-US" sz="2000" dirty="0" smtClean="0">
-                <a:solidFill>
-                  <a:srgbClr val="73626E"/>
-                </a:solidFill>
-                <a:latin typeface="Corbel" charset="0"/>
-                <a:ea typeface="Corbel" charset="0"/>
-                <a:cs typeface="Corbel" charset="0"/>
-              </a:rPr>
-              <a:t>Review deposits</a:t>
-            </a:r>
-          </a:p>
-        </p:txBody>
-      </p:sp>
-      <p:sp>
-        <p:nvSpPr>
-          <p:cNvPr id="172" name="TextBox 171"/>
+            <a:endParaRPr lang="en-US"/>
+          </a:p>
+        </p:txBody>
+      </p:sp>
+      <p:sp>
+        <p:nvSpPr>
+          <p:cNvPr id="171" name="TextBox 170"/>
           <p:cNvSpPr txBox="1"/>
           <p:nvPr/>
         </p:nvSpPr>
         <p:spPr>
           <a:xfrm>
-            <a:off x="896615" y="14623419"/>
-            <a:ext cx="2664718" cy="1938992"/>
-          </a:xfrm>
-          <a:prstGeom prst="rect">
+            <a:off x="2354967" y="10110107"/>
+            <a:ext cx="2664296" cy="1123712"/>
+          </a:xfrm>
+          <a:prstGeom prst="roundRect">
             <a:avLst/>
           </a:prstGeom>
           <a:solidFill>
@@ -7254,7 +7084,7 @@
                 <a:ea typeface="Corbel" charset="0"/>
                 <a:cs typeface="Corbel" charset="0"/>
               </a:rPr>
-              <a:t>{ Edit ✏️ }</a:t>
+              <a:t>{ Submit 📮 }</a:t>
             </a:r>
           </a:p>
           <a:p>
@@ -7271,7 +7101,7 @@
                 <a:ea typeface="Corbel" charset="0"/>
                 <a:cs typeface="Corbel" charset="0"/>
               </a:rPr>
-              <a:t>Catalog</a:t>
+              <a:t>Deposit files</a:t>
             </a:r>
           </a:p>
           <a:p>
@@ -7288,9 +7118,32 @@
                 <a:ea typeface="Corbel" charset="0"/>
                 <a:cs typeface="Corbel" charset="0"/>
               </a:rPr>
-              <a:t>Transcribe</a:t>
-            </a:r>
-          </a:p>
+              <a:t>Review deposits</a:t>
+            </a:r>
+          </a:p>
+        </p:txBody>
+      </p:sp>
+      <p:sp>
+        <p:nvSpPr>
+          <p:cNvPr id="172" name="TextBox 171"/>
+          <p:cNvSpPr txBox="1"/>
+          <p:nvPr/>
+        </p:nvSpPr>
+        <p:spPr>
+          <a:xfrm>
+            <a:off x="6030754" y="10333272"/>
+            <a:ext cx="3672408" cy="1123712"/>
+          </a:xfrm>
+          <a:prstGeom prst="roundRect">
+            <a:avLst/>
+          </a:prstGeom>
+          <a:noFill/>
+        </p:spPr>
+        <p:txBody>
+          <a:bodyPr wrap="square" numCol="2" rtlCol="0">
+            <a:spAutoFit/>
+          </a:bodyPr>
+          <a:lstStyle/>
           <a:p>
             <a:pPr marL="342900" indent="-342900">
               <a:buFont typeface="Arial" charset="0"/>
@@ -7305,8 +7158,58 @@
                 <a:ea typeface="Corbel" charset="0"/>
                 <a:cs typeface="Corbel" charset="0"/>
               </a:rPr>
+              <a:t>Catalog</a:t>
+            </a:r>
+            <a:endParaRPr lang="en-US" sz="2000" dirty="0" smtClean="0">
+              <a:solidFill>
+                <a:srgbClr val="73626E"/>
+              </a:solidFill>
+              <a:latin typeface="Corbel" charset="0"/>
+              <a:ea typeface="Corbel" charset="0"/>
+              <a:cs typeface="Corbel" charset="0"/>
+            </a:endParaRPr>
+          </a:p>
+          <a:p>
+            <a:pPr marL="342900" indent="-342900">
+              <a:buFont typeface="Arial" charset="0"/>
+              <a:buChar char="•"/>
+            </a:pPr>
+            <a:r>
+              <a:rPr lang="en-US" sz="2000" dirty="0" smtClean="0">
+                <a:solidFill>
+                  <a:srgbClr val="73626E"/>
+                </a:solidFill>
+                <a:latin typeface="Corbel" charset="0"/>
+                <a:ea typeface="Corbel" charset="0"/>
+                <a:cs typeface="Corbel" charset="0"/>
+              </a:rPr>
+              <a:t>Transcribe</a:t>
+            </a:r>
+          </a:p>
+          <a:p>
+            <a:pPr marL="342900" indent="-342900">
+              <a:buFont typeface="Arial" charset="0"/>
+              <a:buChar char="•"/>
+            </a:pPr>
+            <a:r>
+              <a:rPr lang="en-US" sz="2000" dirty="0" smtClean="0">
+                <a:solidFill>
+                  <a:srgbClr val="73626E"/>
+                </a:solidFill>
+                <a:latin typeface="Corbel" charset="0"/>
+                <a:ea typeface="Corbel" charset="0"/>
+                <a:cs typeface="Corbel" charset="0"/>
+              </a:rPr>
               <a:t>Encode</a:t>
             </a:r>
+            <a:endParaRPr lang="en-US" sz="2000" dirty="0" smtClean="0">
+              <a:solidFill>
+                <a:srgbClr val="73626E"/>
+              </a:solidFill>
+              <a:latin typeface="Corbel" charset="0"/>
+              <a:ea typeface="Corbel" charset="0"/>
+              <a:cs typeface="Corbel" charset="0"/>
+            </a:endParaRPr>
           </a:p>
           <a:p>
             <a:pPr marL="342900" indent="-342900">
@@ -7374,16 +7277,14 @@
         </p:blipFill>
         <p:spPr>
           <a:xfrm>
-            <a:off x="3739206" y="15122251"/>
+            <a:off x="3870514" y="9109136"/>
             <a:ext cx="707875" cy="576064"/>
           </a:xfrm>
           <a:prstGeom prst="rect">
             <a:avLst/>
           </a:prstGeom>
           <a:ln>
-            <a:solidFill>
-              <a:schemeClr val="bg1"/>
-            </a:solidFill>
+            <a:noFill/>
           </a:ln>
         </p:spPr>
       </p:pic>
@@ -7397,7 +7298,7 @@
         </p:nvCxnSpPr>
         <p:spPr>
           <a:xfrm>
-            <a:off x="4447081" y="15410283"/>
+            <a:off x="4578389" y="9397168"/>
             <a:ext cx="384450" cy="0"/>
           </a:xfrm>
           <a:prstGeom prst="straightConnector1">
@@ -7411,48 +7312,6 @@
             </a:solidFill>
             <a:headEnd type="arrow" w="sm" len="sm"/>
             <a:tailEnd type="none" w="med" len="med"/>
-          </a:ln>
-        </p:spPr>
-        <p:style>
-          <a:lnRef idx="1">
-            <a:schemeClr val="accent1"/>
-          </a:lnRef>
-          <a:fillRef idx="0">
-            <a:schemeClr val="accent1"/>
-          </a:fillRef>
-          <a:effectRef idx="0">
-            <a:schemeClr val="accent1"/>
-          </a:effectRef>
-          <a:fontRef idx="minor">
-            <a:schemeClr val="tx1"/>
-          </a:fontRef>
-        </p:style>
-      </p:cxnSp>
-      <p:cxnSp>
-        <p:nvCxnSpPr>
-          <p:cNvPr id="207" name="Elbow Connector 206"/>
-          <p:cNvCxnSpPr>
-            <a:endCxn id="101" idx="1"/>
-          </p:cNvCxnSpPr>
-          <p:nvPr/>
-        </p:nvCxnSpPr>
-        <p:spPr>
-          <a:xfrm flipV="1">
-            <a:off x="6657255" y="13051780"/>
-            <a:ext cx="754359" cy="270271"/>
-          </a:xfrm>
-          <a:prstGeom prst="bentConnector3">
-            <a:avLst>
-              <a:gd name="adj1" fmla="val 50000"/>
-            </a:avLst>
-          </a:prstGeom>
-          <a:ln w="25400">
-            <a:solidFill>
-              <a:schemeClr val="bg1">
-                <a:lumMod val="85000"/>
-              </a:schemeClr>
-            </a:solidFill>
-            <a:tailEnd type="arrow" w="sm" len="sm"/>
           </a:ln>
         </p:spPr>
         <p:style>
@@ -7478,7 +7337,7 @@
         </p:nvCxnSpPr>
         <p:spPr>
           <a:xfrm flipH="1">
-            <a:off x="5361111" y="13754099"/>
+            <a:off x="5501174" y="8386885"/>
             <a:ext cx="457572" cy="0"/>
           </a:xfrm>
           <a:prstGeom prst="straightConnector1">
@@ -7520,8 +7379,8 @@
         </p:nvCxnSpPr>
         <p:spPr>
           <a:xfrm flipV="1">
-            <a:off x="5623619" y="14583915"/>
-            <a:ext cx="846956" cy="826368"/>
+            <a:off x="5742722" y="9179420"/>
+            <a:ext cx="918964" cy="217748"/>
           </a:xfrm>
           <a:prstGeom prst="bentConnector2">
             <a:avLst/>
@@ -7561,12 +7420,12 @@
         </p:nvCxnSpPr>
         <p:spPr>
           <a:xfrm rot="10800000" flipV="1">
-            <a:off x="9067799" y="12656839"/>
-            <a:ext cx="12700" cy="852656"/>
+            <a:off x="9017362" y="7579828"/>
+            <a:ext cx="12700" cy="792088"/>
           </a:xfrm>
           <a:prstGeom prst="bentConnector3">
             <a:avLst>
-              <a:gd name="adj1" fmla="val 1800000"/>
+              <a:gd name="adj1" fmla="val 1974543"/>
             </a:avLst>
           </a:prstGeom>
           <a:ln w="25400">
@@ -7602,7 +7461,7 @@
         </p:nvCxnSpPr>
         <p:spPr>
           <a:xfrm>
-            <a:off x="8563742" y="13106027"/>
+            <a:off x="8479026" y="7957008"/>
             <a:ext cx="288032" cy="0"/>
           </a:xfrm>
           <a:prstGeom prst="straightConnector1">
@@ -7641,7 +7500,7 @@
         </p:nvSpPr>
         <p:spPr>
           <a:xfrm>
-            <a:off x="6225207" y="15698315"/>
+            <a:off x="2214330" y="7236928"/>
             <a:ext cx="3528392" cy="529376"/>
           </a:xfrm>
           <a:prstGeom prst="rect">
@@ -7693,7 +7552,7 @@
         </p:nvSpPr>
         <p:spPr>
           <a:xfrm>
-            <a:off x="2117846" y="5682394"/>
+            <a:off x="2118660" y="5682394"/>
             <a:ext cx="184731" cy="646331"/>
           </a:xfrm>
           <a:prstGeom prst="rect">
@@ -7723,7 +7582,7 @@
         </p:nvSpPr>
         <p:spPr>
           <a:xfrm rot="10800000" flipV="1">
-            <a:off x="1256655" y="8137475"/>
+            <a:off x="1256655" y="13178035"/>
             <a:ext cx="288032" cy="2814617"/>
           </a:xfrm>
           <a:prstGeom prst="arc">
@@ -7776,7 +7635,7 @@
         </p:nvSpPr>
         <p:spPr>
           <a:xfrm rot="9817432" flipH="1" flipV="1">
-            <a:off x="1250004" y="8041003"/>
+            <a:off x="1250004" y="13081563"/>
             <a:ext cx="637672" cy="2087776"/>
           </a:xfrm>
           <a:prstGeom prst="arc">
@@ -7829,7 +7688,7 @@
         </p:nvSpPr>
         <p:spPr>
           <a:xfrm rot="10800000" flipH="1" flipV="1">
-            <a:off x="72008" y="8137475"/>
+            <a:off x="72008" y="13178035"/>
             <a:ext cx="2016224" cy="1584177"/>
           </a:xfrm>
           <a:prstGeom prst="arc">
@@ -7882,7 +7741,7 @@
         </p:nvSpPr>
         <p:spPr>
           <a:xfrm rot="10800000" flipH="1" flipV="1">
-            <a:off x="1112639" y="8065467"/>
+            <a:off x="1112639" y="13106027"/>
             <a:ext cx="432048" cy="2304257"/>
           </a:xfrm>
           <a:prstGeom prst="arc">
@@ -7949,7 +7808,7 @@
         </p:blipFill>
         <p:spPr>
           <a:xfrm>
-            <a:off x="2671364" y="5113139"/>
+            <a:off x="2672178" y="5113139"/>
             <a:ext cx="1188133" cy="432048"/>
           </a:xfrm>
           <a:prstGeom prst="rect">
@@ -7979,7 +7838,7 @@
         </p:blipFill>
         <p:spPr>
           <a:xfrm>
-            <a:off x="2383332" y="5617195"/>
+            <a:off x="2384146" y="5617195"/>
             <a:ext cx="1130300" cy="317500"/>
           </a:xfrm>
           <a:prstGeom prst="rect">
@@ -8008,7 +7867,7 @@
         </p:blipFill>
         <p:spPr>
           <a:xfrm>
-            <a:off x="3823492" y="4681091"/>
+            <a:off x="3824306" y="4681091"/>
             <a:ext cx="1268365" cy="949771"/>
           </a:xfrm>
           <a:prstGeom prst="rect">
@@ -8016,6 +7875,46 @@
           </a:prstGeom>
         </p:spPr>
       </p:pic>
+      <p:sp>
+        <p:nvSpPr>
+          <p:cNvPr id="77" name="TextBox 76"/>
+          <p:cNvSpPr txBox="1"/>
+          <p:nvPr/>
+        </p:nvSpPr>
+        <p:spPr>
+          <a:xfrm rot="16200000">
+            <a:off x="-1233614" y="4795910"/>
+            <a:ext cx="3456384" cy="490442"/>
+          </a:xfrm>
+          <a:prstGeom prst="round2SameRect">
+            <a:avLst/>
+          </a:prstGeom>
+          <a:noFill/>
+          <a:ln w="19050">
+            <a:noFill/>
+          </a:ln>
+        </p:spPr>
+        <p:txBody>
+          <a:bodyPr wrap="square" lIns="0" tIns="18288" rIns="0" bIns="18288" rtlCol="0">
+            <a:spAutoFit/>
+          </a:bodyPr>
+          <a:lstStyle/>
+          <a:p>
+            <a:pPr algn="ctr"/>
+            <a:r>
+              <a:rPr lang="en-US" sz="2800" dirty="0" smtClean="0">
+                <a:solidFill>
+                  <a:srgbClr val="73626E"/>
+                </a:solidFill>
+                <a:latin typeface="Corbel" charset="0"/>
+                <a:ea typeface="Corbel" charset="0"/>
+                <a:cs typeface="Corbel" charset="0"/>
+              </a:rPr>
+              <a:t>Components</a:t>
+            </a:r>
+          </a:p>
+        </p:txBody>
+      </p:sp>
       <p:pic>
         <p:nvPicPr>
           <p:cNvPr id="108" name="Picture 107"/>
@@ -8038,7 +7937,7 @@
         </p:blipFill>
         <p:spPr>
           <a:xfrm>
-            <a:off x="1159196" y="4249043"/>
+            <a:off x="1160010" y="4249043"/>
             <a:ext cx="1080120" cy="1080120"/>
           </a:xfrm>
           <a:prstGeom prst="rect">
@@ -8068,7 +7967,7 @@
         </p:blipFill>
         <p:spPr>
           <a:xfrm>
-            <a:off x="2408783" y="4681091"/>
+            <a:off x="2409597" y="4681091"/>
             <a:ext cx="610233" cy="400024"/>
           </a:xfrm>
           <a:prstGeom prst="rect">
@@ -8098,7 +7997,7 @@
         </p:blipFill>
         <p:spPr>
           <a:xfrm>
-            <a:off x="1231204" y="5257155"/>
+            <a:off x="1232018" y="5257155"/>
             <a:ext cx="999803" cy="576064"/>
           </a:xfrm>
           <a:prstGeom prst="rect">
@@ -8106,46 +8005,6 @@
           </a:prstGeom>
         </p:spPr>
       </p:pic>
-      <p:sp>
-        <p:nvSpPr>
-          <p:cNvPr id="77" name="TextBox 76"/>
-          <p:cNvSpPr txBox="1"/>
-          <p:nvPr/>
-        </p:nvSpPr>
-        <p:spPr>
-          <a:xfrm rot="16200000">
-            <a:off x="-1126416" y="4687898"/>
-            <a:ext cx="3240360" cy="490442"/>
-          </a:xfrm>
-          <a:prstGeom prst="round2SameRect">
-            <a:avLst/>
-          </a:prstGeom>
-          <a:noFill/>
-          <a:ln w="19050">
-            <a:noFill/>
-          </a:ln>
-        </p:spPr>
-        <p:txBody>
-          <a:bodyPr wrap="square" lIns="0" tIns="18288" rIns="0" bIns="18288" rtlCol="0">
-            <a:spAutoFit/>
-          </a:bodyPr>
-          <a:lstStyle/>
-          <a:p>
-            <a:pPr algn="ctr"/>
-            <a:r>
-              <a:rPr lang="en-US" sz="2800" dirty="0" smtClean="0">
-                <a:solidFill>
-                  <a:srgbClr val="73626E"/>
-                </a:solidFill>
-                <a:latin typeface="Corbel" charset="0"/>
-                <a:ea typeface="Corbel" charset="0"/>
-                <a:cs typeface="Corbel" charset="0"/>
-              </a:rPr>
-              <a:t>Components</a:t>
-            </a:r>
-          </a:p>
-        </p:txBody>
-      </p:sp>
       <p:sp>
         <p:nvSpPr>
           <p:cNvPr id="112" name="TextBox 111"/>
@@ -8154,7 +8013,7 @@
         </p:nvSpPr>
         <p:spPr>
           <a:xfrm>
-            <a:off x="3679476" y="5617195"/>
+            <a:off x="3680290" y="5617195"/>
             <a:ext cx="1609627" cy="307777"/>
           </a:xfrm>
           <a:prstGeom prst="rect">
@@ -8195,7 +8054,7 @@
         </p:nvSpPr>
         <p:spPr>
           <a:xfrm>
-            <a:off x="3463452" y="4609083"/>
+            <a:off x="3464266" y="4609083"/>
             <a:ext cx="1025179" cy="307777"/>
           </a:xfrm>
           <a:prstGeom prst="rect">
@@ -8236,7 +8095,7 @@
         </p:nvSpPr>
         <p:spPr>
           <a:xfrm>
-            <a:off x="2599009" y="4249043"/>
+            <a:off x="2599823" y="4249043"/>
             <a:ext cx="1008112" cy="381381"/>
           </a:xfrm>
           <a:prstGeom prst="roundRect">
@@ -8288,7 +8147,7 @@
         </p:nvSpPr>
         <p:spPr>
           <a:xfrm>
-            <a:off x="4759523" y="14978235"/>
+            <a:off x="4878626" y="8965120"/>
             <a:ext cx="864096" cy="864096"/>
           </a:xfrm>
           <a:prstGeom prst="diamond">
@@ -8354,7 +8213,7 @@
         </p:nvCxnSpPr>
         <p:spPr>
           <a:xfrm flipH="1" flipV="1">
-            <a:off x="6127675" y="13322051"/>
+            <a:off x="6300498" y="7957008"/>
             <a:ext cx="18288" cy="936104"/>
           </a:xfrm>
           <a:prstGeom prst="bentConnector3">
@@ -8395,7 +8254,7 @@
         </p:nvSpPr>
         <p:spPr>
           <a:xfrm>
-            <a:off x="6297215" y="6985347"/>
+            <a:off x="6297215" y="12025907"/>
             <a:ext cx="3528392" cy="749141"/>
           </a:xfrm>
           <a:prstGeom prst="roundRect">
@@ -8975,6 +8834,321 @@
           </a:p>
         </p:txBody>
       </p:sp>
+      <p:sp>
+        <p:nvSpPr>
+          <p:cNvPr id="5" name="Rectangle 4"/>
+          <p:cNvSpPr/>
+          <p:nvPr/>
+        </p:nvSpPr>
+        <p:spPr>
+          <a:xfrm>
+            <a:off x="-1" y="0"/>
+            <a:ext cx="10290175" cy="18291175"/>
+          </a:xfrm>
+          <a:prstGeom prst="rect">
+            <a:avLst/>
+          </a:prstGeom>
+          <a:noFill/>
+          <a:ln w="63500">
+            <a:solidFill>
+              <a:schemeClr val="bg1">
+                <a:lumMod val="85000"/>
+              </a:schemeClr>
+            </a:solidFill>
+          </a:ln>
+        </p:spPr>
+        <p:style>
+          <a:lnRef idx="2">
+            <a:schemeClr val="accent1">
+              <a:shade val="50000"/>
+            </a:schemeClr>
+          </a:lnRef>
+          <a:fillRef idx="1">
+            <a:schemeClr val="accent1"/>
+          </a:fillRef>
+          <a:effectRef idx="0">
+            <a:schemeClr val="accent1"/>
+          </a:effectRef>
+          <a:fontRef idx="minor">
+            <a:schemeClr val="lt1"/>
+          </a:fontRef>
+        </p:style>
+        <p:txBody>
+          <a:bodyPr rtlCol="0" anchor="ctr"/>
+          <a:lstStyle/>
+          <a:p>
+            <a:pPr algn="ctr"/>
+            <a:endParaRPr lang="en-US"/>
+          </a:p>
+        </p:txBody>
+      </p:sp>
+      <p:sp>
+        <p:nvSpPr>
+          <p:cNvPr id="83" name="TextBox 82"/>
+          <p:cNvSpPr txBox="1"/>
+          <p:nvPr/>
+        </p:nvSpPr>
+        <p:spPr>
+          <a:xfrm>
+            <a:off x="896615" y="12025907"/>
+            <a:ext cx="3528392" cy="1362075"/>
+          </a:xfrm>
+          <a:prstGeom prst="roundRect">
+            <a:avLst/>
+          </a:prstGeom>
+          <a:solidFill>
+            <a:schemeClr val="bg1">
+              <a:lumMod val="85000"/>
+            </a:schemeClr>
+          </a:solidFill>
+          <a:ln>
+            <a:noFill/>
+          </a:ln>
+        </p:spPr>
+        <p:txBody>
+          <a:bodyPr wrap="square" rtlCol="0">
+            <a:spAutoFit/>
+          </a:bodyPr>
+          <a:lstStyle/>
+          <a:p>
+            <a:r>
+              <a:rPr lang="en-US" sz="2000" b="1" dirty="0" smtClean="0">
+                <a:solidFill>
+                  <a:srgbClr val="73626E"/>
+                </a:solidFill>
+                <a:latin typeface="Corbel" charset="0"/>
+                <a:ea typeface="Corbel" charset="0"/>
+                <a:cs typeface="Corbel" charset="0"/>
+              </a:rPr>
+              <a:t>Editors</a:t>
+            </a:r>
+          </a:p>
+          <a:p>
+            <a:pPr marL="342900" indent="-342900">
+              <a:buFont typeface="Arial" charset="0"/>
+              <a:buChar char="•"/>
+            </a:pPr>
+            <a:r>
+              <a:rPr lang="en-US" sz="1800" dirty="0" smtClean="0">
+                <a:solidFill>
+                  <a:srgbClr val="73626E"/>
+                </a:solidFill>
+                <a:latin typeface="Corbel" charset="0"/>
+                <a:ea typeface="Corbel" charset="0"/>
+                <a:cs typeface="Corbel" charset="0"/>
+              </a:rPr>
+              <a:t>Contribute files and metadata</a:t>
+            </a:r>
+          </a:p>
+          <a:p>
+            <a:pPr marL="342900" indent="-342900">
+              <a:buFont typeface="Arial" charset="0"/>
+              <a:buChar char="•"/>
+            </a:pPr>
+            <a:r>
+              <a:rPr lang="en-US" sz="1800" dirty="0" smtClean="0">
+                <a:solidFill>
+                  <a:srgbClr val="73626E"/>
+                </a:solidFill>
+                <a:latin typeface="Corbel" charset="0"/>
+                <a:ea typeface="Corbel" charset="0"/>
+                <a:cs typeface="Corbel" charset="0"/>
+              </a:rPr>
+              <a:t>Claim and execute tasks</a:t>
+            </a:r>
+          </a:p>
+          <a:p>
+            <a:pPr marL="342900" indent="-342900">
+              <a:buFont typeface="Arial" charset="0"/>
+              <a:buChar char="•"/>
+            </a:pPr>
+            <a:r>
+              <a:rPr lang="en-US" sz="1800" dirty="0" smtClean="0">
+                <a:solidFill>
+                  <a:srgbClr val="73626E"/>
+                </a:solidFill>
+                <a:latin typeface="Corbel" charset="0"/>
+                <a:ea typeface="Corbel" charset="0"/>
+                <a:cs typeface="Corbel" charset="0"/>
+              </a:rPr>
+              <a:t>Accept and reject deposits</a:t>
+            </a:r>
+            <a:endParaRPr lang="en-US" sz="1800" dirty="0">
+              <a:solidFill>
+                <a:srgbClr val="73626E"/>
+              </a:solidFill>
+              <a:latin typeface="Corbel" charset="0"/>
+              <a:ea typeface="Corbel" charset="0"/>
+              <a:cs typeface="Corbel" charset="0"/>
+            </a:endParaRPr>
+          </a:p>
+        </p:txBody>
+      </p:sp>
+      <p:sp>
+        <p:nvSpPr>
+          <p:cNvPr id="13" name="TextBox 12"/>
+          <p:cNvSpPr txBox="1"/>
+          <p:nvPr/>
+        </p:nvSpPr>
+        <p:spPr>
+          <a:xfrm>
+            <a:off x="6030754" y="9901224"/>
+            <a:ext cx="3672408" cy="442674"/>
+          </a:xfrm>
+          <a:prstGeom prst="roundRect">
+            <a:avLst/>
+          </a:prstGeom>
+          <a:solidFill>
+            <a:schemeClr val="bg1">
+              <a:lumMod val="85000"/>
+            </a:schemeClr>
+          </a:solidFill>
+        </p:spPr>
+        <p:txBody>
+          <a:bodyPr wrap="square" rtlCol="0">
+            <a:spAutoFit/>
+          </a:bodyPr>
+          <a:lstStyle/>
+          <a:p>
+            <a:pPr algn="ctr"/>
+            <a:r>
+              <a:rPr lang="en-US" sz="2000" b="1" dirty="0">
+                <a:solidFill>
+                  <a:srgbClr val="73626E"/>
+                </a:solidFill>
+                <a:latin typeface="Corbel" charset="0"/>
+                <a:ea typeface="Corbel" charset="0"/>
+                <a:cs typeface="Corbel" charset="0"/>
+              </a:rPr>
+              <a:t>{ </a:t>
+            </a:r>
+            <a:r>
+              <a:rPr lang="en-US" sz="2000" b="1" dirty="0" smtClean="0">
+                <a:solidFill>
+                  <a:srgbClr val="73626E"/>
+                </a:solidFill>
+                <a:latin typeface="Corbel" charset="0"/>
+                <a:ea typeface="Corbel" charset="0"/>
+                <a:cs typeface="Corbel" charset="0"/>
+              </a:rPr>
+              <a:t>Edit ✏️ }</a:t>
+            </a:r>
+            <a:endParaRPr lang="en-US" sz="2000" b="1" dirty="0">
+              <a:solidFill>
+                <a:srgbClr val="73626E"/>
+              </a:solidFill>
+              <a:latin typeface="Corbel" charset="0"/>
+              <a:ea typeface="Corbel" charset="0"/>
+              <a:cs typeface="Corbel" charset="0"/>
+            </a:endParaRPr>
+          </a:p>
+        </p:txBody>
+      </p:sp>
+      <p:sp>
+        <p:nvSpPr>
+          <p:cNvPr id="98" name="Diamond 97"/>
+          <p:cNvSpPr/>
+          <p:nvPr/>
+        </p:nvSpPr>
+        <p:spPr>
+          <a:xfrm>
+            <a:off x="4878626" y="7957008"/>
+            <a:ext cx="864096" cy="864096"/>
+          </a:xfrm>
+          <a:prstGeom prst="diamond">
+            <a:avLst/>
+          </a:prstGeom>
+          <a:solidFill>
+            <a:schemeClr val="bg1">
+              <a:lumMod val="85000"/>
+            </a:schemeClr>
+          </a:solidFill>
+          <a:ln>
+            <a:noFill/>
+          </a:ln>
+        </p:spPr>
+        <p:style>
+          <a:lnRef idx="2">
+            <a:schemeClr val="accent1">
+              <a:shade val="50000"/>
+            </a:schemeClr>
+          </a:lnRef>
+          <a:fillRef idx="1">
+            <a:schemeClr val="accent1"/>
+          </a:fillRef>
+          <a:effectRef idx="0">
+            <a:schemeClr val="accent1"/>
+          </a:effectRef>
+          <a:fontRef idx="minor">
+            <a:schemeClr val="lt1"/>
+          </a:fontRef>
+        </p:style>
+        <p:txBody>
+          <a:bodyPr lIns="0" tIns="0" rIns="0" bIns="0" rtlCol="0" anchor="ctr"/>
+          <a:lstStyle/>
+          <a:p>
+            <a:pPr algn="ctr"/>
+            <a:r>
+              <a:rPr lang="en-US" sz="1800" dirty="0" smtClean="0">
+                <a:solidFill>
+                  <a:srgbClr val="73626E"/>
+                </a:solidFill>
+                <a:latin typeface="Corbel" charset="0"/>
+                <a:ea typeface="Corbel" charset="0"/>
+                <a:cs typeface="Corbel" charset="0"/>
+              </a:rPr>
+              <a:t>Role</a:t>
+            </a:r>
+            <a:endParaRPr lang="en-US" sz="1800" dirty="0">
+              <a:solidFill>
+                <a:srgbClr val="73626E"/>
+              </a:solidFill>
+              <a:latin typeface="Corbel" charset="0"/>
+              <a:ea typeface="Corbel" charset="0"/>
+              <a:cs typeface="Corbel" charset="0"/>
+            </a:endParaRPr>
+          </a:p>
+        </p:txBody>
+      </p:sp>
+      <p:cxnSp>
+        <p:nvCxnSpPr>
+          <p:cNvPr id="119" name="Straight Arrow Connector 118"/>
+          <p:cNvCxnSpPr/>
+          <p:nvPr/>
+        </p:nvCxnSpPr>
+        <p:spPr>
+          <a:xfrm>
+            <a:off x="6894850" y="7957008"/>
+            <a:ext cx="481982" cy="0"/>
+          </a:xfrm>
+          <a:prstGeom prst="straightConnector1">
+            <a:avLst/>
+          </a:prstGeom>
+          <a:ln w="25400">
+            <a:solidFill>
+              <a:schemeClr val="bg1">
+                <a:lumMod val="85000"/>
+              </a:schemeClr>
+            </a:solidFill>
+            <a:headEnd type="none" w="sm" len="sm"/>
+            <a:tailEnd type="arrow" w="med" len="med"/>
+          </a:ln>
+        </p:spPr>
+        <p:style>
+          <a:lnRef idx="1">
+            <a:schemeClr val="accent1"/>
+          </a:lnRef>
+          <a:fillRef idx="0">
+            <a:schemeClr val="accent1"/>
+          </a:fillRef>
+          <a:effectRef idx="0">
+            <a:schemeClr val="accent1"/>
+          </a:effectRef>
+          <a:fontRef idx="minor">
+            <a:schemeClr val="tx1"/>
+          </a:fontRef>
+        </p:style>
+      </p:cxnSp>
     </p:spTree>
     <p:extLst>
       <p:ext uri="{BB962C8B-B14F-4D97-AF65-F5344CB8AC3E}">
@@ -11798,14 +11972,6 @@
               </a:rPr>
               <a:t>You!</a:t>
             </a:r>
-            <a:endParaRPr lang="en-US" sz="2800" dirty="0" smtClean="0">
-              <a:solidFill>
-                <a:srgbClr val="73626E"/>
-              </a:solidFill>
-              <a:latin typeface="Corbel" charset="0"/>
-              <a:ea typeface="Corbel" charset="0"/>
-              <a:cs typeface="Corbel" charset="0"/>
-            </a:endParaRPr>
           </a:p>
         </p:txBody>
       </p:sp>

</xml_diff>

<commit_message>
text and color changes
adjustment to first paragraph to add curation
add curation to diagram bubble
change diagram color
</commit_message>
<xml_diff>
--- a/Open Repositories 2017/Charon Poster/OR2017_Charon_Poster_Working.pptx
+++ b/Open Repositories 2017/Charon Poster/OR2017_Charon_Poster_Working.pptx
@@ -405,7 +405,7 @@
           <a:p>
             <a:fld id="{60829E41-64EF-604D-A40A-7DA186A06455}" type="datetimeFigureOut">
               <a:rPr lang="en-US" smtClean="0"/>
-              <a:t>5/30/17</a:t>
+              <a:t>5/31/17</a:t>
             </a:fld>
             <a:endParaRPr lang="en-US"/>
           </a:p>
@@ -1651,7 +1651,7 @@
             <a:fld id="{E8B92B60-3ACF-4E3B-ACCA-3CF86291A092}" type="datetimeFigureOut">
               <a:rPr lang="en-AU" smtClean="0"/>
               <a:pPr/>
-              <a:t>30/05/2017</a:t>
+              <a:t>31/05/2017</a:t>
             </a:fld>
             <a:endParaRPr lang="en-AU"/>
           </a:p>
@@ -1818,7 +1818,7 @@
             <a:fld id="{E8B92B60-3ACF-4E3B-ACCA-3CF86291A092}" type="datetimeFigureOut">
               <a:rPr lang="en-AU" smtClean="0"/>
               <a:pPr/>
-              <a:t>30/05/2017</a:t>
+              <a:t>31/05/2017</a:t>
             </a:fld>
             <a:endParaRPr lang="en-AU"/>
           </a:p>
@@ -1995,7 +1995,7 @@
             <a:fld id="{E8B92B60-3ACF-4E3B-ACCA-3CF86291A092}" type="datetimeFigureOut">
               <a:rPr lang="en-AU" smtClean="0"/>
               <a:pPr/>
-              <a:t>30/05/2017</a:t>
+              <a:t>31/05/2017</a:t>
             </a:fld>
             <a:endParaRPr lang="en-AU"/>
           </a:p>
@@ -2162,7 +2162,7 @@
             <a:fld id="{E8B92B60-3ACF-4E3B-ACCA-3CF86291A092}" type="datetimeFigureOut">
               <a:rPr lang="en-AU" smtClean="0"/>
               <a:pPr/>
-              <a:t>30/05/2017</a:t>
+              <a:t>31/05/2017</a:t>
             </a:fld>
             <a:endParaRPr lang="en-AU"/>
           </a:p>
@@ -2405,7 +2405,7 @@
             <a:fld id="{E8B92B60-3ACF-4E3B-ACCA-3CF86291A092}" type="datetimeFigureOut">
               <a:rPr lang="en-AU" smtClean="0"/>
               <a:pPr/>
-              <a:t>30/05/2017</a:t>
+              <a:t>31/05/2017</a:t>
             </a:fld>
             <a:endParaRPr lang="en-AU"/>
           </a:p>
@@ -2690,7 +2690,7 @@
             <a:fld id="{E8B92B60-3ACF-4E3B-ACCA-3CF86291A092}" type="datetimeFigureOut">
               <a:rPr lang="en-AU" smtClean="0"/>
               <a:pPr/>
-              <a:t>30/05/2017</a:t>
+              <a:t>31/05/2017</a:t>
             </a:fld>
             <a:endParaRPr lang="en-AU"/>
           </a:p>
@@ -3114,7 +3114,7 @@
             <a:fld id="{E8B92B60-3ACF-4E3B-ACCA-3CF86291A092}" type="datetimeFigureOut">
               <a:rPr lang="en-AU" smtClean="0"/>
               <a:pPr/>
-              <a:t>30/05/2017</a:t>
+              <a:t>31/05/2017</a:t>
             </a:fld>
             <a:endParaRPr lang="en-AU"/>
           </a:p>
@@ -3229,7 +3229,7 @@
             <a:fld id="{E8B92B60-3ACF-4E3B-ACCA-3CF86291A092}" type="datetimeFigureOut">
               <a:rPr lang="en-AU" smtClean="0"/>
               <a:pPr/>
-              <a:t>30/05/2017</a:t>
+              <a:t>31/05/2017</a:t>
             </a:fld>
             <a:endParaRPr lang="en-AU"/>
           </a:p>
@@ -3321,7 +3321,7 @@
             <a:fld id="{E8B92B60-3ACF-4E3B-ACCA-3CF86291A092}" type="datetimeFigureOut">
               <a:rPr lang="en-AU" smtClean="0"/>
               <a:pPr/>
-              <a:t>30/05/2017</a:t>
+              <a:t>31/05/2017</a:t>
             </a:fld>
             <a:endParaRPr lang="en-AU"/>
           </a:p>
@@ -3595,7 +3595,7 @@
             <a:fld id="{E8B92B60-3ACF-4E3B-ACCA-3CF86291A092}" type="datetimeFigureOut">
               <a:rPr lang="en-AU" smtClean="0"/>
               <a:pPr/>
-              <a:t>30/05/2017</a:t>
+              <a:t>31/05/2017</a:t>
             </a:fld>
             <a:endParaRPr lang="en-AU"/>
           </a:p>
@@ -3845,7 +3845,7 @@
             <a:fld id="{E8B92B60-3ACF-4E3B-ACCA-3CF86291A092}" type="datetimeFigureOut">
               <a:rPr lang="en-AU" smtClean="0"/>
               <a:pPr/>
-              <a:t>30/05/2017</a:t>
+              <a:t>31/05/2017</a:t>
             </a:fld>
             <a:endParaRPr lang="en-AU"/>
           </a:p>
@@ -4055,7 +4055,7 @@
             <a:fld id="{E8B92B60-3ACF-4E3B-ACCA-3CF86291A092}" type="datetimeFigureOut">
               <a:rPr lang="en-AU" smtClean="0"/>
               <a:pPr/>
-              <a:t>30/05/2017</a:t>
+              <a:t>31/05/2017</a:t>
             </a:fld>
             <a:endParaRPr lang="en-AU"/>
           </a:p>
@@ -11122,8 +11122,8 @@
         </p:nvSpPr>
         <p:spPr>
           <a:xfrm>
-            <a:off x="943985" y="3456955"/>
-            <a:ext cx="4417125" cy="3168352"/>
+            <a:off x="943986" y="3456955"/>
+            <a:ext cx="4201102" cy="3168352"/>
           </a:xfrm>
           <a:prstGeom prst="roundRect">
             <a:avLst/>
@@ -11179,8 +11179,8 @@
         </p:nvSpPr>
         <p:spPr>
           <a:xfrm>
-            <a:off x="5433119" y="3456955"/>
-            <a:ext cx="4536828" cy="3262432"/>
+            <a:off x="5289103" y="3456955"/>
+            <a:ext cx="4608512" cy="3262432"/>
           </a:xfrm>
           <a:prstGeom prst="rect">
             <a:avLst/>
@@ -11216,7 +11216,7 @@
                 <a:ea typeface="Corbel" charset="0"/>
                 <a:cs typeface="Corbel" charset="0"/>
               </a:rPr>
-              <a:t>to enable the creation, dissemination, and </a:t>
+              <a:t>to enable </a:t>
             </a:r>
             <a:r>
               <a:rPr lang="en-US" sz="2000" dirty="0" smtClean="0">
@@ -11227,6 +11227,50 @@
                 <a:ea typeface="Corbel" charset="0"/>
                 <a:cs typeface="Corbel" charset="0"/>
               </a:rPr>
+              <a:t>the creation</a:t>
+            </a:r>
+            <a:r>
+              <a:rPr lang="en-US" sz="2000" dirty="0">
+                <a:solidFill>
+                  <a:srgbClr val="37474F"/>
+                </a:solidFill>
+                <a:latin typeface="Corbel" charset="0"/>
+                <a:ea typeface="Corbel" charset="0"/>
+                <a:cs typeface="Corbel" charset="0"/>
+              </a:rPr>
+              <a:t>, </a:t>
+            </a:r>
+            <a:r>
+              <a:rPr lang="en-US" sz="2000" dirty="0" smtClean="0">
+                <a:solidFill>
+                  <a:srgbClr val="37474F"/>
+                </a:solidFill>
+                <a:latin typeface="Corbel" charset="0"/>
+                <a:ea typeface="Corbel" charset="0"/>
+                <a:cs typeface="Corbel" charset="0"/>
+              </a:rPr>
+              <a:t>curation, dissemination</a:t>
+            </a:r>
+            <a:r>
+              <a:rPr lang="en-US" sz="2000" dirty="0">
+                <a:solidFill>
+                  <a:srgbClr val="37474F"/>
+                </a:solidFill>
+                <a:latin typeface="Corbel" charset="0"/>
+                <a:ea typeface="Corbel" charset="0"/>
+                <a:cs typeface="Corbel" charset="0"/>
+              </a:rPr>
+              <a:t>, and </a:t>
+            </a:r>
+            <a:r>
+              <a:rPr lang="en-US" sz="2000" dirty="0" smtClean="0">
+                <a:solidFill>
+                  <a:srgbClr val="37474F"/>
+                </a:solidFill>
+                <a:latin typeface="Corbel" charset="0"/>
+                <a:ea typeface="Corbel" charset="0"/>
+                <a:cs typeface="Corbel" charset="0"/>
+              </a:rPr>
               <a:t>long-term </a:t>
             </a:r>
             <a:r>
@@ -11249,7 +11293,29 @@
                 <a:ea typeface="Corbel" charset="0"/>
                 <a:cs typeface="Corbel" charset="0"/>
               </a:rPr>
-              <a:t>digital humanities projects </a:t>
+              <a:t>digital </a:t>
+            </a:r>
+            <a:r>
+              <a:rPr lang="en-US" sz="2000" dirty="0" smtClean="0">
+                <a:solidFill>
+                  <a:srgbClr val="37474F"/>
+                </a:solidFill>
+                <a:latin typeface="Corbel" charset="0"/>
+                <a:ea typeface="Corbel" charset="0"/>
+                <a:cs typeface="Corbel" charset="0"/>
+              </a:rPr>
+              <a:t>humanities (DH) </a:t>
+            </a:r>
+            <a:r>
+              <a:rPr lang="en-US" sz="2000" dirty="0" smtClean="0">
+                <a:solidFill>
+                  <a:srgbClr val="37474F"/>
+                </a:solidFill>
+                <a:latin typeface="Corbel" charset="0"/>
+                <a:ea typeface="Corbel" charset="0"/>
+                <a:cs typeface="Corbel" charset="0"/>
+              </a:rPr>
+              <a:t>projects </a:t>
             </a:r>
             <a:r>
               <a:rPr lang="en-US" sz="2000" dirty="0">
@@ -11282,7 +11348,7 @@
                 <a:ea typeface="Corbel" charset="0"/>
                 <a:cs typeface="Corbel" charset="0"/>
               </a:rPr>
-              <a:t>to answer this question by developing a workflow-based digital </a:t>
+              <a:t>to answer this question by developing a </a:t>
             </a:r>
             <a:r>
               <a:rPr lang="en-US" sz="2000" dirty="0" smtClean="0">
@@ -11293,6 +11359,17 @@
                 <a:ea typeface="Corbel" charset="0"/>
                 <a:cs typeface="Corbel" charset="0"/>
               </a:rPr>
+              <a:t>digital </a:t>
+            </a:r>
+            <a:r>
+              <a:rPr lang="en-US" sz="2000" dirty="0" smtClean="0">
+                <a:solidFill>
+                  <a:srgbClr val="37474F"/>
+                </a:solidFill>
+                <a:latin typeface="Corbel" charset="0"/>
+                <a:ea typeface="Corbel" charset="0"/>
+                <a:cs typeface="Corbel" charset="0"/>
+              </a:rPr>
               <a:t>framework </a:t>
             </a:r>
             <a:r>
@@ -11304,7 +11381,7 @@
                 <a:ea typeface="Corbel" charset="0"/>
                 <a:cs typeface="Corbel" charset="0"/>
               </a:rPr>
-              <a:t>to provide editorial </a:t>
+              <a:t>to </a:t>
             </a:r>
             <a:r>
               <a:rPr lang="en-US" sz="2000" dirty="0" smtClean="0">
@@ -11315,7 +11392,7 @@
                 <a:ea typeface="Corbel" charset="0"/>
                 <a:cs typeface="Corbel" charset="0"/>
               </a:rPr>
-              <a:t>and other workflow </a:t>
+              <a:t>provide workflow </a:t>
             </a:r>
             <a:r>
               <a:rPr lang="en-US" sz="2000" dirty="0">
@@ -11337,7 +11414,73 @@
                 <a:ea typeface="Corbel" charset="0"/>
                 <a:cs typeface="Corbel" charset="0"/>
               </a:rPr>
-              <a:t>tools commonly used in digital humanities project work.</a:t>
+              <a:t>tools commonly used in </a:t>
+            </a:r>
+            <a:r>
+              <a:rPr lang="en-US" sz="2000" dirty="0" smtClean="0">
+                <a:solidFill>
+                  <a:srgbClr val="37474F"/>
+                </a:solidFill>
+                <a:latin typeface="Corbel" charset="0"/>
+                <a:ea typeface="Corbel" charset="0"/>
+                <a:cs typeface="Corbel" charset="0"/>
+              </a:rPr>
+              <a:t>DH </a:t>
+            </a:r>
+            <a:r>
+              <a:rPr lang="en-US" sz="2000" dirty="0" smtClean="0">
+                <a:solidFill>
+                  <a:srgbClr val="37474F"/>
+                </a:solidFill>
+                <a:latin typeface="Corbel" charset="0"/>
+                <a:ea typeface="Corbel" charset="0"/>
+                <a:cs typeface="Corbel" charset="0"/>
+              </a:rPr>
+              <a:t>project </a:t>
+            </a:r>
+            <a:r>
+              <a:rPr lang="en-US" sz="2000" dirty="0" smtClean="0">
+                <a:solidFill>
+                  <a:srgbClr val="37474F"/>
+                </a:solidFill>
+                <a:latin typeface="Corbel" charset="0"/>
+                <a:ea typeface="Corbel" charset="0"/>
+                <a:cs typeface="Corbel" charset="0"/>
+              </a:rPr>
+              <a:t>work, </a:t>
+            </a:r>
+            <a:r>
+              <a:rPr lang="en-US" sz="2000" smtClean="0">
+                <a:solidFill>
+                  <a:srgbClr val="37474F"/>
+                </a:solidFill>
+                <a:latin typeface="Corbel" charset="0"/>
+                <a:ea typeface="Corbel" charset="0"/>
+                <a:cs typeface="Corbel" charset="0"/>
+              </a:rPr>
+              <a:t>working alongside </a:t>
+            </a:r>
+            <a:r>
+              <a:rPr lang="en-US" sz="2000" dirty="0" smtClean="0">
+                <a:solidFill>
+                  <a:srgbClr val="37474F"/>
+                </a:solidFill>
+                <a:latin typeface="Corbel" charset="0"/>
+                <a:ea typeface="Corbel" charset="0"/>
+                <a:cs typeface="Corbel" charset="0"/>
+              </a:rPr>
+              <a:t>important digital </a:t>
+            </a:r>
+            <a:r>
+              <a:rPr lang="en-US" sz="2000" smtClean="0">
+                <a:solidFill>
+                  <a:srgbClr val="37474F"/>
+                </a:solidFill>
+                <a:latin typeface="Corbel" charset="0"/>
+                <a:ea typeface="Corbel" charset="0"/>
+                <a:cs typeface="Corbel" charset="0"/>
+              </a:rPr>
+              <a:t>curation workflows.</a:t>
             </a:r>
             <a:endParaRPr lang="en-US" sz="2000" dirty="0">
               <a:solidFill>
@@ -12520,8 +12663,8 @@
         </p:nvSpPr>
         <p:spPr>
           <a:xfrm>
-            <a:off x="914807" y="8137475"/>
-            <a:ext cx="2804933" cy="1634490"/>
+            <a:off x="914807" y="7993459"/>
+            <a:ext cx="2804933" cy="1975009"/>
           </a:xfrm>
           <a:prstGeom prst="roundRect">
             <a:avLst/>
@@ -12587,7 +12730,35 @@
                 <a:ea typeface="Corbel" charset="0"/>
                 <a:cs typeface="Corbel" charset="0"/>
               </a:rPr>
-              <a:t>Manage users</a:t>
+              <a:t>Curate data</a:t>
+            </a:r>
+          </a:p>
+          <a:p>
+            <a:pPr marL="342900" indent="-342900">
+              <a:buFont typeface="Arial" charset="0"/>
+              <a:buChar char="•"/>
+            </a:pPr>
+            <a:r>
+              <a:rPr lang="en-US" sz="2000" dirty="0" smtClean="0">
+                <a:solidFill>
+                  <a:srgbClr val="37474F"/>
+                </a:solidFill>
+                <a:latin typeface="Corbel" charset="0"/>
+                <a:ea typeface="Corbel" charset="0"/>
+                <a:cs typeface="Corbel" charset="0"/>
+              </a:rPr>
+              <a:t>Manage </a:t>
+            </a:r>
+            <a:r>
+              <a:rPr lang="en-US" sz="2000" dirty="0" smtClean="0">
+                <a:solidFill>
+                  <a:srgbClr val="37474F"/>
+                </a:solidFill>
+                <a:latin typeface="Corbel" charset="0"/>
+                <a:ea typeface="Corbel" charset="0"/>
+                <a:cs typeface="Corbel" charset="0"/>
+              </a:rPr>
+              <a:t>users</a:t>
             </a:r>
           </a:p>
           <a:p>
@@ -12682,7 +12853,7 @@
             <a:avLst/>
           </a:prstGeom>
           <a:solidFill>
-            <a:srgbClr val="64FFDA"/>
+            <a:srgbClr val="73626E"/>
           </a:solidFill>
           <a:ln>
             <a:noFill/>
@@ -12712,13 +12883,143 @@
             <a:r>
               <a:rPr lang="en-US" sz="1800" dirty="0" smtClean="0">
                 <a:solidFill>
+                  <a:srgbClr val="E0E0E0"/>
+                </a:solidFill>
+                <a:latin typeface="Corbel" charset="0"/>
+                <a:ea typeface="Corbel" charset="0"/>
+                <a:cs typeface="Corbel" charset="0"/>
+              </a:rPr>
+              <a:t>Task</a:t>
+            </a:r>
+            <a:endParaRPr lang="en-US" sz="1800" dirty="0">
+              <a:solidFill>
+                <a:srgbClr val="E0E0E0"/>
+              </a:solidFill>
+              <a:latin typeface="Corbel" charset="0"/>
+              <a:ea typeface="Corbel" charset="0"/>
+              <a:cs typeface="Corbel" charset="0"/>
+            </a:endParaRPr>
+          </a:p>
+        </p:txBody>
+      </p:sp>
+      <p:sp>
+        <p:nvSpPr>
+          <p:cNvPr id="100" name="Rectangle 99"/>
+          <p:cNvSpPr/>
+          <p:nvPr/>
+        </p:nvSpPr>
+        <p:spPr>
+          <a:xfrm>
+            <a:off x="6318786" y="8493620"/>
+            <a:ext cx="685800" cy="685800"/>
+          </a:xfrm>
+          <a:prstGeom prst="rect">
+            <a:avLst/>
+          </a:prstGeom>
+          <a:solidFill>
+            <a:srgbClr val="73626E"/>
+          </a:solidFill>
+          <a:ln>
+            <a:noFill/>
+          </a:ln>
+        </p:spPr>
+        <p:style>
+          <a:lnRef idx="2">
+            <a:schemeClr val="accent1">
+              <a:shade val="50000"/>
+            </a:schemeClr>
+          </a:lnRef>
+          <a:fillRef idx="1">
+            <a:schemeClr val="accent1"/>
+          </a:fillRef>
+          <a:effectRef idx="0">
+            <a:schemeClr val="accent1"/>
+          </a:effectRef>
+          <a:fontRef idx="minor">
+            <a:schemeClr val="lt1"/>
+          </a:fontRef>
+        </p:style>
+        <p:txBody>
+          <a:bodyPr rtlCol="0" anchor="ctr"/>
+          <a:lstStyle/>
+          <a:p>
+            <a:pPr algn="ctr"/>
+            <a:r>
+              <a:rPr lang="en-US" sz="1800" dirty="0" smtClean="0">
+                <a:solidFill>
+                  <a:srgbClr val="E0E0E0"/>
+                </a:solidFill>
+                <a:latin typeface="Corbel" charset="0"/>
+                <a:ea typeface="Corbel" charset="0"/>
+                <a:cs typeface="Corbel" charset="0"/>
+              </a:rPr>
+              <a:t>Task</a:t>
+            </a:r>
+            <a:endParaRPr lang="en-US" sz="1800" dirty="0">
+              <a:solidFill>
+                <a:srgbClr val="E0E0E0"/>
+              </a:solidFill>
+              <a:latin typeface="Corbel" charset="0"/>
+              <a:ea typeface="Corbel" charset="0"/>
+              <a:cs typeface="Corbel" charset="0"/>
+            </a:endParaRPr>
+          </a:p>
+        </p:txBody>
+      </p:sp>
+      <p:sp>
+        <p:nvSpPr>
+          <p:cNvPr id="101" name="Rectangle 100"/>
+          <p:cNvSpPr/>
+          <p:nvPr/>
+        </p:nvSpPr>
+        <p:spPr>
+          <a:xfrm>
+            <a:off x="7361177" y="7596968"/>
+            <a:ext cx="1152128" cy="685800"/>
+          </a:xfrm>
+          <a:prstGeom prst="rect">
+            <a:avLst/>
+          </a:prstGeom>
+          <a:solidFill>
+            <a:schemeClr val="bg1">
+              <a:lumMod val="85000"/>
+            </a:schemeClr>
+          </a:solidFill>
+          <a:ln>
+            <a:noFill/>
+          </a:ln>
+        </p:spPr>
+        <p:style>
+          <a:lnRef idx="2">
+            <a:schemeClr val="accent1">
+              <a:shade val="50000"/>
+            </a:schemeClr>
+          </a:lnRef>
+          <a:fillRef idx="1">
+            <a:schemeClr val="accent1"/>
+          </a:fillRef>
+          <a:effectRef idx="0">
+            <a:schemeClr val="accent1"/>
+          </a:effectRef>
+          <a:fontRef idx="minor">
+            <a:schemeClr val="lt1"/>
+          </a:fontRef>
+        </p:style>
+        <p:txBody>
+          <a:bodyPr rtlCol="0" anchor="ctr"/>
+          <a:lstStyle/>
+          <a:p>
+            <a:pPr algn="ctr"/>
+            <a:r>
+              <a:rPr lang="en-US" sz="1800" dirty="0" smtClean="0">
+                <a:solidFill>
                   <a:srgbClr val="37474F"/>
                 </a:solidFill>
                 <a:latin typeface="Corbel" charset="0"/>
                 <a:ea typeface="Corbel" charset="0"/>
                 <a:cs typeface="Corbel" charset="0"/>
               </a:rPr>
-              <a:t>Task</a:t>
+              <a:t>Interface</a:t>
             </a:r>
             <a:endParaRPr lang="en-US" sz="1800" dirty="0">
               <a:solidFill>
@@ -12733,20 +13034,22 @@
       </p:sp>
       <p:sp>
         <p:nvSpPr>
-          <p:cNvPr id="100" name="Rectangle 99"/>
+          <p:cNvPr id="102" name="Rectangle 101"/>
           <p:cNvSpPr/>
           <p:nvPr/>
         </p:nvSpPr>
         <p:spPr>
           <a:xfrm>
-            <a:off x="6318786" y="8493620"/>
-            <a:ext cx="685800" cy="685800"/>
+            <a:off x="7398906" y="8821104"/>
+            <a:ext cx="1152128" cy="685800"/>
           </a:xfrm>
           <a:prstGeom prst="rect">
             <a:avLst/>
           </a:prstGeom>
           <a:solidFill>
-            <a:srgbClr val="64FFDA"/>
+            <a:schemeClr val="bg1">
+              <a:lumMod val="85000"/>
+            </a:schemeClr>
           </a:solidFill>
           <a:ln>
             <a:noFill/>
@@ -12774,7 +13077,7 @@
           <a:p>
             <a:pPr algn="ctr"/>
             <a:r>
-              <a:rPr lang="en-US" sz="1800" dirty="0" smtClean="0">
+              <a:rPr lang="en-US" sz="1800" smtClean="0">
                 <a:solidFill>
                   <a:srgbClr val="37474F"/>
                 </a:solidFill>
@@ -12782,7 +13085,7 @@
                 <a:ea typeface="Corbel" charset="0"/>
                 <a:cs typeface="Corbel" charset="0"/>
               </a:rPr>
-              <a:t>Task</a:t>
+              <a:t>Interface</a:t>
             </a:r>
             <a:endParaRPr lang="en-US" sz="1800" dirty="0">
               <a:solidFill>
@@ -12797,22 +13100,20 @@
       </p:sp>
       <p:sp>
         <p:nvSpPr>
-          <p:cNvPr id="101" name="Rectangle 100"/>
+          <p:cNvPr id="104" name="Rectangle 103"/>
           <p:cNvSpPr/>
           <p:nvPr/>
         </p:nvSpPr>
         <p:spPr>
           <a:xfrm>
-            <a:off x="7361177" y="7596968"/>
-            <a:ext cx="1152128" cy="685800"/>
+            <a:off x="9017362" y="7236928"/>
+            <a:ext cx="685800" cy="685800"/>
           </a:xfrm>
           <a:prstGeom prst="rect">
             <a:avLst/>
           </a:prstGeom>
           <a:solidFill>
-            <a:schemeClr val="bg1">
-              <a:lumMod val="85000"/>
-            </a:schemeClr>
+            <a:srgbClr val="64FFDA"/>
           </a:solidFill>
           <a:ln>
             <a:noFill/>
@@ -12848,7 +13149,7 @@
                 <a:ea typeface="Corbel" charset="0"/>
                 <a:cs typeface="Corbel" charset="0"/>
               </a:rPr>
-              <a:t>Interface</a:t>
+              <a:t>Tool</a:t>
             </a:r>
             <a:endParaRPr lang="en-US" sz="1800" dirty="0">
               <a:solidFill>
@@ -12863,22 +13164,20 @@
       </p:sp>
       <p:sp>
         <p:nvSpPr>
-          <p:cNvPr id="102" name="Rectangle 101"/>
+          <p:cNvPr id="105" name="Rectangle 104"/>
           <p:cNvSpPr/>
           <p:nvPr/>
         </p:nvSpPr>
         <p:spPr>
           <a:xfrm>
-            <a:off x="7398906" y="8821104"/>
-            <a:ext cx="1152128" cy="685800"/>
+            <a:off x="9017362" y="8029016"/>
+            <a:ext cx="685800" cy="685800"/>
           </a:xfrm>
           <a:prstGeom prst="rect">
             <a:avLst/>
           </a:prstGeom>
           <a:solidFill>
-            <a:schemeClr val="bg1">
-              <a:lumMod val="85000"/>
-            </a:schemeClr>
+            <a:srgbClr val="64FFDA"/>
           </a:solidFill>
           <a:ln>
             <a:noFill/>
@@ -12914,7 +13213,7 @@
                 <a:ea typeface="Corbel" charset="0"/>
                 <a:cs typeface="Corbel" charset="0"/>
               </a:rPr>
-              <a:t>Interface</a:t>
+              <a:t>Tool</a:t>
             </a:r>
             <a:endParaRPr lang="en-US" sz="1800" dirty="0">
               <a:solidFill>
@@ -12929,20 +13228,20 @@
       </p:sp>
       <p:sp>
         <p:nvSpPr>
-          <p:cNvPr id="104" name="Rectangle 103"/>
+          <p:cNvPr id="106" name="Rectangle 105"/>
           <p:cNvSpPr/>
           <p:nvPr/>
         </p:nvSpPr>
         <p:spPr>
           <a:xfrm>
-            <a:off x="9017362" y="7236928"/>
+            <a:off x="9017361" y="8821104"/>
             <a:ext cx="685800" cy="685800"/>
           </a:xfrm>
           <a:prstGeom prst="rect">
             <a:avLst/>
           </a:prstGeom>
           <a:solidFill>
-            <a:srgbClr val="73626E"/>
+            <a:srgbClr val="64FFDA"/>
           </a:solidFill>
           <a:ln>
             <a:noFill/>
@@ -12970,11 +13269,9 @@
           <a:p>
             <a:pPr algn="ctr"/>
             <a:r>
-              <a:rPr lang="en-US" sz="1800" dirty="0" smtClean="0">
-                <a:solidFill>
-                  <a:schemeClr val="bg1">
-                    <a:lumMod val="95000"/>
-                  </a:schemeClr>
+              <a:rPr lang="en-US" sz="1800" smtClean="0">
+                <a:solidFill>
+                  <a:srgbClr val="37474F"/>
                 </a:solidFill>
                 <a:latin typeface="Corbel" charset="0"/>
                 <a:ea typeface="Corbel" charset="0"/>
@@ -12984,145 +13281,7 @@
             </a:r>
             <a:endParaRPr lang="en-US" sz="1800" dirty="0">
               <a:solidFill>
-                <a:schemeClr val="bg1">
-                  <a:lumMod val="95000"/>
-                </a:schemeClr>
-              </a:solidFill>
-              <a:latin typeface="Corbel" charset="0"/>
-              <a:ea typeface="Corbel" charset="0"/>
-              <a:cs typeface="Corbel" charset="0"/>
-            </a:endParaRPr>
-          </a:p>
-        </p:txBody>
-      </p:sp>
-      <p:sp>
-        <p:nvSpPr>
-          <p:cNvPr id="105" name="Rectangle 104"/>
-          <p:cNvSpPr/>
-          <p:nvPr/>
-        </p:nvSpPr>
-        <p:spPr>
-          <a:xfrm>
-            <a:off x="9017362" y="8029016"/>
-            <a:ext cx="685800" cy="685800"/>
-          </a:xfrm>
-          <a:prstGeom prst="rect">
-            <a:avLst/>
-          </a:prstGeom>
-          <a:solidFill>
-            <a:srgbClr val="73626E"/>
-          </a:solidFill>
-          <a:ln>
-            <a:noFill/>
-          </a:ln>
-        </p:spPr>
-        <p:style>
-          <a:lnRef idx="2">
-            <a:schemeClr val="accent1">
-              <a:shade val="50000"/>
-            </a:schemeClr>
-          </a:lnRef>
-          <a:fillRef idx="1">
-            <a:schemeClr val="accent1"/>
-          </a:fillRef>
-          <a:effectRef idx="0">
-            <a:schemeClr val="accent1"/>
-          </a:effectRef>
-          <a:fontRef idx="minor">
-            <a:schemeClr val="lt1"/>
-          </a:fontRef>
-        </p:style>
-        <p:txBody>
-          <a:bodyPr rtlCol="0" anchor="ctr"/>
-          <a:lstStyle/>
-          <a:p>
-            <a:pPr algn="ctr"/>
-            <a:r>
-              <a:rPr lang="en-US" sz="1800" smtClean="0">
-                <a:solidFill>
-                  <a:schemeClr val="bg1">
-                    <a:lumMod val="95000"/>
-                  </a:schemeClr>
-                </a:solidFill>
-                <a:latin typeface="Corbel" charset="0"/>
-                <a:ea typeface="Corbel" charset="0"/>
-                <a:cs typeface="Corbel" charset="0"/>
-              </a:rPr>
-              <a:t>Tool</a:t>
-            </a:r>
-            <a:endParaRPr lang="en-US" sz="1800" dirty="0">
-              <a:solidFill>
-                <a:schemeClr val="bg1">
-                  <a:lumMod val="95000"/>
-                </a:schemeClr>
-              </a:solidFill>
-              <a:latin typeface="Corbel" charset="0"/>
-              <a:ea typeface="Corbel" charset="0"/>
-              <a:cs typeface="Corbel" charset="0"/>
-            </a:endParaRPr>
-          </a:p>
-        </p:txBody>
-      </p:sp>
-      <p:sp>
-        <p:nvSpPr>
-          <p:cNvPr id="106" name="Rectangle 105"/>
-          <p:cNvSpPr/>
-          <p:nvPr/>
-        </p:nvSpPr>
-        <p:spPr>
-          <a:xfrm>
-            <a:off x="9017361" y="8821104"/>
-            <a:ext cx="685800" cy="685800"/>
-          </a:xfrm>
-          <a:prstGeom prst="rect">
-            <a:avLst/>
-          </a:prstGeom>
-          <a:solidFill>
-            <a:srgbClr val="73626E"/>
-          </a:solidFill>
-          <a:ln>
-            <a:noFill/>
-          </a:ln>
-        </p:spPr>
-        <p:style>
-          <a:lnRef idx="2">
-            <a:schemeClr val="accent1">
-              <a:shade val="50000"/>
-            </a:schemeClr>
-          </a:lnRef>
-          <a:fillRef idx="1">
-            <a:schemeClr val="accent1"/>
-          </a:fillRef>
-          <a:effectRef idx="0">
-            <a:schemeClr val="accent1"/>
-          </a:effectRef>
-          <a:fontRef idx="minor">
-            <a:schemeClr val="lt1"/>
-          </a:fontRef>
-        </p:style>
-        <p:txBody>
-          <a:bodyPr rtlCol="0" anchor="ctr"/>
-          <a:lstStyle/>
-          <a:p>
-            <a:pPr algn="ctr"/>
-            <a:r>
-              <a:rPr lang="en-US" sz="1800" smtClean="0">
-                <a:solidFill>
-                  <a:schemeClr val="bg1">
-                    <a:lumMod val="95000"/>
-                  </a:schemeClr>
-                </a:solidFill>
-                <a:latin typeface="Corbel" charset="0"/>
-                <a:ea typeface="Corbel" charset="0"/>
-                <a:cs typeface="Corbel" charset="0"/>
-              </a:rPr>
-              <a:t>Tool</a:t>
-            </a:r>
-            <a:endParaRPr lang="en-US" sz="1800" dirty="0">
-              <a:solidFill>
-                <a:schemeClr val="bg1">
-                  <a:lumMod val="95000"/>
-                </a:schemeClr>
+                <a:srgbClr val="37474F"/>
               </a:solidFill>
               <a:latin typeface="Corbel" charset="0"/>
               <a:ea typeface="Corbel" charset="0"/>
@@ -13307,7 +13466,7 @@
         </p:nvSpPr>
         <p:spPr>
           <a:xfrm>
-            <a:off x="1976735" y="10110107"/>
+            <a:off x="1976735" y="10227880"/>
             <a:ext cx="2448272" cy="1293971"/>
           </a:xfrm>
           <a:prstGeom prst="roundRect">

</xml_diff>